<commit_message>
feature(enhancements-start-to-java-generics): updated introduction text on docs incl. modules overview, fixed content-width problem (now 100% width and code boxes with scrollbar and not overlapping right side anymore)
</commit_message>
<xml_diff>
--- a/content/en/docs/overview/INF_Basisausbildung_Teil_1_Modulplan_24_25.pptx
+++ b/content/en/docs/overview/INF_Basisausbildung_Teil_1_Modulplan_24_25.pptx
@@ -118,9 +118,2870 @@
 <file path=ppt/revisionInfo.xml><?xml version="1.0" encoding="utf-8"?>
 <p1510:revInfo xmlns:a="http://schemas.openxmlformats.org/drawingml/2006/main" xmlns:r="http://schemas.openxmlformats.org/officeDocument/2006/relationships" xmlns:p1510="http://schemas.microsoft.com/office/powerpoint/2015/10/main">
   <p1510:revLst>
-    <p1510:client id="{9681DBBF-CC28-48CE-8222-BE1E4CADF4A4}" v="181" dt="2024-07-15T14:47:10.390"/>
+    <p1510:client id="{9681DBBF-CC28-48CE-8222-BE1E4CADF4A4}" v="183" dt="2024-07-18T06:24:09.717"/>
   </p1510:revLst>
 </p1510:revInfo>
+</file>
+
+<file path=ppt/changesInfos/changesInfo1.xml><?xml version="1.0" encoding="utf-8"?>
+<pc:chgInfo xmlns:a="http://schemas.openxmlformats.org/drawingml/2006/main" xmlns:r="http://schemas.openxmlformats.org/officeDocument/2006/relationships" xmlns:ac="http://schemas.microsoft.com/office/drawing/2013/main/command" xmlns:pc="http://schemas.microsoft.com/office/powerpoint/2013/main/command">
+  <pc:docChgLst>
+    <pc:chgData name="Fiechter Sebastian (IT-PTR-EXT-EXT2 - Extern)" userId="f23e6d81-0328-4361-b5a9-44eea62aa731" providerId="ADAL" clId="{9681DBBF-CC28-48CE-8222-BE1E4CADF4A4}"/>
+    <pc:docChg chg="undo custSel modSld">
+      <pc:chgData name="Fiechter Sebastian (IT-PTR-EXT-EXT2 - Extern)" userId="f23e6d81-0328-4361-b5a9-44eea62aa731" providerId="ADAL" clId="{9681DBBF-CC28-48CE-8222-BE1E4CADF4A4}" dt="2024-07-18T06:25:22.906" v="5607" actId="167"/>
+      <pc:docMkLst>
+        <pc:docMk/>
+      </pc:docMkLst>
+      <pc:sldChg chg="addSp delSp modSp mod">
+        <pc:chgData name="Fiechter Sebastian (IT-PTR-EXT-EXT2 - Extern)" userId="f23e6d81-0328-4361-b5a9-44eea62aa731" providerId="ADAL" clId="{9681DBBF-CC28-48CE-8222-BE1E4CADF4A4}" dt="2024-07-18T06:25:22.906" v="5607" actId="167"/>
+        <pc:sldMkLst>
+          <pc:docMk/>
+          <pc:sldMk cId="1151215240" sldId="256"/>
+        </pc:sldMkLst>
+        <pc:spChg chg="add mod">
+          <ac:chgData name="Fiechter Sebastian (IT-PTR-EXT-EXT2 - Extern)" userId="f23e6d81-0328-4361-b5a9-44eea62aa731" providerId="ADAL" clId="{9681DBBF-CC28-48CE-8222-BE1E4CADF4A4}" dt="2024-06-26T07:57:46.971" v="4455" actId="1036"/>
+          <ac:spMkLst>
+            <pc:docMk/>
+            <pc:sldMk cId="1151215240" sldId="256"/>
+            <ac:spMk id="2" creationId="{0D4BB213-6FE1-8198-C42C-A8875D1980C8}"/>
+          </ac:spMkLst>
+        </pc:spChg>
+        <pc:spChg chg="mod">
+          <ac:chgData name="Fiechter Sebastian (IT-PTR-EXT-EXT2 - Extern)" userId="f23e6d81-0328-4361-b5a9-44eea62aa731" providerId="ADAL" clId="{9681DBBF-CC28-48CE-8222-BE1E4CADF4A4}" dt="2024-06-26T07:57:34.718" v="4439" actId="1035"/>
+          <ac:spMkLst>
+            <pc:docMk/>
+            <pc:sldMk cId="1151215240" sldId="256"/>
+            <ac:spMk id="4" creationId="{BFEAC6CC-25BE-AB92-19CC-72B263E07EFB}"/>
+          </ac:spMkLst>
+        </pc:spChg>
+        <pc:spChg chg="mod ord">
+          <ac:chgData name="Fiechter Sebastian (IT-PTR-EXT-EXT2 - Extern)" userId="f23e6d81-0328-4361-b5a9-44eea62aa731" providerId="ADAL" clId="{9681DBBF-CC28-48CE-8222-BE1E4CADF4A4}" dt="2024-06-26T07:58:43.571" v="4461" actId="14100"/>
+          <ac:spMkLst>
+            <pc:docMk/>
+            <pc:sldMk cId="1151215240" sldId="256"/>
+            <ac:spMk id="5" creationId="{24EFB557-61FB-E9A9-2C4B-35729A86A8D4}"/>
+          </ac:spMkLst>
+        </pc:spChg>
+        <pc:spChg chg="mod">
+          <ac:chgData name="Fiechter Sebastian (IT-PTR-EXT-EXT2 - Extern)" userId="f23e6d81-0328-4361-b5a9-44eea62aa731" providerId="ADAL" clId="{9681DBBF-CC28-48CE-8222-BE1E4CADF4A4}" dt="2024-06-24T14:27:04.020" v="2225" actId="14100"/>
+          <ac:spMkLst>
+            <pc:docMk/>
+            <pc:sldMk cId="1151215240" sldId="256"/>
+            <ac:spMk id="6" creationId="{CBCB821D-6740-D326-5B8E-71AE9ECB6231}"/>
+          </ac:spMkLst>
+        </pc:spChg>
+        <pc:spChg chg="add mod">
+          <ac:chgData name="Fiechter Sebastian (IT-PTR-EXT-EXT2 - Extern)" userId="f23e6d81-0328-4361-b5a9-44eea62aa731" providerId="ADAL" clId="{9681DBBF-CC28-48CE-8222-BE1E4CADF4A4}" dt="2024-07-18T06:25:07.173" v="5606" actId="207"/>
+          <ac:spMkLst>
+            <pc:docMk/>
+            <pc:sldMk cId="1151215240" sldId="256"/>
+            <ac:spMk id="7" creationId="{779D5018-02DA-9DE5-B0E0-805389799496}"/>
+          </ac:spMkLst>
+        </pc:spChg>
+        <pc:spChg chg="add mod">
+          <ac:chgData name="Fiechter Sebastian (IT-PTR-EXT-EXT2 - Extern)" userId="f23e6d81-0328-4361-b5a9-44eea62aa731" providerId="ADAL" clId="{9681DBBF-CC28-48CE-8222-BE1E4CADF4A4}" dt="2024-07-15T12:06:20.143" v="5134" actId="20577"/>
+          <ac:spMkLst>
+            <pc:docMk/>
+            <pc:sldMk cId="1151215240" sldId="256"/>
+            <ac:spMk id="9" creationId="{5D43096F-1256-D613-1EE9-D843B8551845}"/>
+          </ac:spMkLst>
+        </pc:spChg>
+        <pc:spChg chg="add del mod">
+          <ac:chgData name="Fiechter Sebastian (IT-PTR-EXT-EXT2 - Extern)" userId="f23e6d81-0328-4361-b5a9-44eea62aa731" providerId="ADAL" clId="{9681DBBF-CC28-48CE-8222-BE1E4CADF4A4}" dt="2024-06-24T13:01:01.042" v="32" actId="1076"/>
+          <ac:spMkLst>
+            <pc:docMk/>
+            <pc:sldMk cId="1151215240" sldId="256"/>
+            <ac:spMk id="11" creationId="{404E8FDE-E04D-BD76-8C11-8BA3CBEFF5CC}"/>
+          </ac:spMkLst>
+        </pc:spChg>
+        <pc:spChg chg="add mod">
+          <ac:chgData name="Fiechter Sebastian (IT-PTR-EXT-EXT2 - Extern)" userId="f23e6d81-0328-4361-b5a9-44eea62aa731" providerId="ADAL" clId="{9681DBBF-CC28-48CE-8222-BE1E4CADF4A4}" dt="2024-07-15T12:06:24.656" v="5138" actId="20577"/>
+          <ac:spMkLst>
+            <pc:docMk/>
+            <pc:sldMk cId="1151215240" sldId="256"/>
+            <ac:spMk id="11" creationId="{728355F5-BEF2-7B62-26CC-EFB7F5CAA42E}"/>
+          </ac:spMkLst>
+        </pc:spChg>
+        <pc:spChg chg="add mod">
+          <ac:chgData name="Fiechter Sebastian (IT-PTR-EXT-EXT2 - Extern)" userId="f23e6d81-0328-4361-b5a9-44eea62aa731" providerId="ADAL" clId="{9681DBBF-CC28-48CE-8222-BE1E4CADF4A4}" dt="2024-07-15T12:06:34.495" v="5145" actId="20577"/>
+          <ac:spMkLst>
+            <pc:docMk/>
+            <pc:sldMk cId="1151215240" sldId="256"/>
+            <ac:spMk id="12" creationId="{5D67503D-1BD9-A5D7-9E41-3A6FEA8798FD}"/>
+          </ac:spMkLst>
+        </pc:spChg>
+        <pc:spChg chg="add mod">
+          <ac:chgData name="Fiechter Sebastian (IT-PTR-EXT-EXT2 - Extern)" userId="f23e6d81-0328-4361-b5a9-44eea62aa731" providerId="ADAL" clId="{9681DBBF-CC28-48CE-8222-BE1E4CADF4A4}" dt="2024-07-15T12:07:12.688" v="5160" actId="20577"/>
+          <ac:spMkLst>
+            <pc:docMk/>
+            <pc:sldMk cId="1151215240" sldId="256"/>
+            <ac:spMk id="13" creationId="{071D530C-5F4E-1CAF-1C1A-3CA3CA83FF44}"/>
+          </ac:spMkLst>
+        </pc:spChg>
+        <pc:spChg chg="add mod">
+          <ac:chgData name="Fiechter Sebastian (IT-PTR-EXT-EXT2 - Extern)" userId="f23e6d81-0328-4361-b5a9-44eea62aa731" providerId="ADAL" clId="{9681DBBF-CC28-48CE-8222-BE1E4CADF4A4}" dt="2024-06-26T07:57:46.971" v="4455" actId="1036"/>
+          <ac:spMkLst>
+            <pc:docMk/>
+            <pc:sldMk cId="1151215240" sldId="256"/>
+            <ac:spMk id="16" creationId="{D56BD2C7-7005-2E87-4962-3232F326F316}"/>
+          </ac:spMkLst>
+        </pc:spChg>
+        <pc:spChg chg="del mod">
+          <ac:chgData name="Fiechter Sebastian (IT-PTR-EXT-EXT2 - Extern)" userId="f23e6d81-0328-4361-b5a9-44eea62aa731" providerId="ADAL" clId="{9681DBBF-CC28-48CE-8222-BE1E4CADF4A4}" dt="2024-06-24T13:08:25.758" v="288" actId="478"/>
+          <ac:spMkLst>
+            <pc:docMk/>
+            <pc:sldMk cId="1151215240" sldId="256"/>
+            <ac:spMk id="16" creationId="{EBA45FFE-3925-80AB-B103-21534C37BB83}"/>
+          </ac:spMkLst>
+        </pc:spChg>
+        <pc:spChg chg="mod">
+          <ac:chgData name="Fiechter Sebastian (IT-PTR-EXT-EXT2 - Extern)" userId="f23e6d81-0328-4361-b5a9-44eea62aa731" providerId="ADAL" clId="{9681DBBF-CC28-48CE-8222-BE1E4CADF4A4}" dt="2024-06-24T14:26:59.956" v="2224" actId="14100"/>
+          <ac:spMkLst>
+            <pc:docMk/>
+            <pc:sldMk cId="1151215240" sldId="256"/>
+            <ac:spMk id="20" creationId="{A97B6C5E-6AFB-F969-3ADF-74ABAAD650A0}"/>
+          </ac:spMkLst>
+        </pc:spChg>
+        <pc:spChg chg="mod">
+          <ac:chgData name="Fiechter Sebastian (IT-PTR-EXT-EXT2 - Extern)" userId="f23e6d81-0328-4361-b5a9-44eea62aa731" providerId="ADAL" clId="{9681DBBF-CC28-48CE-8222-BE1E4CADF4A4}" dt="2024-07-15T11:40:09.635" v="5131" actId="207"/>
+          <ac:spMkLst>
+            <pc:docMk/>
+            <pc:sldMk cId="1151215240" sldId="256"/>
+            <ac:spMk id="24" creationId="{ABF0390A-817A-4BE9-51E9-85DC7D74B4FD}"/>
+          </ac:spMkLst>
+        </pc:spChg>
+        <pc:spChg chg="mod">
+          <ac:chgData name="Fiechter Sebastian (IT-PTR-EXT-EXT2 - Extern)" userId="f23e6d81-0328-4361-b5a9-44eea62aa731" providerId="ADAL" clId="{9681DBBF-CC28-48CE-8222-BE1E4CADF4A4}" dt="2024-06-24T15:05:29.007" v="3224" actId="207"/>
+          <ac:spMkLst>
+            <pc:docMk/>
+            <pc:sldMk cId="1151215240" sldId="256"/>
+            <ac:spMk id="28" creationId="{5EE31C42-18D7-6D0A-796D-30F478865109}"/>
+          </ac:spMkLst>
+        </pc:spChg>
+        <pc:spChg chg="mod">
+          <ac:chgData name="Fiechter Sebastian (IT-PTR-EXT-EXT2 - Extern)" userId="f23e6d81-0328-4361-b5a9-44eea62aa731" providerId="ADAL" clId="{9681DBBF-CC28-48CE-8222-BE1E4CADF4A4}" dt="2024-06-24T15:05:29.007" v="3224" actId="207"/>
+          <ac:spMkLst>
+            <pc:docMk/>
+            <pc:sldMk cId="1151215240" sldId="256"/>
+            <ac:spMk id="32" creationId="{265F4B7A-9649-6F6D-F41C-AEFE7C3ED77C}"/>
+          </ac:spMkLst>
+        </pc:spChg>
+        <pc:spChg chg="mod">
+          <ac:chgData name="Fiechter Sebastian (IT-PTR-EXT-EXT2 - Extern)" userId="f23e6d81-0328-4361-b5a9-44eea62aa731" providerId="ADAL" clId="{9681DBBF-CC28-48CE-8222-BE1E4CADF4A4}" dt="2024-06-24T14:27:22.739" v="2229" actId="14100"/>
+          <ac:spMkLst>
+            <pc:docMk/>
+            <pc:sldMk cId="1151215240" sldId="256"/>
+            <ac:spMk id="36" creationId="{E9B7E3CE-C4EC-1BAE-CE4A-5E1B87A8E6C9}"/>
+          </ac:spMkLst>
+        </pc:spChg>
+        <pc:spChg chg="mod">
+          <ac:chgData name="Fiechter Sebastian (IT-PTR-EXT-EXT2 - Extern)" userId="f23e6d81-0328-4361-b5a9-44eea62aa731" providerId="ADAL" clId="{9681DBBF-CC28-48CE-8222-BE1E4CADF4A4}" dt="2024-06-24T15:05:29.007" v="3224" actId="207"/>
+          <ac:spMkLst>
+            <pc:docMk/>
+            <pc:sldMk cId="1151215240" sldId="256"/>
+            <ac:spMk id="40" creationId="{2576F466-8A27-0A7E-AA24-FA202E87B71B}"/>
+          </ac:spMkLst>
+        </pc:spChg>
+        <pc:spChg chg="mod">
+          <ac:chgData name="Fiechter Sebastian (IT-PTR-EXT-EXT2 - Extern)" userId="f23e6d81-0328-4361-b5a9-44eea62aa731" providerId="ADAL" clId="{9681DBBF-CC28-48CE-8222-BE1E4CADF4A4}" dt="2024-06-24T14:27:30.758" v="2231" actId="14100"/>
+          <ac:spMkLst>
+            <pc:docMk/>
+            <pc:sldMk cId="1151215240" sldId="256"/>
+            <ac:spMk id="44" creationId="{348194DB-0126-807A-0ABB-463196A295E9}"/>
+          </ac:spMkLst>
+        </pc:spChg>
+        <pc:spChg chg="mod">
+          <ac:chgData name="Fiechter Sebastian (IT-PTR-EXT-EXT2 - Extern)" userId="f23e6d81-0328-4361-b5a9-44eea62aa731" providerId="ADAL" clId="{9681DBBF-CC28-48CE-8222-BE1E4CADF4A4}" dt="2024-07-15T10:06:07.349" v="4904" actId="207"/>
+          <ac:spMkLst>
+            <pc:docMk/>
+            <pc:sldMk cId="1151215240" sldId="256"/>
+            <ac:spMk id="48" creationId="{F7797959-86BB-C3AB-479A-060A45706B32}"/>
+          </ac:spMkLst>
+        </pc:spChg>
+        <pc:spChg chg="mod">
+          <ac:chgData name="Fiechter Sebastian (IT-PTR-EXT-EXT2 - Extern)" userId="f23e6d81-0328-4361-b5a9-44eea62aa731" providerId="ADAL" clId="{9681DBBF-CC28-48CE-8222-BE1E4CADF4A4}" dt="2024-07-15T14:32:15.215" v="5271" actId="6549"/>
+          <ac:spMkLst>
+            <pc:docMk/>
+            <pc:sldMk cId="1151215240" sldId="256"/>
+            <ac:spMk id="52" creationId="{A5A579D4-80F3-3395-C6D5-7EEA83C126A3}"/>
+          </ac:spMkLst>
+        </pc:spChg>
+        <pc:spChg chg="mod">
+          <ac:chgData name="Fiechter Sebastian (IT-PTR-EXT-EXT2 - Extern)" userId="f23e6d81-0328-4361-b5a9-44eea62aa731" providerId="ADAL" clId="{9681DBBF-CC28-48CE-8222-BE1E4CADF4A4}" dt="2024-06-24T15:05:29.007" v="3224" actId="207"/>
+          <ac:spMkLst>
+            <pc:docMk/>
+            <pc:sldMk cId="1151215240" sldId="256"/>
+            <ac:spMk id="56" creationId="{272D621F-2FBC-BD66-E2D7-734DB06F955F}"/>
+          </ac:spMkLst>
+        </pc:spChg>
+        <pc:spChg chg="add mod">
+          <ac:chgData name="Fiechter Sebastian (IT-PTR-EXT-EXT2 - Extern)" userId="f23e6d81-0328-4361-b5a9-44eea62aa731" providerId="ADAL" clId="{9681DBBF-CC28-48CE-8222-BE1E4CADF4A4}" dt="2024-06-26T07:57:34.718" v="4439" actId="1035"/>
+          <ac:spMkLst>
+            <pc:docMk/>
+            <pc:sldMk cId="1151215240" sldId="256"/>
+            <ac:spMk id="59" creationId="{6C0FA560-CBD3-3253-E0E2-645F9341A85D}"/>
+          </ac:spMkLst>
+        </pc:spChg>
+        <pc:spChg chg="add mod">
+          <ac:chgData name="Fiechter Sebastian (IT-PTR-EXT-EXT2 - Extern)" userId="f23e6d81-0328-4361-b5a9-44eea62aa731" providerId="ADAL" clId="{9681DBBF-CC28-48CE-8222-BE1E4CADF4A4}" dt="2024-06-26T07:57:34.718" v="4439" actId="1035"/>
+          <ac:spMkLst>
+            <pc:docMk/>
+            <pc:sldMk cId="1151215240" sldId="256"/>
+            <ac:spMk id="60" creationId="{1BD29887-709F-7F65-4E9A-97C54C7800D9}"/>
+          </ac:spMkLst>
+        </pc:spChg>
+        <pc:spChg chg="add mod">
+          <ac:chgData name="Fiechter Sebastian (IT-PTR-EXT-EXT2 - Extern)" userId="f23e6d81-0328-4361-b5a9-44eea62aa731" providerId="ADAL" clId="{9681DBBF-CC28-48CE-8222-BE1E4CADF4A4}" dt="2024-06-26T07:57:34.718" v="4439" actId="1035"/>
+          <ac:spMkLst>
+            <pc:docMk/>
+            <pc:sldMk cId="1151215240" sldId="256"/>
+            <ac:spMk id="61" creationId="{4AE48C32-AC3E-9487-AEFF-37665D022A7F}"/>
+          </ac:spMkLst>
+        </pc:spChg>
+        <pc:spChg chg="add mod">
+          <ac:chgData name="Fiechter Sebastian (IT-PTR-EXT-EXT2 - Extern)" userId="f23e6d81-0328-4361-b5a9-44eea62aa731" providerId="ADAL" clId="{9681DBBF-CC28-48CE-8222-BE1E4CADF4A4}" dt="2024-06-26T07:57:46.971" v="4455" actId="1036"/>
+          <ac:spMkLst>
+            <pc:docMk/>
+            <pc:sldMk cId="1151215240" sldId="256"/>
+            <ac:spMk id="62" creationId="{31281033-19C7-C1F9-B693-F9749B7E8173}"/>
+          </ac:spMkLst>
+        </pc:spChg>
+        <pc:spChg chg="mod">
+          <ac:chgData name="Fiechter Sebastian (IT-PTR-EXT-EXT2 - Extern)" userId="f23e6d81-0328-4361-b5a9-44eea62aa731" providerId="ADAL" clId="{9681DBBF-CC28-48CE-8222-BE1E4CADF4A4}" dt="2024-06-24T13:31:39.003" v="1155" actId="20577"/>
+          <ac:spMkLst>
+            <pc:docMk/>
+            <pc:sldMk cId="1151215240" sldId="256"/>
+            <ac:spMk id="63" creationId="{672D0994-B26C-6444-42A2-E663CC762DB0}"/>
+          </ac:spMkLst>
+        </pc:spChg>
+        <pc:spChg chg="add mod">
+          <ac:chgData name="Fiechter Sebastian (IT-PTR-EXT-EXT2 - Extern)" userId="f23e6d81-0328-4361-b5a9-44eea62aa731" providerId="ADAL" clId="{9681DBBF-CC28-48CE-8222-BE1E4CADF4A4}" dt="2024-06-26T07:57:46.971" v="4455" actId="1036"/>
+          <ac:spMkLst>
+            <pc:docMk/>
+            <pc:sldMk cId="1151215240" sldId="256"/>
+            <ac:spMk id="63" creationId="{B8E8E110-F7F3-FFA2-CE7D-34A9D2AA0B80}"/>
+          </ac:spMkLst>
+        </pc:spChg>
+        <pc:spChg chg="add mod">
+          <ac:chgData name="Fiechter Sebastian (IT-PTR-EXT-EXT2 - Extern)" userId="f23e6d81-0328-4361-b5a9-44eea62aa731" providerId="ADAL" clId="{9681DBBF-CC28-48CE-8222-BE1E4CADF4A4}" dt="2024-07-15T14:37:24.773" v="5409" actId="14100"/>
+          <ac:spMkLst>
+            <pc:docMk/>
+            <pc:sldMk cId="1151215240" sldId="256"/>
+            <ac:spMk id="64" creationId="{2000120B-9442-2E8F-46B2-4327946FACA2}"/>
+          </ac:spMkLst>
+        </pc:spChg>
+        <pc:spChg chg="add mod">
+          <ac:chgData name="Fiechter Sebastian (IT-PTR-EXT-EXT2 - Extern)" userId="f23e6d81-0328-4361-b5a9-44eea62aa731" providerId="ADAL" clId="{9681DBBF-CC28-48CE-8222-BE1E4CADF4A4}" dt="2024-07-15T14:36:33.604" v="5387" actId="20577"/>
+          <ac:spMkLst>
+            <pc:docMk/>
+            <pc:sldMk cId="1151215240" sldId="256"/>
+            <ac:spMk id="65" creationId="{7F555871-FC67-799D-C5F1-AC181D63A124}"/>
+          </ac:spMkLst>
+        </pc:spChg>
+        <pc:spChg chg="add mod">
+          <ac:chgData name="Fiechter Sebastian (IT-PTR-EXT-EXT2 - Extern)" userId="f23e6d81-0328-4361-b5a9-44eea62aa731" providerId="ADAL" clId="{9681DBBF-CC28-48CE-8222-BE1E4CADF4A4}" dt="2024-07-15T14:37:21.568" v="5408" actId="14100"/>
+          <ac:spMkLst>
+            <pc:docMk/>
+            <pc:sldMk cId="1151215240" sldId="256"/>
+            <ac:spMk id="66" creationId="{B672839B-34A8-4F87-679B-5E13FBA3D450}"/>
+          </ac:spMkLst>
+        </pc:spChg>
+        <pc:spChg chg="mod">
+          <ac:chgData name="Fiechter Sebastian (IT-PTR-EXT-EXT2 - Extern)" userId="f23e6d81-0328-4361-b5a9-44eea62aa731" providerId="ADAL" clId="{9681DBBF-CC28-48CE-8222-BE1E4CADF4A4}" dt="2024-06-24T13:40:26.335" v="1291" actId="20577"/>
+          <ac:spMkLst>
+            <pc:docMk/>
+            <pc:sldMk cId="1151215240" sldId="256"/>
+            <ac:spMk id="67" creationId="{1817FC0A-ED5F-5117-7927-6B5B8AB9FDDC}"/>
+          </ac:spMkLst>
+        </pc:spChg>
+        <pc:spChg chg="add del">
+          <ac:chgData name="Fiechter Sebastian (IT-PTR-EXT-EXT2 - Extern)" userId="f23e6d81-0328-4361-b5a9-44eea62aa731" providerId="ADAL" clId="{9681DBBF-CC28-48CE-8222-BE1E4CADF4A4}" dt="2024-07-16T14:38:52.785" v="5578" actId="22"/>
+          <ac:spMkLst>
+            <pc:docMk/>
+            <pc:sldMk cId="1151215240" sldId="256"/>
+            <ac:spMk id="68" creationId="{6D3191BE-1327-D0AE-BFA9-53E0EB4A32CF}"/>
+          </ac:spMkLst>
+        </pc:spChg>
+        <pc:spChg chg="add mod">
+          <ac:chgData name="Fiechter Sebastian (IT-PTR-EXT-EXT2 - Extern)" userId="f23e6d81-0328-4361-b5a9-44eea62aa731" providerId="ADAL" clId="{9681DBBF-CC28-48CE-8222-BE1E4CADF4A4}" dt="2024-07-16T14:39:56.248" v="5586" actId="6549"/>
+          <ac:spMkLst>
+            <pc:docMk/>
+            <pc:sldMk cId="1151215240" sldId="256"/>
+            <ac:spMk id="70" creationId="{42697A38-BA43-BB46-0E29-AE20908BE8DA}"/>
+          </ac:spMkLst>
+        </pc:spChg>
+        <pc:spChg chg="add mod">
+          <ac:chgData name="Fiechter Sebastian (IT-PTR-EXT-EXT2 - Extern)" userId="f23e6d81-0328-4361-b5a9-44eea62aa731" providerId="ADAL" clId="{9681DBBF-CC28-48CE-8222-BE1E4CADF4A4}" dt="2024-06-24T13:34:50.820" v="1223" actId="1076"/>
+          <ac:spMkLst>
+            <pc:docMk/>
+            <pc:sldMk cId="1151215240" sldId="256"/>
+            <ac:spMk id="70" creationId="{655A2B98-99A8-BE16-4FEC-ADB070587880}"/>
+          </ac:spMkLst>
+        </pc:spChg>
+        <pc:spChg chg="mod">
+          <ac:chgData name="Fiechter Sebastian (IT-PTR-EXT-EXT2 - Extern)" userId="f23e6d81-0328-4361-b5a9-44eea62aa731" providerId="ADAL" clId="{9681DBBF-CC28-48CE-8222-BE1E4CADF4A4}" dt="2024-06-24T13:40:24.441" v="1289" actId="20577"/>
+          <ac:spMkLst>
+            <pc:docMk/>
+            <pc:sldMk cId="1151215240" sldId="256"/>
+            <ac:spMk id="72" creationId="{C048BDAB-5AF5-AC08-E237-9724D2B8CE6E}"/>
+          </ac:spMkLst>
+        </pc:spChg>
+        <pc:spChg chg="mod">
+          <ac:chgData name="Fiechter Sebastian (IT-PTR-EXT-EXT2 - Extern)" userId="f23e6d81-0328-4361-b5a9-44eea62aa731" providerId="ADAL" clId="{9681DBBF-CC28-48CE-8222-BE1E4CADF4A4}" dt="2024-06-24T14:44:52.731" v="2606" actId="1076"/>
+          <ac:spMkLst>
+            <pc:docMk/>
+            <pc:sldMk cId="1151215240" sldId="256"/>
+            <ac:spMk id="76" creationId="{B5EA4DD9-1510-6FCA-2FCE-E5335629C5D7}"/>
+          </ac:spMkLst>
+        </pc:spChg>
+        <pc:spChg chg="add mod">
+          <ac:chgData name="Fiechter Sebastian (IT-PTR-EXT-EXT2 - Extern)" userId="f23e6d81-0328-4361-b5a9-44eea62aa731" providerId="ADAL" clId="{9681DBBF-CC28-48CE-8222-BE1E4CADF4A4}" dt="2024-06-26T07:57:34.718" v="4439" actId="1035"/>
+          <ac:spMkLst>
+            <pc:docMk/>
+            <pc:sldMk cId="1151215240" sldId="256"/>
+            <ac:spMk id="79" creationId="{8A127E72-E4D2-9AE9-5EB9-3E20647E9123}"/>
+          </ac:spMkLst>
+        </pc:spChg>
+        <pc:spChg chg="add mod">
+          <ac:chgData name="Fiechter Sebastian (IT-PTR-EXT-EXT2 - Extern)" userId="f23e6d81-0328-4361-b5a9-44eea62aa731" providerId="ADAL" clId="{9681DBBF-CC28-48CE-8222-BE1E4CADF4A4}" dt="2024-06-26T07:57:34.718" v="4439" actId="1035"/>
+          <ac:spMkLst>
+            <pc:docMk/>
+            <pc:sldMk cId="1151215240" sldId="256"/>
+            <ac:spMk id="80" creationId="{86522A0C-7CE1-6D32-8167-6C46128E6E53}"/>
+          </ac:spMkLst>
+        </pc:spChg>
+        <pc:spChg chg="add mod">
+          <ac:chgData name="Fiechter Sebastian (IT-PTR-EXT-EXT2 - Extern)" userId="f23e6d81-0328-4361-b5a9-44eea62aa731" providerId="ADAL" clId="{9681DBBF-CC28-48CE-8222-BE1E4CADF4A4}" dt="2024-06-26T07:57:34.718" v="4439" actId="1035"/>
+          <ac:spMkLst>
+            <pc:docMk/>
+            <pc:sldMk cId="1151215240" sldId="256"/>
+            <ac:spMk id="81" creationId="{3D1670B7-C724-71E1-36B6-2B32249B4A09}"/>
+          </ac:spMkLst>
+        </pc:spChg>
+        <pc:spChg chg="add mod">
+          <ac:chgData name="Fiechter Sebastian (IT-PTR-EXT-EXT2 - Extern)" userId="f23e6d81-0328-4361-b5a9-44eea62aa731" providerId="ADAL" clId="{9681DBBF-CC28-48CE-8222-BE1E4CADF4A4}" dt="2024-06-26T07:57:34.718" v="4439" actId="1035"/>
+          <ac:spMkLst>
+            <pc:docMk/>
+            <pc:sldMk cId="1151215240" sldId="256"/>
+            <ac:spMk id="82" creationId="{5C4CFF8B-D577-51E4-4421-7C6C33F5AF7E}"/>
+          </ac:spMkLst>
+        </pc:spChg>
+        <pc:spChg chg="add mod">
+          <ac:chgData name="Fiechter Sebastian (IT-PTR-EXT-EXT2 - Extern)" userId="f23e6d81-0328-4361-b5a9-44eea62aa731" providerId="ADAL" clId="{9681DBBF-CC28-48CE-8222-BE1E4CADF4A4}" dt="2024-06-26T07:57:34.718" v="4439" actId="1035"/>
+          <ac:spMkLst>
+            <pc:docMk/>
+            <pc:sldMk cId="1151215240" sldId="256"/>
+            <ac:spMk id="83" creationId="{CB0ADF76-01A1-8717-FD4D-50A122E421C7}"/>
+          </ac:spMkLst>
+        </pc:spChg>
+        <pc:spChg chg="add mod">
+          <ac:chgData name="Fiechter Sebastian (IT-PTR-EXT-EXT2 - Extern)" userId="f23e6d81-0328-4361-b5a9-44eea62aa731" providerId="ADAL" clId="{9681DBBF-CC28-48CE-8222-BE1E4CADF4A4}" dt="2024-06-26T07:57:34.718" v="4439" actId="1035"/>
+          <ac:spMkLst>
+            <pc:docMk/>
+            <pc:sldMk cId="1151215240" sldId="256"/>
+            <ac:spMk id="84" creationId="{4F40E1C0-6A3E-6E05-7B9A-783CD78F41FF}"/>
+          </ac:spMkLst>
+        </pc:spChg>
+        <pc:spChg chg="add mod">
+          <ac:chgData name="Fiechter Sebastian (IT-PTR-EXT-EXT2 - Extern)" userId="f23e6d81-0328-4361-b5a9-44eea62aa731" providerId="ADAL" clId="{9681DBBF-CC28-48CE-8222-BE1E4CADF4A4}" dt="2024-06-26T07:57:34.718" v="4439" actId="1035"/>
+          <ac:spMkLst>
+            <pc:docMk/>
+            <pc:sldMk cId="1151215240" sldId="256"/>
+            <ac:spMk id="85" creationId="{4D21AF21-99C3-158E-A860-341CDB11186D}"/>
+          </ac:spMkLst>
+        </pc:spChg>
+        <pc:spChg chg="add mod ord">
+          <ac:chgData name="Fiechter Sebastian (IT-PTR-EXT-EXT2 - Extern)" userId="f23e6d81-0328-4361-b5a9-44eea62aa731" providerId="ADAL" clId="{9681DBBF-CC28-48CE-8222-BE1E4CADF4A4}" dt="2024-06-26T07:57:34.718" v="4439" actId="1035"/>
+          <ac:spMkLst>
+            <pc:docMk/>
+            <pc:sldMk cId="1151215240" sldId="256"/>
+            <ac:spMk id="86" creationId="{4999556B-8817-BAB0-FBCB-D0128EEB7849}"/>
+          </ac:spMkLst>
+        </pc:spChg>
+        <pc:spChg chg="add del mod">
+          <ac:chgData name="Fiechter Sebastian (IT-PTR-EXT-EXT2 - Extern)" userId="f23e6d81-0328-4361-b5a9-44eea62aa731" providerId="ADAL" clId="{9681DBBF-CC28-48CE-8222-BE1E4CADF4A4}" dt="2024-06-26T07:57:34.718" v="4439" actId="1035"/>
+          <ac:spMkLst>
+            <pc:docMk/>
+            <pc:sldMk cId="1151215240" sldId="256"/>
+            <ac:spMk id="87" creationId="{CC15B194-85DE-A5AA-6DE5-6BD1ABFB35D1}"/>
+          </ac:spMkLst>
+        </pc:spChg>
+        <pc:spChg chg="add mod ord">
+          <ac:chgData name="Fiechter Sebastian (IT-PTR-EXT-EXT2 - Extern)" userId="f23e6d81-0328-4361-b5a9-44eea62aa731" providerId="ADAL" clId="{9681DBBF-CC28-48CE-8222-BE1E4CADF4A4}" dt="2024-06-26T07:57:34.718" v="4439" actId="1035"/>
+          <ac:spMkLst>
+            <pc:docMk/>
+            <pc:sldMk cId="1151215240" sldId="256"/>
+            <ac:spMk id="88" creationId="{C0CB8B89-3A69-2DA5-EC0F-5A47BC3DEDC1}"/>
+          </ac:spMkLst>
+        </pc:spChg>
+        <pc:spChg chg="add mod">
+          <ac:chgData name="Fiechter Sebastian (IT-PTR-EXT-EXT2 - Extern)" userId="f23e6d81-0328-4361-b5a9-44eea62aa731" providerId="ADAL" clId="{9681DBBF-CC28-48CE-8222-BE1E4CADF4A4}" dt="2024-06-26T07:57:34.718" v="4439" actId="1035"/>
+          <ac:spMkLst>
+            <pc:docMk/>
+            <pc:sldMk cId="1151215240" sldId="256"/>
+            <ac:spMk id="89" creationId="{4B69AC86-1F63-ACF6-0128-CDB158059353}"/>
+          </ac:spMkLst>
+        </pc:spChg>
+        <pc:spChg chg="add mod">
+          <ac:chgData name="Fiechter Sebastian (IT-PTR-EXT-EXT2 - Extern)" userId="f23e6d81-0328-4361-b5a9-44eea62aa731" providerId="ADAL" clId="{9681DBBF-CC28-48CE-8222-BE1E4CADF4A4}" dt="2024-06-26T07:57:34.718" v="4439" actId="1035"/>
+          <ac:spMkLst>
+            <pc:docMk/>
+            <pc:sldMk cId="1151215240" sldId="256"/>
+            <ac:spMk id="90" creationId="{8A089B93-3AD1-57F2-EA47-3A3A75476B9A}"/>
+          </ac:spMkLst>
+        </pc:spChg>
+        <pc:spChg chg="add mod">
+          <ac:chgData name="Fiechter Sebastian (IT-PTR-EXT-EXT2 - Extern)" userId="f23e6d81-0328-4361-b5a9-44eea62aa731" providerId="ADAL" clId="{9681DBBF-CC28-48CE-8222-BE1E4CADF4A4}" dt="2024-06-26T07:57:34.718" v="4439" actId="1035"/>
+          <ac:spMkLst>
+            <pc:docMk/>
+            <pc:sldMk cId="1151215240" sldId="256"/>
+            <ac:spMk id="91" creationId="{03A82B69-6CEF-7329-D404-A208D2EE4FC5}"/>
+          </ac:spMkLst>
+        </pc:spChg>
+        <pc:spChg chg="add mod">
+          <ac:chgData name="Fiechter Sebastian (IT-PTR-EXT-EXT2 - Extern)" userId="f23e6d81-0328-4361-b5a9-44eea62aa731" providerId="ADAL" clId="{9681DBBF-CC28-48CE-8222-BE1E4CADF4A4}" dt="2024-06-26T07:57:34.718" v="4439" actId="1035"/>
+          <ac:spMkLst>
+            <pc:docMk/>
+            <pc:sldMk cId="1151215240" sldId="256"/>
+            <ac:spMk id="92" creationId="{680CA85C-3361-D293-D8EE-27F52C230152}"/>
+          </ac:spMkLst>
+        </pc:spChg>
+        <pc:spChg chg="add del mod">
+          <ac:chgData name="Fiechter Sebastian (IT-PTR-EXT-EXT2 - Extern)" userId="f23e6d81-0328-4361-b5a9-44eea62aa731" providerId="ADAL" clId="{9681DBBF-CC28-48CE-8222-BE1E4CADF4A4}" dt="2024-06-24T13:53:27.199" v="1643" actId="478"/>
+          <ac:spMkLst>
+            <pc:docMk/>
+            <pc:sldMk cId="1151215240" sldId="256"/>
+            <ac:spMk id="93" creationId="{CAA5EC66-F9F1-4059-4902-F7CF78C1750A}"/>
+          </ac:spMkLst>
+        </pc:spChg>
+        <pc:spChg chg="add del mod">
+          <ac:chgData name="Fiechter Sebastian (IT-PTR-EXT-EXT2 - Extern)" userId="f23e6d81-0328-4361-b5a9-44eea62aa731" providerId="ADAL" clId="{9681DBBF-CC28-48CE-8222-BE1E4CADF4A4}" dt="2024-06-24T13:53:27.847" v="1644" actId="478"/>
+          <ac:spMkLst>
+            <pc:docMk/>
+            <pc:sldMk cId="1151215240" sldId="256"/>
+            <ac:spMk id="94" creationId="{9EEA1438-C90D-6ED9-CBE5-4445F702E3B7}"/>
+          </ac:spMkLst>
+        </pc:spChg>
+        <pc:spChg chg="add mod">
+          <ac:chgData name="Fiechter Sebastian (IT-PTR-EXT-EXT2 - Extern)" userId="f23e6d81-0328-4361-b5a9-44eea62aa731" providerId="ADAL" clId="{9681DBBF-CC28-48CE-8222-BE1E4CADF4A4}" dt="2024-06-28T09:04:35.552" v="4844" actId="1038"/>
+          <ac:spMkLst>
+            <pc:docMk/>
+            <pc:sldMk cId="1151215240" sldId="256"/>
+            <ac:spMk id="95" creationId="{A6BBA908-BBA9-8077-AE60-77527DF83760}"/>
+          </ac:spMkLst>
+        </pc:spChg>
+        <pc:spChg chg="add mod">
+          <ac:chgData name="Fiechter Sebastian (IT-PTR-EXT-EXT2 - Extern)" userId="f23e6d81-0328-4361-b5a9-44eea62aa731" providerId="ADAL" clId="{9681DBBF-CC28-48CE-8222-BE1E4CADF4A4}" dt="2024-06-28T09:04:35.552" v="4844" actId="1038"/>
+          <ac:spMkLst>
+            <pc:docMk/>
+            <pc:sldMk cId="1151215240" sldId="256"/>
+            <ac:spMk id="96" creationId="{4C375384-9117-7A16-5B2A-943BD89D6A1C}"/>
+          </ac:spMkLst>
+        </pc:spChg>
+        <pc:spChg chg="add mod">
+          <ac:chgData name="Fiechter Sebastian (IT-PTR-EXT-EXT2 - Extern)" userId="f23e6d81-0328-4361-b5a9-44eea62aa731" providerId="ADAL" clId="{9681DBBF-CC28-48CE-8222-BE1E4CADF4A4}" dt="2024-06-28T09:02:49.719" v="4785" actId="1076"/>
+          <ac:spMkLst>
+            <pc:docMk/>
+            <pc:sldMk cId="1151215240" sldId="256"/>
+            <ac:spMk id="97" creationId="{9E428900-841A-221D-EFC2-7F1CF80A330A}"/>
+          </ac:spMkLst>
+        </pc:spChg>
+        <pc:spChg chg="add mod">
+          <ac:chgData name="Fiechter Sebastian (IT-PTR-EXT-EXT2 - Extern)" userId="f23e6d81-0328-4361-b5a9-44eea62aa731" providerId="ADAL" clId="{9681DBBF-CC28-48CE-8222-BE1E4CADF4A4}" dt="2024-06-28T09:04:35.552" v="4844" actId="1038"/>
+          <ac:spMkLst>
+            <pc:docMk/>
+            <pc:sldMk cId="1151215240" sldId="256"/>
+            <ac:spMk id="98" creationId="{A9AC84EE-03CB-E6EE-2AEC-95E0C7E031F7}"/>
+          </ac:spMkLst>
+        </pc:spChg>
+        <pc:spChg chg="add mod">
+          <ac:chgData name="Fiechter Sebastian (IT-PTR-EXT-EXT2 - Extern)" userId="f23e6d81-0328-4361-b5a9-44eea62aa731" providerId="ADAL" clId="{9681DBBF-CC28-48CE-8222-BE1E4CADF4A4}" dt="2024-06-28T09:04:35.552" v="4844" actId="1038"/>
+          <ac:spMkLst>
+            <pc:docMk/>
+            <pc:sldMk cId="1151215240" sldId="256"/>
+            <ac:spMk id="99" creationId="{45659069-615F-E7EC-5A89-A8FFB2B1B6D1}"/>
+          </ac:spMkLst>
+        </pc:spChg>
+        <pc:spChg chg="add mod">
+          <ac:chgData name="Fiechter Sebastian (IT-PTR-EXT-EXT2 - Extern)" userId="f23e6d81-0328-4361-b5a9-44eea62aa731" providerId="ADAL" clId="{9681DBBF-CC28-48CE-8222-BE1E4CADF4A4}" dt="2024-06-28T09:04:35.552" v="4844" actId="1038"/>
+          <ac:spMkLst>
+            <pc:docMk/>
+            <pc:sldMk cId="1151215240" sldId="256"/>
+            <ac:spMk id="100" creationId="{906441AD-BB23-61E6-CDF6-43163E1BAA93}"/>
+          </ac:spMkLst>
+        </pc:spChg>
+        <pc:spChg chg="add mod">
+          <ac:chgData name="Fiechter Sebastian (IT-PTR-EXT-EXT2 - Extern)" userId="f23e6d81-0328-4361-b5a9-44eea62aa731" providerId="ADAL" clId="{9681DBBF-CC28-48CE-8222-BE1E4CADF4A4}" dt="2024-06-28T09:04:35.552" v="4844" actId="1038"/>
+          <ac:spMkLst>
+            <pc:docMk/>
+            <pc:sldMk cId="1151215240" sldId="256"/>
+            <ac:spMk id="101" creationId="{AA11313C-16BA-D24E-51C3-9018B062631E}"/>
+          </ac:spMkLst>
+        </pc:spChg>
+        <pc:spChg chg="add mod">
+          <ac:chgData name="Fiechter Sebastian (IT-PTR-EXT-EXT2 - Extern)" userId="f23e6d81-0328-4361-b5a9-44eea62aa731" providerId="ADAL" clId="{9681DBBF-CC28-48CE-8222-BE1E4CADF4A4}" dt="2024-07-15T14:32:41.049" v="5277" actId="1038"/>
+          <ac:spMkLst>
+            <pc:docMk/>
+            <pc:sldMk cId="1151215240" sldId="256"/>
+            <ac:spMk id="102" creationId="{1E7BD1D6-8D5F-8937-1246-CA2D2D8254C8}"/>
+          </ac:spMkLst>
+        </pc:spChg>
+        <pc:spChg chg="add mod">
+          <ac:chgData name="Fiechter Sebastian (IT-PTR-EXT-EXT2 - Extern)" userId="f23e6d81-0328-4361-b5a9-44eea62aa731" providerId="ADAL" clId="{9681DBBF-CC28-48CE-8222-BE1E4CADF4A4}" dt="2024-06-28T09:03:19.345" v="4786" actId="1076"/>
+          <ac:spMkLst>
+            <pc:docMk/>
+            <pc:sldMk cId="1151215240" sldId="256"/>
+            <ac:spMk id="103" creationId="{556636FB-227F-0D93-8D88-B8677C80CADE}"/>
+          </ac:spMkLst>
+        </pc:spChg>
+        <pc:spChg chg="add mod">
+          <ac:chgData name="Fiechter Sebastian (IT-PTR-EXT-EXT2 - Extern)" userId="f23e6d81-0328-4361-b5a9-44eea62aa731" providerId="ADAL" clId="{9681DBBF-CC28-48CE-8222-BE1E4CADF4A4}" dt="2024-06-28T09:02:49.719" v="4785" actId="1076"/>
+          <ac:spMkLst>
+            <pc:docMk/>
+            <pc:sldMk cId="1151215240" sldId="256"/>
+            <ac:spMk id="104" creationId="{4919E085-60A6-95C0-9328-9E1D3F0BC0C3}"/>
+          </ac:spMkLst>
+        </pc:spChg>
+        <pc:spChg chg="add mod">
+          <ac:chgData name="Fiechter Sebastian (IT-PTR-EXT-EXT2 - Extern)" userId="f23e6d81-0328-4361-b5a9-44eea62aa731" providerId="ADAL" clId="{9681DBBF-CC28-48CE-8222-BE1E4CADF4A4}" dt="2024-07-15T14:32:24.856" v="5273" actId="1037"/>
+          <ac:spMkLst>
+            <pc:docMk/>
+            <pc:sldMk cId="1151215240" sldId="256"/>
+            <ac:spMk id="105" creationId="{2134C6C8-AF30-CE0F-A708-54A5E8C2579E}"/>
+          </ac:spMkLst>
+        </pc:spChg>
+        <pc:spChg chg="add mod">
+          <ac:chgData name="Fiechter Sebastian (IT-PTR-EXT-EXT2 - Extern)" userId="f23e6d81-0328-4361-b5a9-44eea62aa731" providerId="ADAL" clId="{9681DBBF-CC28-48CE-8222-BE1E4CADF4A4}" dt="2024-06-28T09:04:35.552" v="4844" actId="1038"/>
+          <ac:spMkLst>
+            <pc:docMk/>
+            <pc:sldMk cId="1151215240" sldId="256"/>
+            <ac:spMk id="106" creationId="{59A0ECB6-CA80-2A69-7356-1B15F2C4EE6C}"/>
+          </ac:spMkLst>
+        </pc:spChg>
+        <pc:spChg chg="add mod">
+          <ac:chgData name="Fiechter Sebastian (IT-PTR-EXT-EXT2 - Extern)" userId="f23e6d81-0328-4361-b5a9-44eea62aa731" providerId="ADAL" clId="{9681DBBF-CC28-48CE-8222-BE1E4CADF4A4}" dt="2024-06-28T09:04:35.552" v="4844" actId="1038"/>
+          <ac:spMkLst>
+            <pc:docMk/>
+            <pc:sldMk cId="1151215240" sldId="256"/>
+            <ac:spMk id="107" creationId="{76273311-B2B7-1D86-EE30-77EFC4592299}"/>
+          </ac:spMkLst>
+        </pc:spChg>
+        <pc:spChg chg="add mod">
+          <ac:chgData name="Fiechter Sebastian (IT-PTR-EXT-EXT2 - Extern)" userId="f23e6d81-0328-4361-b5a9-44eea62aa731" providerId="ADAL" clId="{9681DBBF-CC28-48CE-8222-BE1E4CADF4A4}" dt="2024-06-28T09:04:35.552" v="4844" actId="1038"/>
+          <ac:spMkLst>
+            <pc:docMk/>
+            <pc:sldMk cId="1151215240" sldId="256"/>
+            <ac:spMk id="108" creationId="{37540EE6-2489-5334-C991-F086E7962D18}"/>
+          </ac:spMkLst>
+        </pc:spChg>
+        <pc:spChg chg="add mod">
+          <ac:chgData name="Fiechter Sebastian (IT-PTR-EXT-EXT2 - Extern)" userId="f23e6d81-0328-4361-b5a9-44eea62aa731" providerId="ADAL" clId="{9681DBBF-CC28-48CE-8222-BE1E4CADF4A4}" dt="2024-06-28T09:04:35.552" v="4844" actId="1038"/>
+          <ac:spMkLst>
+            <pc:docMk/>
+            <pc:sldMk cId="1151215240" sldId="256"/>
+            <ac:spMk id="109" creationId="{4594E220-51C1-FF85-D151-166622C73ABF}"/>
+          </ac:spMkLst>
+        </pc:spChg>
+        <pc:spChg chg="add mod">
+          <ac:chgData name="Fiechter Sebastian (IT-PTR-EXT-EXT2 - Extern)" userId="f23e6d81-0328-4361-b5a9-44eea62aa731" providerId="ADAL" clId="{9681DBBF-CC28-48CE-8222-BE1E4CADF4A4}" dt="2024-07-15T14:32:41.049" v="5277" actId="1038"/>
+          <ac:spMkLst>
+            <pc:docMk/>
+            <pc:sldMk cId="1151215240" sldId="256"/>
+            <ac:spMk id="110" creationId="{83EB4039-8DD1-19C5-757A-E56658A3DB13}"/>
+          </ac:spMkLst>
+        </pc:spChg>
+        <pc:spChg chg="add mod">
+          <ac:chgData name="Fiechter Sebastian (IT-PTR-EXT-EXT2 - Extern)" userId="f23e6d81-0328-4361-b5a9-44eea62aa731" providerId="ADAL" clId="{9681DBBF-CC28-48CE-8222-BE1E4CADF4A4}" dt="2024-06-28T09:03:19.345" v="4786" actId="1076"/>
+          <ac:spMkLst>
+            <pc:docMk/>
+            <pc:sldMk cId="1151215240" sldId="256"/>
+            <ac:spMk id="111" creationId="{C5D45F6C-F290-7F57-5F3C-3B774D6D1BEF}"/>
+          </ac:spMkLst>
+        </pc:spChg>
+        <pc:spChg chg="add mod">
+          <ac:chgData name="Fiechter Sebastian (IT-PTR-EXT-EXT2 - Extern)" userId="f23e6d81-0328-4361-b5a9-44eea62aa731" providerId="ADAL" clId="{9681DBBF-CC28-48CE-8222-BE1E4CADF4A4}" dt="2024-07-15T14:32:24.856" v="5273" actId="1037"/>
+          <ac:spMkLst>
+            <pc:docMk/>
+            <pc:sldMk cId="1151215240" sldId="256"/>
+            <ac:spMk id="112" creationId="{1B51D3C6-7E38-A895-14C8-199A49704A73}"/>
+          </ac:spMkLst>
+        </pc:spChg>
+        <pc:spChg chg="add mod">
+          <ac:chgData name="Fiechter Sebastian (IT-PTR-EXT-EXT2 - Extern)" userId="f23e6d81-0328-4361-b5a9-44eea62aa731" providerId="ADAL" clId="{9681DBBF-CC28-48CE-8222-BE1E4CADF4A4}" dt="2024-06-28T09:02:49.719" v="4785" actId="1076"/>
+          <ac:spMkLst>
+            <pc:docMk/>
+            <pc:sldMk cId="1151215240" sldId="256"/>
+            <ac:spMk id="113" creationId="{F4E5E1B6-E3F2-D27B-23BA-0B2CAD156597}"/>
+          </ac:spMkLst>
+        </pc:spChg>
+        <pc:spChg chg="add mod">
+          <ac:chgData name="Fiechter Sebastian (IT-PTR-EXT-EXT2 - Extern)" userId="f23e6d81-0328-4361-b5a9-44eea62aa731" providerId="ADAL" clId="{9681DBBF-CC28-48CE-8222-BE1E4CADF4A4}" dt="2024-06-26T07:57:46.971" v="4455" actId="1036"/>
+          <ac:spMkLst>
+            <pc:docMk/>
+            <pc:sldMk cId="1151215240" sldId="256"/>
+            <ac:spMk id="114" creationId="{CE4D81EF-D872-9083-3659-51955BC86EFA}"/>
+          </ac:spMkLst>
+        </pc:spChg>
+        <pc:spChg chg="add del mod">
+          <ac:chgData name="Fiechter Sebastian (IT-PTR-EXT-EXT2 - Extern)" userId="f23e6d81-0328-4361-b5a9-44eea62aa731" providerId="ADAL" clId="{9681DBBF-CC28-48CE-8222-BE1E4CADF4A4}" dt="2024-06-24T14:01:33.693" v="1776" actId="478"/>
+          <ac:spMkLst>
+            <pc:docMk/>
+            <pc:sldMk cId="1151215240" sldId="256"/>
+            <ac:spMk id="115" creationId="{1DB71EF5-C4CD-9C15-EB2B-5863C280097C}"/>
+          </ac:spMkLst>
+        </pc:spChg>
+        <pc:spChg chg="add mod">
+          <ac:chgData name="Fiechter Sebastian (IT-PTR-EXT-EXT2 - Extern)" userId="f23e6d81-0328-4361-b5a9-44eea62aa731" providerId="ADAL" clId="{9681DBBF-CC28-48CE-8222-BE1E4CADF4A4}" dt="2024-06-26T07:57:46.971" v="4455" actId="1036"/>
+          <ac:spMkLst>
+            <pc:docMk/>
+            <pc:sldMk cId="1151215240" sldId="256"/>
+            <ac:spMk id="116" creationId="{C8FDA20B-1FB9-624F-C08A-E2074BA482DD}"/>
+          </ac:spMkLst>
+        </pc:spChg>
+        <pc:spChg chg="add mod">
+          <ac:chgData name="Fiechter Sebastian (IT-PTR-EXT-EXT2 - Extern)" userId="f23e6d81-0328-4361-b5a9-44eea62aa731" providerId="ADAL" clId="{9681DBBF-CC28-48CE-8222-BE1E4CADF4A4}" dt="2024-06-26T07:57:46.971" v="4455" actId="1036"/>
+          <ac:spMkLst>
+            <pc:docMk/>
+            <pc:sldMk cId="1151215240" sldId="256"/>
+            <ac:spMk id="117" creationId="{39492428-2083-3AEE-E4EF-634306357D31}"/>
+          </ac:spMkLst>
+        </pc:spChg>
+        <pc:spChg chg="add mod">
+          <ac:chgData name="Fiechter Sebastian (IT-PTR-EXT-EXT2 - Extern)" userId="f23e6d81-0328-4361-b5a9-44eea62aa731" providerId="ADAL" clId="{9681DBBF-CC28-48CE-8222-BE1E4CADF4A4}" dt="2024-06-26T07:57:34.718" v="4439" actId="1035"/>
+          <ac:spMkLst>
+            <pc:docMk/>
+            <pc:sldMk cId="1151215240" sldId="256"/>
+            <ac:spMk id="118" creationId="{B773DC4B-6D74-B3A1-4560-70DB88A01FE9}"/>
+          </ac:spMkLst>
+        </pc:spChg>
+        <pc:spChg chg="add mod">
+          <ac:chgData name="Fiechter Sebastian (IT-PTR-EXT-EXT2 - Extern)" userId="f23e6d81-0328-4361-b5a9-44eea62aa731" providerId="ADAL" clId="{9681DBBF-CC28-48CE-8222-BE1E4CADF4A4}" dt="2024-07-15T14:33:09.915" v="5283" actId="1076"/>
+          <ac:spMkLst>
+            <pc:docMk/>
+            <pc:sldMk cId="1151215240" sldId="256"/>
+            <ac:spMk id="119" creationId="{0FCFE983-9F03-2F8B-A15B-6017497CA3C4}"/>
+          </ac:spMkLst>
+        </pc:spChg>
+        <pc:spChg chg="add mod ord">
+          <ac:chgData name="Fiechter Sebastian (IT-PTR-EXT-EXT2 - Extern)" userId="f23e6d81-0328-4361-b5a9-44eea62aa731" providerId="ADAL" clId="{9681DBBF-CC28-48CE-8222-BE1E4CADF4A4}" dt="2024-07-15T14:33:42.383" v="5300" actId="20577"/>
+          <ac:spMkLst>
+            <pc:docMk/>
+            <pc:sldMk cId="1151215240" sldId="256"/>
+            <ac:spMk id="120" creationId="{2B26E032-3A92-8E3F-1F7E-C2F9012D2FB9}"/>
+          </ac:spMkLst>
+        </pc:spChg>
+        <pc:spChg chg="add mod">
+          <ac:chgData name="Fiechter Sebastian (IT-PTR-EXT-EXT2 - Extern)" userId="f23e6d81-0328-4361-b5a9-44eea62aa731" providerId="ADAL" clId="{9681DBBF-CC28-48CE-8222-BE1E4CADF4A4}" dt="2024-07-15T14:32:50.708" v="5278" actId="14100"/>
+          <ac:spMkLst>
+            <pc:docMk/>
+            <pc:sldMk cId="1151215240" sldId="256"/>
+            <ac:spMk id="121" creationId="{F111A7AB-120F-446D-9135-D552FD034876}"/>
+          </ac:spMkLst>
+        </pc:spChg>
+        <pc:spChg chg="add mod">
+          <ac:chgData name="Fiechter Sebastian (IT-PTR-EXT-EXT2 - Extern)" userId="f23e6d81-0328-4361-b5a9-44eea62aa731" providerId="ADAL" clId="{9681DBBF-CC28-48CE-8222-BE1E4CADF4A4}" dt="2024-06-26T07:57:46.971" v="4455" actId="1036"/>
+          <ac:spMkLst>
+            <pc:docMk/>
+            <pc:sldMk cId="1151215240" sldId="256"/>
+            <ac:spMk id="122" creationId="{AF88951D-3640-18E3-45B9-EB9F0F05ECE8}"/>
+          </ac:spMkLst>
+        </pc:spChg>
+        <pc:spChg chg="add mod">
+          <ac:chgData name="Fiechter Sebastian (IT-PTR-EXT-EXT2 - Extern)" userId="f23e6d81-0328-4361-b5a9-44eea62aa731" providerId="ADAL" clId="{9681DBBF-CC28-48CE-8222-BE1E4CADF4A4}" dt="2024-06-26T07:57:34.718" v="4439" actId="1035"/>
+          <ac:spMkLst>
+            <pc:docMk/>
+            <pc:sldMk cId="1151215240" sldId="256"/>
+            <ac:spMk id="123" creationId="{1101E683-50CB-7C60-DD60-F6D83FEE8A02}"/>
+          </ac:spMkLst>
+        </pc:spChg>
+        <pc:spChg chg="add mod">
+          <ac:chgData name="Fiechter Sebastian (IT-PTR-EXT-EXT2 - Extern)" userId="f23e6d81-0328-4361-b5a9-44eea62aa731" providerId="ADAL" clId="{9681DBBF-CC28-48CE-8222-BE1E4CADF4A4}" dt="2024-06-26T07:57:34.718" v="4439" actId="1035"/>
+          <ac:spMkLst>
+            <pc:docMk/>
+            <pc:sldMk cId="1151215240" sldId="256"/>
+            <ac:spMk id="124" creationId="{19784017-5C16-7B51-9186-9207128EB74C}"/>
+          </ac:spMkLst>
+        </pc:spChg>
+        <pc:spChg chg="mod topLvl">
+          <ac:chgData name="Fiechter Sebastian (IT-PTR-EXT-EXT2 - Extern)" userId="f23e6d81-0328-4361-b5a9-44eea62aa731" providerId="ADAL" clId="{9681DBBF-CC28-48CE-8222-BE1E4CADF4A4}" dt="2024-07-15T14:40:48.853" v="5418" actId="20577"/>
+          <ac:spMkLst>
+            <pc:docMk/>
+            <pc:sldMk cId="1151215240" sldId="256"/>
+            <ac:spMk id="126" creationId="{6F3E13D2-6A2C-EA8A-512F-ADC3284BE6FE}"/>
+          </ac:spMkLst>
+        </pc:spChg>
+        <pc:spChg chg="add mod">
+          <ac:chgData name="Fiechter Sebastian (IT-PTR-EXT-EXT2 - Extern)" userId="f23e6d81-0328-4361-b5a9-44eea62aa731" providerId="ADAL" clId="{9681DBBF-CC28-48CE-8222-BE1E4CADF4A4}" dt="2024-07-15T14:41:39.054" v="5422" actId="207"/>
+          <ac:spMkLst>
+            <pc:docMk/>
+            <pc:sldMk cId="1151215240" sldId="256"/>
+            <ac:spMk id="129" creationId="{64919A96-6BCA-CF6A-B8C2-F047D1A17D9B}"/>
+          </ac:spMkLst>
+        </pc:spChg>
+        <pc:spChg chg="add mod">
+          <ac:chgData name="Fiechter Sebastian (IT-PTR-EXT-EXT2 - Extern)" userId="f23e6d81-0328-4361-b5a9-44eea62aa731" providerId="ADAL" clId="{9681DBBF-CC28-48CE-8222-BE1E4CADF4A4}" dt="2024-07-15T14:41:39.054" v="5422" actId="207"/>
+          <ac:spMkLst>
+            <pc:docMk/>
+            <pc:sldMk cId="1151215240" sldId="256"/>
+            <ac:spMk id="130" creationId="{D7FDE015-8719-D1FE-8ED0-440D214D4F01}"/>
+          </ac:spMkLst>
+        </pc:spChg>
+        <pc:spChg chg="add mod">
+          <ac:chgData name="Fiechter Sebastian (IT-PTR-EXT-EXT2 - Extern)" userId="f23e6d81-0328-4361-b5a9-44eea62aa731" providerId="ADAL" clId="{9681DBBF-CC28-48CE-8222-BE1E4CADF4A4}" dt="2024-07-15T14:41:39.054" v="5422" actId="207"/>
+          <ac:spMkLst>
+            <pc:docMk/>
+            <pc:sldMk cId="1151215240" sldId="256"/>
+            <ac:spMk id="131" creationId="{0667A343-4221-77F8-9EBD-C2EEDAA69E9A}"/>
+          </ac:spMkLst>
+        </pc:spChg>
+        <pc:spChg chg="add del mod">
+          <ac:chgData name="Fiechter Sebastian (IT-PTR-EXT-EXT2 - Extern)" userId="f23e6d81-0328-4361-b5a9-44eea62aa731" providerId="ADAL" clId="{9681DBBF-CC28-48CE-8222-BE1E4CADF4A4}" dt="2024-07-15T11:21:41.556" v="5065" actId="478"/>
+          <ac:spMkLst>
+            <pc:docMk/>
+            <pc:sldMk cId="1151215240" sldId="256"/>
+            <ac:spMk id="132" creationId="{E78E7932-0EB5-3168-4D4F-48C024F07439}"/>
+          </ac:spMkLst>
+        </pc:spChg>
+        <pc:spChg chg="add del mod">
+          <ac:chgData name="Fiechter Sebastian (IT-PTR-EXT-EXT2 - Extern)" userId="f23e6d81-0328-4361-b5a9-44eea62aa731" providerId="ADAL" clId="{9681DBBF-CC28-48CE-8222-BE1E4CADF4A4}" dt="2024-07-15T11:23:16.645" v="5077" actId="478"/>
+          <ac:spMkLst>
+            <pc:docMk/>
+            <pc:sldMk cId="1151215240" sldId="256"/>
+            <ac:spMk id="133" creationId="{BF259BF1-B9B5-C18F-7B9A-3D35A048ADF1}"/>
+          </ac:spMkLst>
+        </pc:spChg>
+        <pc:spChg chg="add del mod">
+          <ac:chgData name="Fiechter Sebastian (IT-PTR-EXT-EXT2 - Extern)" userId="f23e6d81-0328-4361-b5a9-44eea62aa731" providerId="ADAL" clId="{9681DBBF-CC28-48CE-8222-BE1E4CADF4A4}" dt="2024-07-15T11:22:20.153" v="5073" actId="478"/>
+          <ac:spMkLst>
+            <pc:docMk/>
+            <pc:sldMk cId="1151215240" sldId="256"/>
+            <ac:spMk id="134" creationId="{626A5BF4-9BDE-16B6-1491-AA1FC39DFB5E}"/>
+          </ac:spMkLst>
+        </pc:spChg>
+        <pc:spChg chg="add del mod">
+          <ac:chgData name="Fiechter Sebastian (IT-PTR-EXT-EXT2 - Extern)" userId="f23e6d81-0328-4361-b5a9-44eea62aa731" providerId="ADAL" clId="{9681DBBF-CC28-48CE-8222-BE1E4CADF4A4}" dt="2024-07-15T11:22:04.730" v="5069" actId="478"/>
+          <ac:spMkLst>
+            <pc:docMk/>
+            <pc:sldMk cId="1151215240" sldId="256"/>
+            <ac:spMk id="135" creationId="{EB1BA23B-8AD8-37EF-B5E3-721E1C6DB1AD}"/>
+          </ac:spMkLst>
+        </pc:spChg>
+        <pc:spChg chg="add mod">
+          <ac:chgData name="Fiechter Sebastian (IT-PTR-EXT-EXT2 - Extern)" userId="f23e6d81-0328-4361-b5a9-44eea62aa731" providerId="ADAL" clId="{9681DBBF-CC28-48CE-8222-BE1E4CADF4A4}" dt="2024-06-26T07:57:34.718" v="4439" actId="1035"/>
+          <ac:spMkLst>
+            <pc:docMk/>
+            <pc:sldMk cId="1151215240" sldId="256"/>
+            <ac:spMk id="136" creationId="{F7EAE1CC-0944-F004-0D08-86DAD9BA3570}"/>
+          </ac:spMkLst>
+        </pc:spChg>
+        <pc:spChg chg="add mod">
+          <ac:chgData name="Fiechter Sebastian (IT-PTR-EXT-EXT2 - Extern)" userId="f23e6d81-0328-4361-b5a9-44eea62aa731" providerId="ADAL" clId="{9681DBBF-CC28-48CE-8222-BE1E4CADF4A4}" dt="2024-06-26T07:57:34.718" v="4439" actId="1035"/>
+          <ac:spMkLst>
+            <pc:docMk/>
+            <pc:sldMk cId="1151215240" sldId="256"/>
+            <ac:spMk id="137" creationId="{D3CE49AF-79B5-41DD-D1C2-4E63BC1A0955}"/>
+          </ac:spMkLst>
+        </pc:spChg>
+        <pc:spChg chg="add mod">
+          <ac:chgData name="Fiechter Sebastian (IT-PTR-EXT-EXT2 - Extern)" userId="f23e6d81-0328-4361-b5a9-44eea62aa731" providerId="ADAL" clId="{9681DBBF-CC28-48CE-8222-BE1E4CADF4A4}" dt="2024-06-24T14:45:16.271" v="2610"/>
+          <ac:spMkLst>
+            <pc:docMk/>
+            <pc:sldMk cId="1151215240" sldId="256"/>
+            <ac:spMk id="138" creationId="{596882D2-C5A1-55FD-6D48-7B7D63ECB65E}"/>
+          </ac:spMkLst>
+        </pc:spChg>
+        <pc:spChg chg="mod">
+          <ac:chgData name="Fiechter Sebastian (IT-PTR-EXT-EXT2 - Extern)" userId="f23e6d81-0328-4361-b5a9-44eea62aa731" providerId="ADAL" clId="{9681DBBF-CC28-48CE-8222-BE1E4CADF4A4}" dt="2024-06-24T14:45:16.271" v="2610"/>
+          <ac:spMkLst>
+            <pc:docMk/>
+            <pc:sldMk cId="1151215240" sldId="256"/>
+            <ac:spMk id="140" creationId="{BC9F3EA4-BEDB-9E18-8860-BC0AA759F7E3}"/>
+          </ac:spMkLst>
+        </pc:spChg>
+        <pc:spChg chg="mod">
+          <ac:chgData name="Fiechter Sebastian (IT-PTR-EXT-EXT2 - Extern)" userId="f23e6d81-0328-4361-b5a9-44eea62aa731" providerId="ADAL" clId="{9681DBBF-CC28-48CE-8222-BE1E4CADF4A4}" dt="2024-06-24T14:45:16.271" v="2610"/>
+          <ac:spMkLst>
+            <pc:docMk/>
+            <pc:sldMk cId="1151215240" sldId="256"/>
+            <ac:spMk id="147" creationId="{00A453F0-DFC3-995D-AE18-769237648E28}"/>
+          </ac:spMkLst>
+        </pc:spChg>
+        <pc:spChg chg="mod">
+          <ac:chgData name="Fiechter Sebastian (IT-PTR-EXT-EXT2 - Extern)" userId="f23e6d81-0328-4361-b5a9-44eea62aa731" providerId="ADAL" clId="{9681DBBF-CC28-48CE-8222-BE1E4CADF4A4}" dt="2024-06-24T14:45:16.271" v="2610"/>
+          <ac:spMkLst>
+            <pc:docMk/>
+            <pc:sldMk cId="1151215240" sldId="256"/>
+            <ac:spMk id="151" creationId="{B9C41706-2395-0CD6-FCEF-2444FE2628EC}"/>
+          </ac:spMkLst>
+        </pc:spChg>
+        <pc:spChg chg="mod">
+          <ac:chgData name="Fiechter Sebastian (IT-PTR-EXT-EXT2 - Extern)" userId="f23e6d81-0328-4361-b5a9-44eea62aa731" providerId="ADAL" clId="{9681DBBF-CC28-48CE-8222-BE1E4CADF4A4}" dt="2024-06-24T14:45:16.271" v="2610"/>
+          <ac:spMkLst>
+            <pc:docMk/>
+            <pc:sldMk cId="1151215240" sldId="256"/>
+            <ac:spMk id="155" creationId="{8A847FE6-E589-1AFE-819D-B7067C1E6F63}"/>
+          </ac:spMkLst>
+        </pc:spChg>
+        <pc:spChg chg="mod">
+          <ac:chgData name="Fiechter Sebastian (IT-PTR-EXT-EXT2 - Extern)" userId="f23e6d81-0328-4361-b5a9-44eea62aa731" providerId="ADAL" clId="{9681DBBF-CC28-48CE-8222-BE1E4CADF4A4}" dt="2024-06-24T14:45:16.271" v="2610"/>
+          <ac:spMkLst>
+            <pc:docMk/>
+            <pc:sldMk cId="1151215240" sldId="256"/>
+            <ac:spMk id="159" creationId="{044BDE14-EE14-E37A-43B2-A253F0E7FD51}"/>
+          </ac:spMkLst>
+        </pc:spChg>
+        <pc:spChg chg="mod">
+          <ac:chgData name="Fiechter Sebastian (IT-PTR-EXT-EXT2 - Extern)" userId="f23e6d81-0328-4361-b5a9-44eea62aa731" providerId="ADAL" clId="{9681DBBF-CC28-48CE-8222-BE1E4CADF4A4}" dt="2024-06-24T14:45:16.271" v="2610"/>
+          <ac:spMkLst>
+            <pc:docMk/>
+            <pc:sldMk cId="1151215240" sldId="256"/>
+            <ac:spMk id="163" creationId="{00498F9B-A939-7048-ED06-3280805577DC}"/>
+          </ac:spMkLst>
+        </pc:spChg>
+        <pc:spChg chg="mod">
+          <ac:chgData name="Fiechter Sebastian (IT-PTR-EXT-EXT2 - Extern)" userId="f23e6d81-0328-4361-b5a9-44eea62aa731" providerId="ADAL" clId="{9681DBBF-CC28-48CE-8222-BE1E4CADF4A4}" dt="2024-06-24T14:45:16.271" v="2610"/>
+          <ac:spMkLst>
+            <pc:docMk/>
+            <pc:sldMk cId="1151215240" sldId="256"/>
+            <ac:spMk id="167" creationId="{615C7320-18C9-85B9-9070-A2EBA3A4E004}"/>
+          </ac:spMkLst>
+        </pc:spChg>
+        <pc:spChg chg="mod">
+          <ac:chgData name="Fiechter Sebastian (IT-PTR-EXT-EXT2 - Extern)" userId="f23e6d81-0328-4361-b5a9-44eea62aa731" providerId="ADAL" clId="{9681DBBF-CC28-48CE-8222-BE1E4CADF4A4}" dt="2024-06-24T14:45:16.271" v="2610"/>
+          <ac:spMkLst>
+            <pc:docMk/>
+            <pc:sldMk cId="1151215240" sldId="256"/>
+            <ac:spMk id="171" creationId="{295D566D-6311-1056-EAF5-F60204A86A14}"/>
+          </ac:spMkLst>
+        </pc:spChg>
+        <pc:spChg chg="mod">
+          <ac:chgData name="Fiechter Sebastian (IT-PTR-EXT-EXT2 - Extern)" userId="f23e6d81-0328-4361-b5a9-44eea62aa731" providerId="ADAL" clId="{9681DBBF-CC28-48CE-8222-BE1E4CADF4A4}" dt="2024-06-24T14:45:16.271" v="2610"/>
+          <ac:spMkLst>
+            <pc:docMk/>
+            <pc:sldMk cId="1151215240" sldId="256"/>
+            <ac:spMk id="175" creationId="{87C0F0AB-5473-72A5-C5DF-EE84C4E9D18A}"/>
+          </ac:spMkLst>
+        </pc:spChg>
+        <pc:spChg chg="mod">
+          <ac:chgData name="Fiechter Sebastian (IT-PTR-EXT-EXT2 - Extern)" userId="f23e6d81-0328-4361-b5a9-44eea62aa731" providerId="ADAL" clId="{9681DBBF-CC28-48CE-8222-BE1E4CADF4A4}" dt="2024-06-24T14:45:16.271" v="2610"/>
+          <ac:spMkLst>
+            <pc:docMk/>
+            <pc:sldMk cId="1151215240" sldId="256"/>
+            <ac:spMk id="179" creationId="{2B425BE0-87D8-55F4-AE9D-2A581AC7AA45}"/>
+          </ac:spMkLst>
+        </pc:spChg>
+        <pc:spChg chg="mod">
+          <ac:chgData name="Fiechter Sebastian (IT-PTR-EXT-EXT2 - Extern)" userId="f23e6d81-0328-4361-b5a9-44eea62aa731" providerId="ADAL" clId="{9681DBBF-CC28-48CE-8222-BE1E4CADF4A4}" dt="2024-06-24T14:45:16.271" v="2610"/>
+          <ac:spMkLst>
+            <pc:docMk/>
+            <pc:sldMk cId="1151215240" sldId="256"/>
+            <ac:spMk id="183" creationId="{247821A0-C815-C1FB-1C65-55899565461F}"/>
+          </ac:spMkLst>
+        </pc:spChg>
+        <pc:spChg chg="add mod">
+          <ac:chgData name="Fiechter Sebastian (IT-PTR-EXT-EXT2 - Extern)" userId="f23e6d81-0328-4361-b5a9-44eea62aa731" providerId="ADAL" clId="{9681DBBF-CC28-48CE-8222-BE1E4CADF4A4}" dt="2024-06-24T14:45:16.271" v="2610"/>
+          <ac:spMkLst>
+            <pc:docMk/>
+            <pc:sldMk cId="1151215240" sldId="256"/>
+            <ac:spMk id="186" creationId="{B75CF5C1-3589-0B55-8D75-E8F2CE56D1FA}"/>
+          </ac:spMkLst>
+        </pc:spChg>
+        <pc:spChg chg="add mod">
+          <ac:chgData name="Fiechter Sebastian (IT-PTR-EXT-EXT2 - Extern)" userId="f23e6d81-0328-4361-b5a9-44eea62aa731" providerId="ADAL" clId="{9681DBBF-CC28-48CE-8222-BE1E4CADF4A4}" dt="2024-06-24T14:45:16.271" v="2610"/>
+          <ac:spMkLst>
+            <pc:docMk/>
+            <pc:sldMk cId="1151215240" sldId="256"/>
+            <ac:spMk id="187" creationId="{EA8FF750-66A2-8577-F8E5-B1D1DC1CDDD1}"/>
+          </ac:spMkLst>
+        </pc:spChg>
+        <pc:spChg chg="add mod">
+          <ac:chgData name="Fiechter Sebastian (IT-PTR-EXT-EXT2 - Extern)" userId="f23e6d81-0328-4361-b5a9-44eea62aa731" providerId="ADAL" clId="{9681DBBF-CC28-48CE-8222-BE1E4CADF4A4}" dt="2024-06-24T14:45:16.271" v="2610"/>
+          <ac:spMkLst>
+            <pc:docMk/>
+            <pc:sldMk cId="1151215240" sldId="256"/>
+            <ac:spMk id="188" creationId="{F4D9FB1B-8BBA-4E07-D0FB-F6697C547702}"/>
+          </ac:spMkLst>
+        </pc:spChg>
+        <pc:spChg chg="add mod">
+          <ac:chgData name="Fiechter Sebastian (IT-PTR-EXT-EXT2 - Extern)" userId="f23e6d81-0328-4361-b5a9-44eea62aa731" providerId="ADAL" clId="{9681DBBF-CC28-48CE-8222-BE1E4CADF4A4}" dt="2024-06-24T14:45:16.271" v="2610"/>
+          <ac:spMkLst>
+            <pc:docMk/>
+            <pc:sldMk cId="1151215240" sldId="256"/>
+            <ac:spMk id="189" creationId="{298D9C8E-D555-FD7D-BD83-811C0BEC64E7}"/>
+          </ac:spMkLst>
+        </pc:spChg>
+        <pc:spChg chg="add mod">
+          <ac:chgData name="Fiechter Sebastian (IT-PTR-EXT-EXT2 - Extern)" userId="f23e6d81-0328-4361-b5a9-44eea62aa731" providerId="ADAL" clId="{9681DBBF-CC28-48CE-8222-BE1E4CADF4A4}" dt="2024-06-24T14:45:16.271" v="2610"/>
+          <ac:spMkLst>
+            <pc:docMk/>
+            <pc:sldMk cId="1151215240" sldId="256"/>
+            <ac:spMk id="190" creationId="{AB9B3E73-E1D4-52FD-FA38-B1C989947231}"/>
+          </ac:spMkLst>
+        </pc:spChg>
+        <pc:spChg chg="add mod">
+          <ac:chgData name="Fiechter Sebastian (IT-PTR-EXT-EXT2 - Extern)" userId="f23e6d81-0328-4361-b5a9-44eea62aa731" providerId="ADAL" clId="{9681DBBF-CC28-48CE-8222-BE1E4CADF4A4}" dt="2024-06-24T14:45:16.271" v="2610"/>
+          <ac:spMkLst>
+            <pc:docMk/>
+            <pc:sldMk cId="1151215240" sldId="256"/>
+            <ac:spMk id="191" creationId="{F9C16807-71EA-3610-06AA-930E728FDD2D}"/>
+          </ac:spMkLst>
+        </pc:spChg>
+        <pc:spChg chg="add mod">
+          <ac:chgData name="Fiechter Sebastian (IT-PTR-EXT-EXT2 - Extern)" userId="f23e6d81-0328-4361-b5a9-44eea62aa731" providerId="ADAL" clId="{9681DBBF-CC28-48CE-8222-BE1E4CADF4A4}" dt="2024-06-24T14:45:16.271" v="2610"/>
+          <ac:spMkLst>
+            <pc:docMk/>
+            <pc:sldMk cId="1151215240" sldId="256"/>
+            <ac:spMk id="192" creationId="{D5C04713-FFFE-C767-4E83-2791F4886D5A}"/>
+          </ac:spMkLst>
+        </pc:spChg>
+        <pc:spChg chg="add mod">
+          <ac:chgData name="Fiechter Sebastian (IT-PTR-EXT-EXT2 - Extern)" userId="f23e6d81-0328-4361-b5a9-44eea62aa731" providerId="ADAL" clId="{9681DBBF-CC28-48CE-8222-BE1E4CADF4A4}" dt="2024-06-24T14:45:16.271" v="2610"/>
+          <ac:spMkLst>
+            <pc:docMk/>
+            <pc:sldMk cId="1151215240" sldId="256"/>
+            <ac:spMk id="193" creationId="{5D5AB75D-53FE-C025-E008-FEC10E0E89D6}"/>
+          </ac:spMkLst>
+        </pc:spChg>
+        <pc:spChg chg="add mod">
+          <ac:chgData name="Fiechter Sebastian (IT-PTR-EXT-EXT2 - Extern)" userId="f23e6d81-0328-4361-b5a9-44eea62aa731" providerId="ADAL" clId="{9681DBBF-CC28-48CE-8222-BE1E4CADF4A4}" dt="2024-06-24T14:45:16.271" v="2610"/>
+          <ac:spMkLst>
+            <pc:docMk/>
+            <pc:sldMk cId="1151215240" sldId="256"/>
+            <ac:spMk id="194" creationId="{6431A2F5-7EE7-BED5-0B8D-57B3AF70B916}"/>
+          </ac:spMkLst>
+        </pc:spChg>
+        <pc:spChg chg="add mod">
+          <ac:chgData name="Fiechter Sebastian (IT-PTR-EXT-EXT2 - Extern)" userId="f23e6d81-0328-4361-b5a9-44eea62aa731" providerId="ADAL" clId="{9681DBBF-CC28-48CE-8222-BE1E4CADF4A4}" dt="2024-06-24T14:45:16.271" v="2610"/>
+          <ac:spMkLst>
+            <pc:docMk/>
+            <pc:sldMk cId="1151215240" sldId="256"/>
+            <ac:spMk id="195" creationId="{A9F1B140-5B1B-9110-0602-FAFB2464F1F6}"/>
+          </ac:spMkLst>
+        </pc:spChg>
+        <pc:spChg chg="add mod">
+          <ac:chgData name="Fiechter Sebastian (IT-PTR-EXT-EXT2 - Extern)" userId="f23e6d81-0328-4361-b5a9-44eea62aa731" providerId="ADAL" clId="{9681DBBF-CC28-48CE-8222-BE1E4CADF4A4}" dt="2024-06-24T14:45:16.271" v="2610"/>
+          <ac:spMkLst>
+            <pc:docMk/>
+            <pc:sldMk cId="1151215240" sldId="256"/>
+            <ac:spMk id="196" creationId="{CD469033-4661-0B5F-CF03-153629D20F46}"/>
+          </ac:spMkLst>
+        </pc:spChg>
+        <pc:spChg chg="add mod">
+          <ac:chgData name="Fiechter Sebastian (IT-PTR-EXT-EXT2 - Extern)" userId="f23e6d81-0328-4361-b5a9-44eea62aa731" providerId="ADAL" clId="{9681DBBF-CC28-48CE-8222-BE1E4CADF4A4}" dt="2024-06-24T14:45:16.271" v="2610"/>
+          <ac:spMkLst>
+            <pc:docMk/>
+            <pc:sldMk cId="1151215240" sldId="256"/>
+            <ac:spMk id="197" creationId="{968CE017-5C49-A3D6-3129-222C04C128C2}"/>
+          </ac:spMkLst>
+        </pc:spChg>
+        <pc:spChg chg="add mod">
+          <ac:chgData name="Fiechter Sebastian (IT-PTR-EXT-EXT2 - Extern)" userId="f23e6d81-0328-4361-b5a9-44eea62aa731" providerId="ADAL" clId="{9681DBBF-CC28-48CE-8222-BE1E4CADF4A4}" dt="2024-06-24T14:45:16.271" v="2610"/>
+          <ac:spMkLst>
+            <pc:docMk/>
+            <pc:sldMk cId="1151215240" sldId="256"/>
+            <ac:spMk id="198" creationId="{DF6A5FE3-74BE-10DB-6E87-A9C524018FD2}"/>
+          </ac:spMkLst>
+        </pc:spChg>
+        <pc:spChg chg="add mod">
+          <ac:chgData name="Fiechter Sebastian (IT-PTR-EXT-EXT2 - Extern)" userId="f23e6d81-0328-4361-b5a9-44eea62aa731" providerId="ADAL" clId="{9681DBBF-CC28-48CE-8222-BE1E4CADF4A4}" dt="2024-06-24T14:45:16.271" v="2610"/>
+          <ac:spMkLst>
+            <pc:docMk/>
+            <pc:sldMk cId="1151215240" sldId="256"/>
+            <ac:spMk id="199" creationId="{36097D29-7FE3-5189-DB04-FA75B2F8DA8B}"/>
+          </ac:spMkLst>
+        </pc:spChg>
+        <pc:spChg chg="add mod">
+          <ac:chgData name="Fiechter Sebastian (IT-PTR-EXT-EXT2 - Extern)" userId="f23e6d81-0328-4361-b5a9-44eea62aa731" providerId="ADAL" clId="{9681DBBF-CC28-48CE-8222-BE1E4CADF4A4}" dt="2024-06-24T14:45:16.271" v="2610"/>
+          <ac:spMkLst>
+            <pc:docMk/>
+            <pc:sldMk cId="1151215240" sldId="256"/>
+            <ac:spMk id="200" creationId="{1C7D97A4-443F-9628-7742-0874068A2C61}"/>
+          </ac:spMkLst>
+        </pc:spChg>
+        <pc:spChg chg="add mod">
+          <ac:chgData name="Fiechter Sebastian (IT-PTR-EXT-EXT2 - Extern)" userId="f23e6d81-0328-4361-b5a9-44eea62aa731" providerId="ADAL" clId="{9681DBBF-CC28-48CE-8222-BE1E4CADF4A4}" dt="2024-06-24T14:45:16.271" v="2610"/>
+          <ac:spMkLst>
+            <pc:docMk/>
+            <pc:sldMk cId="1151215240" sldId="256"/>
+            <ac:spMk id="201" creationId="{11F11D20-05C7-B576-C730-A3A1B16D8F69}"/>
+          </ac:spMkLst>
+        </pc:spChg>
+        <pc:spChg chg="add mod">
+          <ac:chgData name="Fiechter Sebastian (IT-PTR-EXT-EXT2 - Extern)" userId="f23e6d81-0328-4361-b5a9-44eea62aa731" providerId="ADAL" clId="{9681DBBF-CC28-48CE-8222-BE1E4CADF4A4}" dt="2024-06-24T14:45:16.271" v="2610"/>
+          <ac:spMkLst>
+            <pc:docMk/>
+            <pc:sldMk cId="1151215240" sldId="256"/>
+            <ac:spMk id="202" creationId="{55C7A844-B44D-A7DA-6970-6661CCD1426A}"/>
+          </ac:spMkLst>
+        </pc:spChg>
+        <pc:spChg chg="add mod">
+          <ac:chgData name="Fiechter Sebastian (IT-PTR-EXT-EXT2 - Extern)" userId="f23e6d81-0328-4361-b5a9-44eea62aa731" providerId="ADAL" clId="{9681DBBF-CC28-48CE-8222-BE1E4CADF4A4}" dt="2024-06-24T14:45:16.271" v="2610"/>
+          <ac:spMkLst>
+            <pc:docMk/>
+            <pc:sldMk cId="1151215240" sldId="256"/>
+            <ac:spMk id="203" creationId="{D59FD004-1DC6-1D4D-8B9B-6019A0DE72CC}"/>
+          </ac:spMkLst>
+        </pc:spChg>
+        <pc:spChg chg="add mod">
+          <ac:chgData name="Fiechter Sebastian (IT-PTR-EXT-EXT2 - Extern)" userId="f23e6d81-0328-4361-b5a9-44eea62aa731" providerId="ADAL" clId="{9681DBBF-CC28-48CE-8222-BE1E4CADF4A4}" dt="2024-06-24T14:45:16.271" v="2610"/>
+          <ac:spMkLst>
+            <pc:docMk/>
+            <pc:sldMk cId="1151215240" sldId="256"/>
+            <ac:spMk id="204" creationId="{CBE9B8EB-646F-0FB8-B3D3-6A9DB3929692}"/>
+          </ac:spMkLst>
+        </pc:spChg>
+        <pc:spChg chg="add mod">
+          <ac:chgData name="Fiechter Sebastian (IT-PTR-EXT-EXT2 - Extern)" userId="f23e6d81-0328-4361-b5a9-44eea62aa731" providerId="ADAL" clId="{9681DBBF-CC28-48CE-8222-BE1E4CADF4A4}" dt="2024-06-24T14:45:16.271" v="2610"/>
+          <ac:spMkLst>
+            <pc:docMk/>
+            <pc:sldMk cId="1151215240" sldId="256"/>
+            <ac:spMk id="205" creationId="{54609D63-6FA5-BBAC-C7B1-9A7A65F1D5DA}"/>
+          </ac:spMkLst>
+        </pc:spChg>
+        <pc:spChg chg="add mod">
+          <ac:chgData name="Fiechter Sebastian (IT-PTR-EXT-EXT2 - Extern)" userId="f23e6d81-0328-4361-b5a9-44eea62aa731" providerId="ADAL" clId="{9681DBBF-CC28-48CE-8222-BE1E4CADF4A4}" dt="2024-06-24T14:45:16.271" v="2610"/>
+          <ac:spMkLst>
+            <pc:docMk/>
+            <pc:sldMk cId="1151215240" sldId="256"/>
+            <ac:spMk id="206" creationId="{FB176983-0D7E-77B0-8CBC-3E149727AE94}"/>
+          </ac:spMkLst>
+        </pc:spChg>
+        <pc:spChg chg="add mod">
+          <ac:chgData name="Fiechter Sebastian (IT-PTR-EXT-EXT2 - Extern)" userId="f23e6d81-0328-4361-b5a9-44eea62aa731" providerId="ADAL" clId="{9681DBBF-CC28-48CE-8222-BE1E4CADF4A4}" dt="2024-06-24T14:45:16.271" v="2610"/>
+          <ac:spMkLst>
+            <pc:docMk/>
+            <pc:sldMk cId="1151215240" sldId="256"/>
+            <ac:spMk id="207" creationId="{0F8A7C9B-0461-8462-988C-DE11B53757B5}"/>
+          </ac:spMkLst>
+        </pc:spChg>
+        <pc:spChg chg="add mod">
+          <ac:chgData name="Fiechter Sebastian (IT-PTR-EXT-EXT2 - Extern)" userId="f23e6d81-0328-4361-b5a9-44eea62aa731" providerId="ADAL" clId="{9681DBBF-CC28-48CE-8222-BE1E4CADF4A4}" dt="2024-06-24T14:45:16.271" v="2610"/>
+          <ac:spMkLst>
+            <pc:docMk/>
+            <pc:sldMk cId="1151215240" sldId="256"/>
+            <ac:spMk id="208" creationId="{9C80CBF6-20BA-2DF6-B4D3-0C021B5D5A34}"/>
+          </ac:spMkLst>
+        </pc:spChg>
+        <pc:spChg chg="add mod">
+          <ac:chgData name="Fiechter Sebastian (IT-PTR-EXT-EXT2 - Extern)" userId="f23e6d81-0328-4361-b5a9-44eea62aa731" providerId="ADAL" clId="{9681DBBF-CC28-48CE-8222-BE1E4CADF4A4}" dt="2024-06-24T14:45:16.271" v="2610"/>
+          <ac:spMkLst>
+            <pc:docMk/>
+            <pc:sldMk cId="1151215240" sldId="256"/>
+            <ac:spMk id="209" creationId="{5EF3D663-8C88-8861-68CE-80901787CFED}"/>
+          </ac:spMkLst>
+        </pc:spChg>
+        <pc:spChg chg="add mod">
+          <ac:chgData name="Fiechter Sebastian (IT-PTR-EXT-EXT2 - Extern)" userId="f23e6d81-0328-4361-b5a9-44eea62aa731" providerId="ADAL" clId="{9681DBBF-CC28-48CE-8222-BE1E4CADF4A4}" dt="2024-06-24T14:45:16.271" v="2610"/>
+          <ac:spMkLst>
+            <pc:docMk/>
+            <pc:sldMk cId="1151215240" sldId="256"/>
+            <ac:spMk id="210" creationId="{C8CC2A52-A5B1-CCAE-D297-198694DC1424}"/>
+          </ac:spMkLst>
+        </pc:spChg>
+        <pc:spChg chg="add mod">
+          <ac:chgData name="Fiechter Sebastian (IT-PTR-EXT-EXT2 - Extern)" userId="f23e6d81-0328-4361-b5a9-44eea62aa731" providerId="ADAL" clId="{9681DBBF-CC28-48CE-8222-BE1E4CADF4A4}" dt="2024-06-24T14:45:16.271" v="2610"/>
+          <ac:spMkLst>
+            <pc:docMk/>
+            <pc:sldMk cId="1151215240" sldId="256"/>
+            <ac:spMk id="211" creationId="{ECED8A64-3FA5-6A2C-25AE-94E385854450}"/>
+          </ac:spMkLst>
+        </pc:spChg>
+        <pc:spChg chg="add mod">
+          <ac:chgData name="Fiechter Sebastian (IT-PTR-EXT-EXT2 - Extern)" userId="f23e6d81-0328-4361-b5a9-44eea62aa731" providerId="ADAL" clId="{9681DBBF-CC28-48CE-8222-BE1E4CADF4A4}" dt="2024-06-24T14:45:16.271" v="2610"/>
+          <ac:spMkLst>
+            <pc:docMk/>
+            <pc:sldMk cId="1151215240" sldId="256"/>
+            <ac:spMk id="212" creationId="{B9DCB267-EB59-3297-5F53-7E060613D8DC}"/>
+          </ac:spMkLst>
+        </pc:spChg>
+        <pc:spChg chg="add mod">
+          <ac:chgData name="Fiechter Sebastian (IT-PTR-EXT-EXT2 - Extern)" userId="f23e6d81-0328-4361-b5a9-44eea62aa731" providerId="ADAL" clId="{9681DBBF-CC28-48CE-8222-BE1E4CADF4A4}" dt="2024-06-24T14:45:16.271" v="2610"/>
+          <ac:spMkLst>
+            <pc:docMk/>
+            <pc:sldMk cId="1151215240" sldId="256"/>
+            <ac:spMk id="213" creationId="{E4007A78-66E0-541D-AE44-F294C5A94F7C}"/>
+          </ac:spMkLst>
+        </pc:spChg>
+        <pc:spChg chg="add mod">
+          <ac:chgData name="Fiechter Sebastian (IT-PTR-EXT-EXT2 - Extern)" userId="f23e6d81-0328-4361-b5a9-44eea62aa731" providerId="ADAL" clId="{9681DBBF-CC28-48CE-8222-BE1E4CADF4A4}" dt="2024-06-24T14:45:16.271" v="2610"/>
+          <ac:spMkLst>
+            <pc:docMk/>
+            <pc:sldMk cId="1151215240" sldId="256"/>
+            <ac:spMk id="214" creationId="{0A072E26-E126-0D2C-E082-CA2D8A13EF7F}"/>
+          </ac:spMkLst>
+        </pc:spChg>
+        <pc:spChg chg="add del mod">
+          <ac:chgData name="Fiechter Sebastian (IT-PTR-EXT-EXT2 - Extern)" userId="f23e6d81-0328-4361-b5a9-44eea62aa731" providerId="ADAL" clId="{9681DBBF-CC28-48CE-8222-BE1E4CADF4A4}" dt="2024-06-24T14:45:41.027" v="2614" actId="478"/>
+          <ac:spMkLst>
+            <pc:docMk/>
+            <pc:sldMk cId="1151215240" sldId="256"/>
+            <ac:spMk id="215" creationId="{D08040BD-AA07-AABC-13C0-AC3C5A745469}"/>
+          </ac:spMkLst>
+        </pc:spChg>
+        <pc:spChg chg="mod">
+          <ac:chgData name="Fiechter Sebastian (IT-PTR-EXT-EXT2 - Extern)" userId="f23e6d81-0328-4361-b5a9-44eea62aa731" providerId="ADAL" clId="{9681DBBF-CC28-48CE-8222-BE1E4CADF4A4}" dt="2024-06-25T08:16:57.521" v="3815" actId="207"/>
+          <ac:spMkLst>
+            <pc:docMk/>
+            <pc:sldMk cId="1151215240" sldId="256"/>
+            <ac:spMk id="217" creationId="{4CE992C0-9EC7-945C-5C57-44C9C8FC0345}"/>
+          </ac:spMkLst>
+        </pc:spChg>
+        <pc:spChg chg="mod">
+          <ac:chgData name="Fiechter Sebastian (IT-PTR-EXT-EXT2 - Extern)" userId="f23e6d81-0328-4361-b5a9-44eea62aa731" providerId="ADAL" clId="{9681DBBF-CC28-48CE-8222-BE1E4CADF4A4}" dt="2024-06-25T08:16:57.521" v="3815" actId="207"/>
+          <ac:spMkLst>
+            <pc:docMk/>
+            <pc:sldMk cId="1151215240" sldId="256"/>
+            <ac:spMk id="224" creationId="{2EF997B0-14BB-E652-56B4-DDDE3005B29C}"/>
+          </ac:spMkLst>
+        </pc:spChg>
+        <pc:spChg chg="mod">
+          <ac:chgData name="Fiechter Sebastian (IT-PTR-EXT-EXT2 - Extern)" userId="f23e6d81-0328-4361-b5a9-44eea62aa731" providerId="ADAL" clId="{9681DBBF-CC28-48CE-8222-BE1E4CADF4A4}" dt="2024-06-25T08:16:57.521" v="3815" actId="207"/>
+          <ac:spMkLst>
+            <pc:docMk/>
+            <pc:sldMk cId="1151215240" sldId="256"/>
+            <ac:spMk id="228" creationId="{2F7E57F9-B664-C609-2773-9F98B42E6E04}"/>
+          </ac:spMkLst>
+        </pc:spChg>
+        <pc:spChg chg="mod">
+          <ac:chgData name="Fiechter Sebastian (IT-PTR-EXT-EXT2 - Extern)" userId="f23e6d81-0328-4361-b5a9-44eea62aa731" providerId="ADAL" clId="{9681DBBF-CC28-48CE-8222-BE1E4CADF4A4}" dt="2024-06-25T08:16:57.521" v="3815" actId="207"/>
+          <ac:spMkLst>
+            <pc:docMk/>
+            <pc:sldMk cId="1151215240" sldId="256"/>
+            <ac:spMk id="232" creationId="{BCC01DE4-9270-97A3-6405-C3A4600AC644}"/>
+          </ac:spMkLst>
+        </pc:spChg>
+        <pc:spChg chg="mod">
+          <ac:chgData name="Fiechter Sebastian (IT-PTR-EXT-EXT2 - Extern)" userId="f23e6d81-0328-4361-b5a9-44eea62aa731" providerId="ADAL" clId="{9681DBBF-CC28-48CE-8222-BE1E4CADF4A4}" dt="2024-07-15T10:06:20.118" v="4907" actId="207"/>
+          <ac:spMkLst>
+            <pc:docMk/>
+            <pc:sldMk cId="1151215240" sldId="256"/>
+            <ac:spMk id="236" creationId="{293AB4FA-0836-4CE0-5AAA-6F8D77BF5DA9}"/>
+          </ac:spMkLst>
+        </pc:spChg>
+        <pc:spChg chg="mod">
+          <ac:chgData name="Fiechter Sebastian (IT-PTR-EXT-EXT2 - Extern)" userId="f23e6d81-0328-4361-b5a9-44eea62aa731" providerId="ADAL" clId="{9681DBBF-CC28-48CE-8222-BE1E4CADF4A4}" dt="2024-07-16T14:09:14.462" v="5475" actId="20577"/>
+          <ac:spMkLst>
+            <pc:docMk/>
+            <pc:sldMk cId="1151215240" sldId="256"/>
+            <ac:spMk id="240" creationId="{7C7E71E9-5E38-AFD9-902A-C20CE1E0E58E}"/>
+          </ac:spMkLst>
+        </pc:spChg>
+        <pc:spChg chg="mod">
+          <ac:chgData name="Fiechter Sebastian (IT-PTR-EXT-EXT2 - Extern)" userId="f23e6d81-0328-4361-b5a9-44eea62aa731" providerId="ADAL" clId="{9681DBBF-CC28-48CE-8222-BE1E4CADF4A4}" dt="2024-06-24T15:06:21.683" v="3226" actId="207"/>
+          <ac:spMkLst>
+            <pc:docMk/>
+            <pc:sldMk cId="1151215240" sldId="256"/>
+            <ac:spMk id="244" creationId="{99C14E4A-271C-619B-8240-00641DA9092D}"/>
+          </ac:spMkLst>
+        </pc:spChg>
+        <pc:spChg chg="mod">
+          <ac:chgData name="Fiechter Sebastian (IT-PTR-EXT-EXT2 - Extern)" userId="f23e6d81-0328-4361-b5a9-44eea62aa731" providerId="ADAL" clId="{9681DBBF-CC28-48CE-8222-BE1E4CADF4A4}" dt="2024-06-24T14:53:05.275" v="3022" actId="20577"/>
+          <ac:spMkLst>
+            <pc:docMk/>
+            <pc:sldMk cId="1151215240" sldId="256"/>
+            <ac:spMk id="248" creationId="{27364F25-F67B-698F-8BB1-B7E13419785A}"/>
+          </ac:spMkLst>
+        </pc:spChg>
+        <pc:spChg chg="mod">
+          <ac:chgData name="Fiechter Sebastian (IT-PTR-EXT-EXT2 - Extern)" userId="f23e6d81-0328-4361-b5a9-44eea62aa731" providerId="ADAL" clId="{9681DBBF-CC28-48CE-8222-BE1E4CADF4A4}" dt="2024-07-15T10:06:16.204" v="4906" actId="207"/>
+          <ac:spMkLst>
+            <pc:docMk/>
+            <pc:sldMk cId="1151215240" sldId="256"/>
+            <ac:spMk id="252" creationId="{156F21F8-EC9C-F814-2168-48DA880E38FC}"/>
+          </ac:spMkLst>
+        </pc:spChg>
+        <pc:spChg chg="mod">
+          <ac:chgData name="Fiechter Sebastian (IT-PTR-EXT-EXT2 - Extern)" userId="f23e6d81-0328-4361-b5a9-44eea62aa731" providerId="ADAL" clId="{9681DBBF-CC28-48CE-8222-BE1E4CADF4A4}" dt="2024-07-15T14:36:40.709" v="5389" actId="20577"/>
+          <ac:spMkLst>
+            <pc:docMk/>
+            <pc:sldMk cId="1151215240" sldId="256"/>
+            <ac:spMk id="256" creationId="{B501EA4F-8156-8F37-0409-DB697A45CF22}"/>
+          </ac:spMkLst>
+        </pc:spChg>
+        <pc:spChg chg="mod">
+          <ac:chgData name="Fiechter Sebastian (IT-PTR-EXT-EXT2 - Extern)" userId="f23e6d81-0328-4361-b5a9-44eea62aa731" providerId="ADAL" clId="{9681DBBF-CC28-48CE-8222-BE1E4CADF4A4}" dt="2024-07-15T10:06:11.510" v="4905" actId="207"/>
+          <ac:spMkLst>
+            <pc:docMk/>
+            <pc:sldMk cId="1151215240" sldId="256"/>
+            <ac:spMk id="260" creationId="{F0FAC932-16CD-5C67-8EFC-6FDAB853AA57}"/>
+          </ac:spMkLst>
+        </pc:spChg>
+        <pc:spChg chg="add mod">
+          <ac:chgData name="Fiechter Sebastian (IT-PTR-EXT-EXT2 - Extern)" userId="f23e6d81-0328-4361-b5a9-44eea62aa731" providerId="ADAL" clId="{9681DBBF-CC28-48CE-8222-BE1E4CADF4A4}" dt="2024-06-26T07:57:46.971" v="4455" actId="1036"/>
+          <ac:spMkLst>
+            <pc:docMk/>
+            <pc:sldMk cId="1151215240" sldId="256"/>
+            <ac:spMk id="263" creationId="{743ADCDB-F1FC-F469-E46B-989904361B40}"/>
+          </ac:spMkLst>
+        </pc:spChg>
+        <pc:spChg chg="add del mod">
+          <ac:chgData name="Fiechter Sebastian (IT-PTR-EXT-EXT2 - Extern)" userId="f23e6d81-0328-4361-b5a9-44eea62aa731" providerId="ADAL" clId="{9681DBBF-CC28-48CE-8222-BE1E4CADF4A4}" dt="2024-06-24T14:45:34.118" v="2613" actId="478"/>
+          <ac:spMkLst>
+            <pc:docMk/>
+            <pc:sldMk cId="1151215240" sldId="256"/>
+            <ac:spMk id="263" creationId="{B315B283-3244-60CC-B7B0-9392C87C669F}"/>
+          </ac:spMkLst>
+        </pc:spChg>
+        <pc:spChg chg="add del mod">
+          <ac:chgData name="Fiechter Sebastian (IT-PTR-EXT-EXT2 - Extern)" userId="f23e6d81-0328-4361-b5a9-44eea62aa731" providerId="ADAL" clId="{9681DBBF-CC28-48CE-8222-BE1E4CADF4A4}" dt="2024-06-24T14:45:54.083" v="2622" actId="478"/>
+          <ac:spMkLst>
+            <pc:docMk/>
+            <pc:sldMk cId="1151215240" sldId="256"/>
+            <ac:spMk id="264" creationId="{618A380F-4C0E-2C74-C9BA-7AA7F270FA25}"/>
+          </ac:spMkLst>
+        </pc:spChg>
+        <pc:spChg chg="mod topLvl">
+          <ac:chgData name="Fiechter Sebastian (IT-PTR-EXT-EXT2 - Extern)" userId="f23e6d81-0328-4361-b5a9-44eea62aa731" providerId="ADAL" clId="{9681DBBF-CC28-48CE-8222-BE1E4CADF4A4}" dt="2024-07-18T06:24:48.989" v="5604" actId="207"/>
+          <ac:spMkLst>
+            <pc:docMk/>
+            <pc:sldMk cId="1151215240" sldId="256"/>
+            <ac:spMk id="264" creationId="{C749B144-D63B-122B-70BA-A10E6697345E}"/>
+          </ac:spMkLst>
+        </pc:spChg>
+        <pc:spChg chg="add mod">
+          <ac:chgData name="Fiechter Sebastian (IT-PTR-EXT-EXT2 - Extern)" userId="f23e6d81-0328-4361-b5a9-44eea62aa731" providerId="ADAL" clId="{9681DBBF-CC28-48CE-8222-BE1E4CADF4A4}" dt="2024-06-28T09:01:50.923" v="4784" actId="1037"/>
+          <ac:spMkLst>
+            <pc:docMk/>
+            <pc:sldMk cId="1151215240" sldId="256"/>
+            <ac:spMk id="265" creationId="{8C9A56B1-FD3C-48D6-1311-E00FA41AFAF6}"/>
+          </ac:spMkLst>
+        </pc:spChg>
+        <pc:spChg chg="add mod">
+          <ac:chgData name="Fiechter Sebastian (IT-PTR-EXT-EXT2 - Extern)" userId="f23e6d81-0328-4361-b5a9-44eea62aa731" providerId="ADAL" clId="{9681DBBF-CC28-48CE-8222-BE1E4CADF4A4}" dt="2024-06-28T09:01:50.923" v="4784" actId="1037"/>
+          <ac:spMkLst>
+            <pc:docMk/>
+            <pc:sldMk cId="1151215240" sldId="256"/>
+            <ac:spMk id="266" creationId="{9C05B4B9-9E32-24EE-64B0-A37A12B4574F}"/>
+          </ac:spMkLst>
+        </pc:spChg>
+        <pc:spChg chg="add mod">
+          <ac:chgData name="Fiechter Sebastian (IT-PTR-EXT-EXT2 - Extern)" userId="f23e6d81-0328-4361-b5a9-44eea62aa731" providerId="ADAL" clId="{9681DBBF-CC28-48CE-8222-BE1E4CADF4A4}" dt="2024-07-16T14:34:23.812" v="5531" actId="1037"/>
+          <ac:spMkLst>
+            <pc:docMk/>
+            <pc:sldMk cId="1151215240" sldId="256"/>
+            <ac:spMk id="267" creationId="{CDDD8627-EDB3-E469-FDF9-1DBCB8AA7248}"/>
+          </ac:spMkLst>
+        </pc:spChg>
+        <pc:spChg chg="add del mod">
+          <ac:chgData name="Fiechter Sebastian (IT-PTR-EXT-EXT2 - Extern)" userId="f23e6d81-0328-4361-b5a9-44eea62aa731" providerId="ADAL" clId="{9681DBBF-CC28-48CE-8222-BE1E4CADF4A4}" dt="2024-06-24T14:47:25.795" v="2696" actId="478"/>
+          <ac:spMkLst>
+            <pc:docMk/>
+            <pc:sldMk cId="1151215240" sldId="256"/>
+            <ac:spMk id="267" creationId="{E2673A2B-0A7C-2B4D-EEF2-C1B4A5367B44}"/>
+          </ac:spMkLst>
+        </pc:spChg>
+        <pc:spChg chg="add mod">
+          <ac:chgData name="Fiechter Sebastian (IT-PTR-EXT-EXT2 - Extern)" userId="f23e6d81-0328-4361-b5a9-44eea62aa731" providerId="ADAL" clId="{9681DBBF-CC28-48CE-8222-BE1E4CADF4A4}" dt="2024-07-15T14:41:39.054" v="5422" actId="207"/>
+          <ac:spMkLst>
+            <pc:docMk/>
+            <pc:sldMk cId="1151215240" sldId="256"/>
+            <ac:spMk id="268" creationId="{A7307A72-0A5C-F7BE-0A80-4651BC75CDEC}"/>
+          </ac:spMkLst>
+        </pc:spChg>
+        <pc:spChg chg="add del mod">
+          <ac:chgData name="Fiechter Sebastian (IT-PTR-EXT-EXT2 - Extern)" userId="f23e6d81-0328-4361-b5a9-44eea62aa731" providerId="ADAL" clId="{9681DBBF-CC28-48CE-8222-BE1E4CADF4A4}" dt="2024-06-24T14:45:51.899" v="2621" actId="478"/>
+          <ac:spMkLst>
+            <pc:docMk/>
+            <pc:sldMk cId="1151215240" sldId="256"/>
+            <ac:spMk id="268" creationId="{F970E808-3C62-698B-3118-2A58044FDB75}"/>
+          </ac:spMkLst>
+        </pc:spChg>
+        <pc:spChg chg="add mod">
+          <ac:chgData name="Fiechter Sebastian (IT-PTR-EXT-EXT2 - Extern)" userId="f23e6d81-0328-4361-b5a9-44eea62aa731" providerId="ADAL" clId="{9681DBBF-CC28-48CE-8222-BE1E4CADF4A4}" dt="2024-07-15T14:41:39.054" v="5422" actId="207"/>
+          <ac:spMkLst>
+            <pc:docMk/>
+            <pc:sldMk cId="1151215240" sldId="256"/>
+            <ac:spMk id="269" creationId="{7A2E22F8-05D0-7205-B23C-4ADA9BF669CE}"/>
+          </ac:spMkLst>
+        </pc:spChg>
+        <pc:spChg chg="add del mod">
+          <ac:chgData name="Fiechter Sebastian (IT-PTR-EXT-EXT2 - Extern)" userId="f23e6d81-0328-4361-b5a9-44eea62aa731" providerId="ADAL" clId="{9681DBBF-CC28-48CE-8222-BE1E4CADF4A4}" dt="2024-06-24T14:45:50.699" v="2620" actId="478"/>
+          <ac:spMkLst>
+            <pc:docMk/>
+            <pc:sldMk cId="1151215240" sldId="256"/>
+            <ac:spMk id="269" creationId="{B98181CC-E799-336C-2A45-D2C53FDFF337}"/>
+          </ac:spMkLst>
+        </pc:spChg>
+        <pc:spChg chg="add del mod">
+          <ac:chgData name="Fiechter Sebastian (IT-PTR-EXT-EXT2 - Extern)" userId="f23e6d81-0328-4361-b5a9-44eea62aa731" providerId="ADAL" clId="{9681DBBF-CC28-48CE-8222-BE1E4CADF4A4}" dt="2024-06-24T14:45:49.524" v="2619" actId="478"/>
+          <ac:spMkLst>
+            <pc:docMk/>
+            <pc:sldMk cId="1151215240" sldId="256"/>
+            <ac:spMk id="270" creationId="{614A3BC7-08D6-022D-2AAF-FD6ABA4B9AFE}"/>
+          </ac:spMkLst>
+        </pc:spChg>
+        <pc:spChg chg="add mod">
+          <ac:chgData name="Fiechter Sebastian (IT-PTR-EXT-EXT2 - Extern)" userId="f23e6d81-0328-4361-b5a9-44eea62aa731" providerId="ADAL" clId="{9681DBBF-CC28-48CE-8222-BE1E4CADF4A4}" dt="2024-07-15T14:41:39.054" v="5422" actId="207"/>
+          <ac:spMkLst>
+            <pc:docMk/>
+            <pc:sldMk cId="1151215240" sldId="256"/>
+            <ac:spMk id="270" creationId="{75AEEB2F-36E9-C484-359B-AA19B5FFC02B}"/>
+          </ac:spMkLst>
+        </pc:spChg>
+        <pc:spChg chg="add del mod">
+          <ac:chgData name="Fiechter Sebastian (IT-PTR-EXT-EXT2 - Extern)" userId="f23e6d81-0328-4361-b5a9-44eea62aa731" providerId="ADAL" clId="{9681DBBF-CC28-48CE-8222-BE1E4CADF4A4}" dt="2024-06-24T14:45:46.989" v="2616" actId="478"/>
+          <ac:spMkLst>
+            <pc:docMk/>
+            <pc:sldMk cId="1151215240" sldId="256"/>
+            <ac:spMk id="271" creationId="{27F9841B-EB91-A6E3-01E9-B4619AB806A0}"/>
+          </ac:spMkLst>
+        </pc:spChg>
+        <pc:spChg chg="add mod">
+          <ac:chgData name="Fiechter Sebastian (IT-PTR-EXT-EXT2 - Extern)" userId="f23e6d81-0328-4361-b5a9-44eea62aa731" providerId="ADAL" clId="{9681DBBF-CC28-48CE-8222-BE1E4CADF4A4}" dt="2024-07-16T14:38:45.489" v="5576" actId="1076"/>
+          <ac:spMkLst>
+            <pc:docMk/>
+            <pc:sldMk cId="1151215240" sldId="256"/>
+            <ac:spMk id="271" creationId="{6AAE397B-F5BA-828B-34DF-067B2E020C3D}"/>
+          </ac:spMkLst>
+        </pc:spChg>
+        <pc:spChg chg="add del mod">
+          <ac:chgData name="Fiechter Sebastian (IT-PTR-EXT-EXT2 - Extern)" userId="f23e6d81-0328-4361-b5a9-44eea62aa731" providerId="ADAL" clId="{9681DBBF-CC28-48CE-8222-BE1E4CADF4A4}" dt="2024-07-15T11:21:04.392" v="5063" actId="478"/>
+          <ac:spMkLst>
+            <pc:docMk/>
+            <pc:sldMk cId="1151215240" sldId="256"/>
+            <ac:spMk id="271" creationId="{B2B8A739-11B2-279D-5EC3-7EAF6089465C}"/>
+          </ac:spMkLst>
+        </pc:spChg>
+        <pc:spChg chg="add mod">
+          <ac:chgData name="Fiechter Sebastian (IT-PTR-EXT-EXT2 - Extern)" userId="f23e6d81-0328-4361-b5a9-44eea62aa731" providerId="ADAL" clId="{9681DBBF-CC28-48CE-8222-BE1E4CADF4A4}" dt="2024-07-15T14:41:39.054" v="5422" actId="207"/>
+          <ac:spMkLst>
+            <pc:docMk/>
+            <pc:sldMk cId="1151215240" sldId="256"/>
+            <ac:spMk id="272" creationId="{2F0B24E8-8990-9B37-E0B3-856043ACD4FC}"/>
+          </ac:spMkLst>
+        </pc:spChg>
+        <pc:spChg chg="add del mod">
+          <ac:chgData name="Fiechter Sebastian (IT-PTR-EXT-EXT2 - Extern)" userId="f23e6d81-0328-4361-b5a9-44eea62aa731" providerId="ADAL" clId="{9681DBBF-CC28-48CE-8222-BE1E4CADF4A4}" dt="2024-06-24T14:45:47.827" v="2617" actId="478"/>
+          <ac:spMkLst>
+            <pc:docMk/>
+            <pc:sldMk cId="1151215240" sldId="256"/>
+            <ac:spMk id="272" creationId="{466D23E6-FA66-48C1-2A73-B05C0A6EAC15}"/>
+          </ac:spMkLst>
+        </pc:spChg>
+        <pc:spChg chg="add mod">
+          <ac:chgData name="Fiechter Sebastian (IT-PTR-EXT-EXT2 - Extern)" userId="f23e6d81-0328-4361-b5a9-44eea62aa731" providerId="ADAL" clId="{9681DBBF-CC28-48CE-8222-BE1E4CADF4A4}" dt="2024-06-28T09:01:50.923" v="4784" actId="1037"/>
+          <ac:spMkLst>
+            <pc:docMk/>
+            <pc:sldMk cId="1151215240" sldId="256"/>
+            <ac:spMk id="273" creationId="{F076F8C5-9FB1-31D0-2582-88675739A37E}"/>
+          </ac:spMkLst>
+        </pc:spChg>
+        <pc:spChg chg="add mod">
+          <ac:chgData name="Fiechter Sebastian (IT-PTR-EXT-EXT2 - Extern)" userId="f23e6d81-0328-4361-b5a9-44eea62aa731" providerId="ADAL" clId="{9681DBBF-CC28-48CE-8222-BE1E4CADF4A4}" dt="2024-06-26T07:57:34.718" v="4439" actId="1035"/>
+          <ac:spMkLst>
+            <pc:docMk/>
+            <pc:sldMk cId="1151215240" sldId="256"/>
+            <ac:spMk id="274" creationId="{AEC26FF5-0325-7865-5118-E90AF89FD721}"/>
+          </ac:spMkLst>
+        </pc:spChg>
+        <pc:spChg chg="add mod">
+          <ac:chgData name="Fiechter Sebastian (IT-PTR-EXT-EXT2 - Extern)" userId="f23e6d81-0328-4361-b5a9-44eea62aa731" providerId="ADAL" clId="{9681DBBF-CC28-48CE-8222-BE1E4CADF4A4}" dt="2024-06-26T07:57:34.718" v="4439" actId="1035"/>
+          <ac:spMkLst>
+            <pc:docMk/>
+            <pc:sldMk cId="1151215240" sldId="256"/>
+            <ac:spMk id="275" creationId="{907FA588-A234-C11A-265E-18F8566F8A56}"/>
+          </ac:spMkLst>
+        </pc:spChg>
+        <pc:spChg chg="add mod">
+          <ac:chgData name="Fiechter Sebastian (IT-PTR-EXT-EXT2 - Extern)" userId="f23e6d81-0328-4361-b5a9-44eea62aa731" providerId="ADAL" clId="{9681DBBF-CC28-48CE-8222-BE1E4CADF4A4}" dt="2024-06-28T09:01:50.923" v="4784" actId="1037"/>
+          <ac:spMkLst>
+            <pc:docMk/>
+            <pc:sldMk cId="1151215240" sldId="256"/>
+            <ac:spMk id="276" creationId="{12CD96D9-F380-146E-FDBB-81CAF53E1664}"/>
+          </ac:spMkLst>
+        </pc:spChg>
+        <pc:spChg chg="add mod">
+          <ac:chgData name="Fiechter Sebastian (IT-PTR-EXT-EXT2 - Extern)" userId="f23e6d81-0328-4361-b5a9-44eea62aa731" providerId="ADAL" clId="{9681DBBF-CC28-48CE-8222-BE1E4CADF4A4}" dt="2024-06-28T09:01:50.923" v="4784" actId="1037"/>
+          <ac:spMkLst>
+            <pc:docMk/>
+            <pc:sldMk cId="1151215240" sldId="256"/>
+            <ac:spMk id="277" creationId="{31E4536F-5FAD-4A66-8CF3-68F6DDD66B07}"/>
+          </ac:spMkLst>
+        </pc:spChg>
+        <pc:spChg chg="add mod">
+          <ac:chgData name="Fiechter Sebastian (IT-PTR-EXT-EXT2 - Extern)" userId="f23e6d81-0328-4361-b5a9-44eea62aa731" providerId="ADAL" clId="{9681DBBF-CC28-48CE-8222-BE1E4CADF4A4}" dt="2024-06-28T09:05:23.614" v="4858" actId="1076"/>
+          <ac:spMkLst>
+            <pc:docMk/>
+            <pc:sldMk cId="1151215240" sldId="256"/>
+            <ac:spMk id="278" creationId="{32F86C01-C858-1987-372B-D2D61D769834}"/>
+          </ac:spMkLst>
+        </pc:spChg>
+        <pc:spChg chg="add mod">
+          <ac:chgData name="Fiechter Sebastian (IT-PTR-EXT-EXT2 - Extern)" userId="f23e6d81-0328-4361-b5a9-44eea62aa731" providerId="ADAL" clId="{9681DBBF-CC28-48CE-8222-BE1E4CADF4A4}" dt="2024-06-26T07:57:34.718" v="4439" actId="1035"/>
+          <ac:spMkLst>
+            <pc:docMk/>
+            <pc:sldMk cId="1151215240" sldId="256"/>
+            <ac:spMk id="279" creationId="{9BB9BD7A-8518-34F3-6ED3-17BFAA9FC375}"/>
+          </ac:spMkLst>
+        </pc:spChg>
+        <pc:spChg chg="add mod">
+          <ac:chgData name="Fiechter Sebastian (IT-PTR-EXT-EXT2 - Extern)" userId="f23e6d81-0328-4361-b5a9-44eea62aa731" providerId="ADAL" clId="{9681DBBF-CC28-48CE-8222-BE1E4CADF4A4}" dt="2024-06-26T07:57:34.718" v="4439" actId="1035"/>
+          <ac:spMkLst>
+            <pc:docMk/>
+            <pc:sldMk cId="1151215240" sldId="256"/>
+            <ac:spMk id="280" creationId="{DAD21ACB-D566-E4B3-1C45-3252DF5CF6A2}"/>
+          </ac:spMkLst>
+        </pc:spChg>
+        <pc:spChg chg="add mod">
+          <ac:chgData name="Fiechter Sebastian (IT-PTR-EXT-EXT2 - Extern)" userId="f23e6d81-0328-4361-b5a9-44eea62aa731" providerId="ADAL" clId="{9681DBBF-CC28-48CE-8222-BE1E4CADF4A4}" dt="2024-06-26T07:57:34.718" v="4439" actId="1035"/>
+          <ac:spMkLst>
+            <pc:docMk/>
+            <pc:sldMk cId="1151215240" sldId="256"/>
+            <ac:spMk id="281" creationId="{61B54EC7-3BE4-4F85-93AA-970D790FEF7F}"/>
+          </ac:spMkLst>
+        </pc:spChg>
+        <pc:spChg chg="add mod">
+          <ac:chgData name="Fiechter Sebastian (IT-PTR-EXT-EXT2 - Extern)" userId="f23e6d81-0328-4361-b5a9-44eea62aa731" providerId="ADAL" clId="{9681DBBF-CC28-48CE-8222-BE1E4CADF4A4}" dt="2024-06-26T07:57:34.718" v="4439" actId="1035"/>
+          <ac:spMkLst>
+            <pc:docMk/>
+            <pc:sldMk cId="1151215240" sldId="256"/>
+            <ac:spMk id="282" creationId="{4039402A-B998-FCC4-F90D-3D4F30BE77A8}"/>
+          </ac:spMkLst>
+        </pc:spChg>
+        <pc:spChg chg="add mod">
+          <ac:chgData name="Fiechter Sebastian (IT-PTR-EXT-EXT2 - Extern)" userId="f23e6d81-0328-4361-b5a9-44eea62aa731" providerId="ADAL" clId="{9681DBBF-CC28-48CE-8222-BE1E4CADF4A4}" dt="2024-06-26T07:57:34.718" v="4439" actId="1035"/>
+          <ac:spMkLst>
+            <pc:docMk/>
+            <pc:sldMk cId="1151215240" sldId="256"/>
+            <ac:spMk id="283" creationId="{6258A5E3-F44D-9F0C-F925-CEE453C48C41}"/>
+          </ac:spMkLst>
+        </pc:spChg>
+        <pc:spChg chg="add mod">
+          <ac:chgData name="Fiechter Sebastian (IT-PTR-EXT-EXT2 - Extern)" userId="f23e6d81-0328-4361-b5a9-44eea62aa731" providerId="ADAL" clId="{9681DBBF-CC28-48CE-8222-BE1E4CADF4A4}" dt="2024-06-28T09:01:50.923" v="4784" actId="1037"/>
+          <ac:spMkLst>
+            <pc:docMk/>
+            <pc:sldMk cId="1151215240" sldId="256"/>
+            <ac:spMk id="284" creationId="{138D2AF1-8700-C6FD-058E-1A658D51F2B9}"/>
+          </ac:spMkLst>
+        </pc:spChg>
+        <pc:spChg chg="add mod">
+          <ac:chgData name="Fiechter Sebastian (IT-PTR-EXT-EXT2 - Extern)" userId="f23e6d81-0328-4361-b5a9-44eea62aa731" providerId="ADAL" clId="{9681DBBF-CC28-48CE-8222-BE1E4CADF4A4}" dt="2024-06-28T09:01:50.923" v="4784" actId="1037"/>
+          <ac:spMkLst>
+            <pc:docMk/>
+            <pc:sldMk cId="1151215240" sldId="256"/>
+            <ac:spMk id="285" creationId="{969CD681-78D2-BD98-97E7-AC1166EC9D03}"/>
+          </ac:spMkLst>
+        </pc:spChg>
+        <pc:spChg chg="add mod">
+          <ac:chgData name="Fiechter Sebastian (IT-PTR-EXT-EXT2 - Extern)" userId="f23e6d81-0328-4361-b5a9-44eea62aa731" providerId="ADAL" clId="{9681DBBF-CC28-48CE-8222-BE1E4CADF4A4}" dt="2024-06-28T09:05:23.614" v="4858" actId="1076"/>
+          <ac:spMkLst>
+            <pc:docMk/>
+            <pc:sldMk cId="1151215240" sldId="256"/>
+            <ac:spMk id="286" creationId="{60D0597F-CBEE-77BD-C752-20BA3F456121}"/>
+          </ac:spMkLst>
+        </pc:spChg>
+        <pc:spChg chg="add mod">
+          <ac:chgData name="Fiechter Sebastian (IT-PTR-EXT-EXT2 - Extern)" userId="f23e6d81-0328-4361-b5a9-44eea62aa731" providerId="ADAL" clId="{9681DBBF-CC28-48CE-8222-BE1E4CADF4A4}" dt="2024-06-26T07:57:34.718" v="4439" actId="1035"/>
+          <ac:spMkLst>
+            <pc:docMk/>
+            <pc:sldMk cId="1151215240" sldId="256"/>
+            <ac:spMk id="287" creationId="{EC9F7846-4B2F-AC59-A87A-FAF7E58A97EA}"/>
+          </ac:spMkLst>
+        </pc:spChg>
+        <pc:spChg chg="add mod">
+          <ac:chgData name="Fiechter Sebastian (IT-PTR-EXT-EXT2 - Extern)" userId="f23e6d81-0328-4361-b5a9-44eea62aa731" providerId="ADAL" clId="{9681DBBF-CC28-48CE-8222-BE1E4CADF4A4}" dt="2024-06-26T07:57:34.718" v="4439" actId="1035"/>
+          <ac:spMkLst>
+            <pc:docMk/>
+            <pc:sldMk cId="1151215240" sldId="256"/>
+            <ac:spMk id="288" creationId="{5F07765F-3DC5-4DF5-05E3-607C72C0D00A}"/>
+          </ac:spMkLst>
+        </pc:spChg>
+        <pc:spChg chg="add mod">
+          <ac:chgData name="Fiechter Sebastian (IT-PTR-EXT-EXT2 - Extern)" userId="f23e6d81-0328-4361-b5a9-44eea62aa731" providerId="ADAL" clId="{9681DBBF-CC28-48CE-8222-BE1E4CADF4A4}" dt="2024-06-26T07:57:34.718" v="4439" actId="1035"/>
+          <ac:spMkLst>
+            <pc:docMk/>
+            <pc:sldMk cId="1151215240" sldId="256"/>
+            <ac:spMk id="289" creationId="{998C8571-9785-47C0-AAC0-35F3166F5BE3}"/>
+          </ac:spMkLst>
+        </pc:spChg>
+        <pc:spChg chg="add mod">
+          <ac:chgData name="Fiechter Sebastian (IT-PTR-EXT-EXT2 - Extern)" userId="f23e6d81-0328-4361-b5a9-44eea62aa731" providerId="ADAL" clId="{9681DBBF-CC28-48CE-8222-BE1E4CADF4A4}" dt="2024-06-26T07:57:34.718" v="4439" actId="1035"/>
+          <ac:spMkLst>
+            <pc:docMk/>
+            <pc:sldMk cId="1151215240" sldId="256"/>
+            <ac:spMk id="290" creationId="{72599F34-80C7-61DF-01A8-68828305277C}"/>
+          </ac:spMkLst>
+        </pc:spChg>
+        <pc:spChg chg="add mod">
+          <ac:chgData name="Fiechter Sebastian (IT-PTR-EXT-EXT2 - Extern)" userId="f23e6d81-0328-4361-b5a9-44eea62aa731" providerId="ADAL" clId="{9681DBBF-CC28-48CE-8222-BE1E4CADF4A4}" dt="2024-06-26T07:57:34.718" v="4439" actId="1035"/>
+          <ac:spMkLst>
+            <pc:docMk/>
+            <pc:sldMk cId="1151215240" sldId="256"/>
+            <ac:spMk id="291" creationId="{29237D60-4DD5-5AFA-EAFD-A672367E751B}"/>
+          </ac:spMkLst>
+        </pc:spChg>
+        <pc:spChg chg="add mod">
+          <ac:chgData name="Fiechter Sebastian (IT-PTR-EXT-EXT2 - Extern)" userId="f23e6d81-0328-4361-b5a9-44eea62aa731" providerId="ADAL" clId="{9681DBBF-CC28-48CE-8222-BE1E4CADF4A4}" dt="2024-06-26T07:57:34.718" v="4439" actId="1035"/>
+          <ac:spMkLst>
+            <pc:docMk/>
+            <pc:sldMk cId="1151215240" sldId="256"/>
+            <ac:spMk id="292" creationId="{CC80D1CB-E5D6-1B24-95A0-6F9EFB6853E9}"/>
+          </ac:spMkLst>
+        </pc:spChg>
+        <pc:spChg chg="add del mod">
+          <ac:chgData name="Fiechter Sebastian (IT-PTR-EXT-EXT2 - Extern)" userId="f23e6d81-0328-4361-b5a9-44eea62aa731" providerId="ADAL" clId="{9681DBBF-CC28-48CE-8222-BE1E4CADF4A4}" dt="2024-06-24T14:58:00.524" v="3155" actId="478"/>
+          <ac:spMkLst>
+            <pc:docMk/>
+            <pc:sldMk cId="1151215240" sldId="256"/>
+            <ac:spMk id="293" creationId="{A87EDD93-7BEE-08FC-0782-A41A0D91EBBB}"/>
+          </ac:spMkLst>
+        </pc:spChg>
+        <pc:spChg chg="add mod">
+          <ac:chgData name="Fiechter Sebastian (IT-PTR-EXT-EXT2 - Extern)" userId="f23e6d81-0328-4361-b5a9-44eea62aa731" providerId="ADAL" clId="{9681DBBF-CC28-48CE-8222-BE1E4CADF4A4}" dt="2024-06-28T09:01:50.923" v="4784" actId="1037"/>
+          <ac:spMkLst>
+            <pc:docMk/>
+            <pc:sldMk cId="1151215240" sldId="256"/>
+            <ac:spMk id="294" creationId="{9066EC92-C8BD-78A5-9797-9EB17B73CF43}"/>
+          </ac:spMkLst>
+        </pc:spChg>
+        <pc:spChg chg="add mod">
+          <ac:chgData name="Fiechter Sebastian (IT-PTR-EXT-EXT2 - Extern)" userId="f23e6d81-0328-4361-b5a9-44eea62aa731" providerId="ADAL" clId="{9681DBBF-CC28-48CE-8222-BE1E4CADF4A4}" dt="2024-06-28T09:01:50.923" v="4784" actId="1037"/>
+          <ac:spMkLst>
+            <pc:docMk/>
+            <pc:sldMk cId="1151215240" sldId="256"/>
+            <ac:spMk id="295" creationId="{AB58F419-1C40-24D9-2249-49BE425897DB}"/>
+          </ac:spMkLst>
+        </pc:spChg>
+        <pc:spChg chg="add mod">
+          <ac:chgData name="Fiechter Sebastian (IT-PTR-EXT-EXT2 - Extern)" userId="f23e6d81-0328-4361-b5a9-44eea62aa731" providerId="ADAL" clId="{9681DBBF-CC28-48CE-8222-BE1E4CADF4A4}" dt="2024-06-28T09:01:50.923" v="4784" actId="1037"/>
+          <ac:spMkLst>
+            <pc:docMk/>
+            <pc:sldMk cId="1151215240" sldId="256"/>
+            <ac:spMk id="296" creationId="{49573702-AF55-DE38-4B70-99BAAADAD269}"/>
+          </ac:spMkLst>
+        </pc:spChg>
+        <pc:spChg chg="add mod">
+          <ac:chgData name="Fiechter Sebastian (IT-PTR-EXT-EXT2 - Extern)" userId="f23e6d81-0328-4361-b5a9-44eea62aa731" providerId="ADAL" clId="{9681DBBF-CC28-48CE-8222-BE1E4CADF4A4}" dt="2024-06-28T09:01:50.923" v="4784" actId="1037"/>
+          <ac:spMkLst>
+            <pc:docMk/>
+            <pc:sldMk cId="1151215240" sldId="256"/>
+            <ac:spMk id="297" creationId="{10C207DC-31E3-A9AC-F9FC-E90E8F0DD100}"/>
+          </ac:spMkLst>
+        </pc:spChg>
+        <pc:spChg chg="add mod">
+          <ac:chgData name="Fiechter Sebastian (IT-PTR-EXT-EXT2 - Extern)" userId="f23e6d81-0328-4361-b5a9-44eea62aa731" providerId="ADAL" clId="{9681DBBF-CC28-48CE-8222-BE1E4CADF4A4}" dt="2024-06-26T07:57:34.718" v="4439" actId="1035"/>
+          <ac:spMkLst>
+            <pc:docMk/>
+            <pc:sldMk cId="1151215240" sldId="256"/>
+            <ac:spMk id="298" creationId="{DB7401DA-EC44-AE62-B9F7-F6A0D3C14C04}"/>
+          </ac:spMkLst>
+        </pc:spChg>
+        <pc:spChg chg="add del mod">
+          <ac:chgData name="Fiechter Sebastian (IT-PTR-EXT-EXT2 - Extern)" userId="f23e6d81-0328-4361-b5a9-44eea62aa731" providerId="ADAL" clId="{9681DBBF-CC28-48CE-8222-BE1E4CADF4A4}" dt="2024-07-15T14:35:19.134" v="5347" actId="478"/>
+          <ac:spMkLst>
+            <pc:docMk/>
+            <pc:sldMk cId="1151215240" sldId="256"/>
+            <ac:spMk id="299" creationId="{7F5F00E9-6888-9B2A-A68F-4F7D3FA8CB07}"/>
+          </ac:spMkLst>
+        </pc:spChg>
+        <pc:spChg chg="add mod">
+          <ac:chgData name="Fiechter Sebastian (IT-PTR-EXT-EXT2 - Extern)" userId="f23e6d81-0328-4361-b5a9-44eea62aa731" providerId="ADAL" clId="{9681DBBF-CC28-48CE-8222-BE1E4CADF4A4}" dt="2024-07-15T14:37:29.516" v="5410" actId="14100"/>
+          <ac:spMkLst>
+            <pc:docMk/>
+            <pc:sldMk cId="1151215240" sldId="256"/>
+            <ac:spMk id="300" creationId="{02257FEF-DA9A-E201-738A-1B4B117E9FCA}"/>
+          </ac:spMkLst>
+        </pc:spChg>
+        <pc:spChg chg="mod">
+          <ac:chgData name="Fiechter Sebastian (IT-PTR-EXT-EXT2 - Extern)" userId="f23e6d81-0328-4361-b5a9-44eea62aa731" providerId="ADAL" clId="{9681DBBF-CC28-48CE-8222-BE1E4CADF4A4}" dt="2024-06-25T08:17:42.555" v="3816" actId="207"/>
+          <ac:spMkLst>
+            <pc:docMk/>
+            <pc:sldMk cId="1151215240" sldId="256"/>
+            <ac:spMk id="304" creationId="{31578568-8F19-1ADE-5D48-460EBDB93BB7}"/>
+          </ac:spMkLst>
+        </pc:spChg>
+        <pc:spChg chg="add mod">
+          <ac:chgData name="Fiechter Sebastian (IT-PTR-EXT-EXT2 - Extern)" userId="f23e6d81-0328-4361-b5a9-44eea62aa731" providerId="ADAL" clId="{9681DBBF-CC28-48CE-8222-BE1E4CADF4A4}" dt="2024-06-26T07:59:04.179" v="4498" actId="1037"/>
+          <ac:spMkLst>
+            <pc:docMk/>
+            <pc:sldMk cId="1151215240" sldId="256"/>
+            <ac:spMk id="307" creationId="{CD8F80FC-A024-3AC7-CAF2-8F441913EAE1}"/>
+          </ac:spMkLst>
+        </pc:spChg>
+        <pc:spChg chg="add mod">
+          <ac:chgData name="Fiechter Sebastian (IT-PTR-EXT-EXT2 - Extern)" userId="f23e6d81-0328-4361-b5a9-44eea62aa731" providerId="ADAL" clId="{9681DBBF-CC28-48CE-8222-BE1E4CADF4A4}" dt="2024-06-26T07:59:04.179" v="4498" actId="1037"/>
+          <ac:spMkLst>
+            <pc:docMk/>
+            <pc:sldMk cId="1151215240" sldId="256"/>
+            <ac:spMk id="308" creationId="{BD779CB8-596F-E331-8F9E-71F5AD462276}"/>
+          </ac:spMkLst>
+        </pc:spChg>
+        <pc:spChg chg="add mod ord">
+          <ac:chgData name="Fiechter Sebastian (IT-PTR-EXT-EXT2 - Extern)" userId="f23e6d81-0328-4361-b5a9-44eea62aa731" providerId="ADAL" clId="{9681DBBF-CC28-48CE-8222-BE1E4CADF4A4}" dt="2024-06-26T07:57:34.718" v="4439" actId="1035"/>
+          <ac:spMkLst>
+            <pc:docMk/>
+            <pc:sldMk cId="1151215240" sldId="256"/>
+            <ac:spMk id="309" creationId="{DAA8E3C3-086E-E14C-1037-E1FFD3211F3D}"/>
+          </ac:spMkLst>
+        </pc:spChg>
+        <pc:spChg chg="add mod">
+          <ac:chgData name="Fiechter Sebastian (IT-PTR-EXT-EXT2 - Extern)" userId="f23e6d81-0328-4361-b5a9-44eea62aa731" providerId="ADAL" clId="{9681DBBF-CC28-48CE-8222-BE1E4CADF4A4}" dt="2024-06-26T07:57:34.718" v="4439" actId="1035"/>
+          <ac:spMkLst>
+            <pc:docMk/>
+            <pc:sldMk cId="1151215240" sldId="256"/>
+            <ac:spMk id="310" creationId="{D1B23F8F-CC18-0B4A-F984-BB25F4A42F14}"/>
+          </ac:spMkLst>
+        </pc:spChg>
+        <pc:spChg chg="add mod">
+          <ac:chgData name="Fiechter Sebastian (IT-PTR-EXT-EXT2 - Extern)" userId="f23e6d81-0328-4361-b5a9-44eea62aa731" providerId="ADAL" clId="{9681DBBF-CC28-48CE-8222-BE1E4CADF4A4}" dt="2024-06-26T07:57:34.718" v="4439" actId="1035"/>
+          <ac:spMkLst>
+            <pc:docMk/>
+            <pc:sldMk cId="1151215240" sldId="256"/>
+            <ac:spMk id="311" creationId="{67BC26AC-5167-3DCE-3975-799F649795E0}"/>
+          </ac:spMkLst>
+        </pc:spChg>
+        <pc:spChg chg="add mod">
+          <ac:chgData name="Fiechter Sebastian (IT-PTR-EXT-EXT2 - Extern)" userId="f23e6d81-0328-4361-b5a9-44eea62aa731" providerId="ADAL" clId="{9681DBBF-CC28-48CE-8222-BE1E4CADF4A4}" dt="2024-06-26T07:57:34.718" v="4439" actId="1035"/>
+          <ac:spMkLst>
+            <pc:docMk/>
+            <pc:sldMk cId="1151215240" sldId="256"/>
+            <ac:spMk id="312" creationId="{4C4AF730-4E9E-05BC-07EF-1762E83A29E0}"/>
+          </ac:spMkLst>
+        </pc:spChg>
+        <pc:spChg chg="add mod">
+          <ac:chgData name="Fiechter Sebastian (IT-PTR-EXT-EXT2 - Extern)" userId="f23e6d81-0328-4361-b5a9-44eea62aa731" providerId="ADAL" clId="{9681DBBF-CC28-48CE-8222-BE1E4CADF4A4}" dt="2024-06-26T07:57:34.718" v="4439" actId="1035"/>
+          <ac:spMkLst>
+            <pc:docMk/>
+            <pc:sldMk cId="1151215240" sldId="256"/>
+            <ac:spMk id="313" creationId="{7CFD026B-B94D-5F2E-478F-B3B4E6A46FD4}"/>
+          </ac:spMkLst>
+        </pc:spChg>
+        <pc:spChg chg="add mod">
+          <ac:chgData name="Fiechter Sebastian (IT-PTR-EXT-EXT2 - Extern)" userId="f23e6d81-0328-4361-b5a9-44eea62aa731" providerId="ADAL" clId="{9681DBBF-CC28-48CE-8222-BE1E4CADF4A4}" dt="2024-06-26T07:57:34.718" v="4439" actId="1035"/>
+          <ac:spMkLst>
+            <pc:docMk/>
+            <pc:sldMk cId="1151215240" sldId="256"/>
+            <ac:spMk id="318" creationId="{3E673FB9-C2F6-2DCE-D80C-7CBB472E73AA}"/>
+          </ac:spMkLst>
+        </pc:spChg>
+        <pc:spChg chg="add del mod">
+          <ac:chgData name="Fiechter Sebastian (IT-PTR-EXT-EXT2 - Extern)" userId="f23e6d81-0328-4361-b5a9-44eea62aa731" providerId="ADAL" clId="{9681DBBF-CC28-48CE-8222-BE1E4CADF4A4}" dt="2024-07-15T14:33:04.417" v="5280" actId="21"/>
+          <ac:spMkLst>
+            <pc:docMk/>
+            <pc:sldMk cId="1151215240" sldId="256"/>
+            <ac:spMk id="321" creationId="{D38661AF-329D-9419-2C92-76B0C82407F0}"/>
+          </ac:spMkLst>
+        </pc:spChg>
+        <pc:spChg chg="add mod">
+          <ac:chgData name="Fiechter Sebastian (IT-PTR-EXT-EXT2 - Extern)" userId="f23e6d81-0328-4361-b5a9-44eea62aa731" providerId="ADAL" clId="{9681DBBF-CC28-48CE-8222-BE1E4CADF4A4}" dt="2024-06-26T07:57:34.718" v="4439" actId="1035"/>
+          <ac:spMkLst>
+            <pc:docMk/>
+            <pc:sldMk cId="1151215240" sldId="256"/>
+            <ac:spMk id="322" creationId="{22404C69-D46F-79B7-4483-20C8D136736A}"/>
+          </ac:spMkLst>
+        </pc:spChg>
+        <pc:spChg chg="add mod">
+          <ac:chgData name="Fiechter Sebastian (IT-PTR-EXT-EXT2 - Extern)" userId="f23e6d81-0328-4361-b5a9-44eea62aa731" providerId="ADAL" clId="{9681DBBF-CC28-48CE-8222-BE1E4CADF4A4}" dt="2024-06-26T07:57:34.718" v="4439" actId="1035"/>
+          <ac:spMkLst>
+            <pc:docMk/>
+            <pc:sldMk cId="1151215240" sldId="256"/>
+            <ac:spMk id="323" creationId="{39B83BDF-2EE7-B62C-EB6C-A39277BC93CA}"/>
+          </ac:spMkLst>
+        </pc:spChg>
+        <pc:spChg chg="add mod">
+          <ac:chgData name="Fiechter Sebastian (IT-PTR-EXT-EXT2 - Extern)" userId="f23e6d81-0328-4361-b5a9-44eea62aa731" providerId="ADAL" clId="{9681DBBF-CC28-48CE-8222-BE1E4CADF4A4}" dt="2024-06-26T07:57:34.718" v="4439" actId="1035"/>
+          <ac:spMkLst>
+            <pc:docMk/>
+            <pc:sldMk cId="1151215240" sldId="256"/>
+            <ac:spMk id="324" creationId="{E4AA3B9A-F81D-5F1E-B88F-ABAA69B0129D}"/>
+          </ac:spMkLst>
+        </pc:spChg>
+        <pc:spChg chg="add mod">
+          <ac:chgData name="Fiechter Sebastian (IT-PTR-EXT-EXT2 - Extern)" userId="f23e6d81-0328-4361-b5a9-44eea62aa731" providerId="ADAL" clId="{9681DBBF-CC28-48CE-8222-BE1E4CADF4A4}" dt="2024-06-26T07:57:34.718" v="4439" actId="1035"/>
+          <ac:spMkLst>
+            <pc:docMk/>
+            <pc:sldMk cId="1151215240" sldId="256"/>
+            <ac:spMk id="327" creationId="{7E8808E2-5203-11EF-2A41-DA53282C38D9}"/>
+          </ac:spMkLst>
+        </pc:spChg>
+        <pc:spChg chg="add mod">
+          <ac:chgData name="Fiechter Sebastian (IT-PTR-EXT-EXT2 - Extern)" userId="f23e6d81-0328-4361-b5a9-44eea62aa731" providerId="ADAL" clId="{9681DBBF-CC28-48CE-8222-BE1E4CADF4A4}" dt="2024-06-26T07:57:34.718" v="4439" actId="1035"/>
+          <ac:spMkLst>
+            <pc:docMk/>
+            <pc:sldMk cId="1151215240" sldId="256"/>
+            <ac:spMk id="329" creationId="{86E2D0B5-9634-3216-2383-07932CA88A56}"/>
+          </ac:spMkLst>
+        </pc:spChg>
+        <pc:spChg chg="add mod">
+          <ac:chgData name="Fiechter Sebastian (IT-PTR-EXT-EXT2 - Extern)" userId="f23e6d81-0328-4361-b5a9-44eea62aa731" providerId="ADAL" clId="{9681DBBF-CC28-48CE-8222-BE1E4CADF4A4}" dt="2024-06-26T07:57:34.718" v="4439" actId="1035"/>
+          <ac:spMkLst>
+            <pc:docMk/>
+            <pc:sldMk cId="1151215240" sldId="256"/>
+            <ac:spMk id="331" creationId="{B62C978A-DE99-72A5-4BE2-EB2A13DDA6FC}"/>
+          </ac:spMkLst>
+        </pc:spChg>
+        <pc:spChg chg="add mod">
+          <ac:chgData name="Fiechter Sebastian (IT-PTR-EXT-EXT2 - Extern)" userId="f23e6d81-0328-4361-b5a9-44eea62aa731" providerId="ADAL" clId="{9681DBBF-CC28-48CE-8222-BE1E4CADF4A4}" dt="2024-06-26T07:57:34.718" v="4439" actId="1035"/>
+          <ac:spMkLst>
+            <pc:docMk/>
+            <pc:sldMk cId="1151215240" sldId="256"/>
+            <ac:spMk id="332" creationId="{43F29CAB-82D5-7B72-CD09-81F022643D0F}"/>
+          </ac:spMkLst>
+        </pc:spChg>
+        <pc:spChg chg="add mod">
+          <ac:chgData name="Fiechter Sebastian (IT-PTR-EXT-EXT2 - Extern)" userId="f23e6d81-0328-4361-b5a9-44eea62aa731" providerId="ADAL" clId="{9681DBBF-CC28-48CE-8222-BE1E4CADF4A4}" dt="2024-06-26T07:57:34.718" v="4439" actId="1035"/>
+          <ac:spMkLst>
+            <pc:docMk/>
+            <pc:sldMk cId="1151215240" sldId="256"/>
+            <ac:spMk id="335" creationId="{79E7866D-D0EC-B0B8-ED41-4EC783630AFD}"/>
+          </ac:spMkLst>
+        </pc:spChg>
+        <pc:grpChg chg="add del mod">
+          <ac:chgData name="Fiechter Sebastian (IT-PTR-EXT-EXT2 - Extern)" userId="f23e6d81-0328-4361-b5a9-44eea62aa731" providerId="ADAL" clId="{9681DBBF-CC28-48CE-8222-BE1E4CADF4A4}" dt="2024-06-26T09:23:33.065" v="4546" actId="478"/>
+          <ac:grpSpMkLst>
+            <pc:docMk/>
+            <pc:sldMk cId="1151215240" sldId="256"/>
+            <ac:grpSpMk id="7" creationId="{44ACBE53-B3FD-51B6-64B0-BDA2B49FC87C}"/>
+          </ac:grpSpMkLst>
+        </pc:grpChg>
+        <pc:grpChg chg="add mod">
+          <ac:chgData name="Fiechter Sebastian (IT-PTR-EXT-EXT2 - Extern)" userId="f23e6d81-0328-4361-b5a9-44eea62aa731" providerId="ADAL" clId="{9681DBBF-CC28-48CE-8222-BE1E4CADF4A4}" dt="2024-06-26T07:57:34.718" v="4439" actId="1035"/>
+          <ac:grpSpMkLst>
+            <pc:docMk/>
+            <pc:sldMk cId="1151215240" sldId="256"/>
+            <ac:grpSpMk id="14" creationId="{87890DF1-B8D4-07A2-447C-335F5F61F007}"/>
+          </ac:grpSpMkLst>
+        </pc:grpChg>
+        <pc:grpChg chg="add mod">
+          <ac:chgData name="Fiechter Sebastian (IT-PTR-EXT-EXT2 - Extern)" userId="f23e6d81-0328-4361-b5a9-44eea62aa731" providerId="ADAL" clId="{9681DBBF-CC28-48CE-8222-BE1E4CADF4A4}" dt="2024-06-26T07:57:34.718" v="4439" actId="1035"/>
+          <ac:grpSpMkLst>
+            <pc:docMk/>
+            <pc:sldMk cId="1151215240" sldId="256"/>
+            <ac:grpSpMk id="15" creationId="{64579987-63CF-5C9A-0540-B4F5636CE7CE}"/>
+          </ac:grpSpMkLst>
+        </pc:grpChg>
+        <pc:grpChg chg="add mod">
+          <ac:chgData name="Fiechter Sebastian (IT-PTR-EXT-EXT2 - Extern)" userId="f23e6d81-0328-4361-b5a9-44eea62aa731" providerId="ADAL" clId="{9681DBBF-CC28-48CE-8222-BE1E4CADF4A4}" dt="2024-06-26T07:57:34.718" v="4439" actId="1035"/>
+          <ac:grpSpMkLst>
+            <pc:docMk/>
+            <pc:sldMk cId="1151215240" sldId="256"/>
+            <ac:grpSpMk id="19" creationId="{070BB2E5-1817-B437-27AF-B1CEF0CA1DAF}"/>
+          </ac:grpSpMkLst>
+        </pc:grpChg>
+        <pc:grpChg chg="add mod">
+          <ac:chgData name="Fiechter Sebastian (IT-PTR-EXT-EXT2 - Extern)" userId="f23e6d81-0328-4361-b5a9-44eea62aa731" providerId="ADAL" clId="{9681DBBF-CC28-48CE-8222-BE1E4CADF4A4}" dt="2024-06-26T07:57:34.718" v="4439" actId="1035"/>
+          <ac:grpSpMkLst>
+            <pc:docMk/>
+            <pc:sldMk cId="1151215240" sldId="256"/>
+            <ac:grpSpMk id="23" creationId="{75ACA997-819D-17AE-C206-6F2E47CB66B2}"/>
+          </ac:grpSpMkLst>
+        </pc:grpChg>
+        <pc:grpChg chg="add mod">
+          <ac:chgData name="Fiechter Sebastian (IT-PTR-EXT-EXT2 - Extern)" userId="f23e6d81-0328-4361-b5a9-44eea62aa731" providerId="ADAL" clId="{9681DBBF-CC28-48CE-8222-BE1E4CADF4A4}" dt="2024-06-28T09:04:35.552" v="4844" actId="1038"/>
+          <ac:grpSpMkLst>
+            <pc:docMk/>
+            <pc:sldMk cId="1151215240" sldId="256"/>
+            <ac:grpSpMk id="27" creationId="{41C79572-E199-19FF-6B28-DB93A550215B}"/>
+          </ac:grpSpMkLst>
+        </pc:grpChg>
+        <pc:grpChg chg="add mod">
+          <ac:chgData name="Fiechter Sebastian (IT-PTR-EXT-EXT2 - Extern)" userId="f23e6d81-0328-4361-b5a9-44eea62aa731" providerId="ADAL" clId="{9681DBBF-CC28-48CE-8222-BE1E4CADF4A4}" dt="2024-06-28T09:04:35.552" v="4844" actId="1038"/>
+          <ac:grpSpMkLst>
+            <pc:docMk/>
+            <pc:sldMk cId="1151215240" sldId="256"/>
+            <ac:grpSpMk id="31" creationId="{4055EE09-7CB5-CEC9-BBD4-094D20B9B6CE}"/>
+          </ac:grpSpMkLst>
+        </pc:grpChg>
+        <pc:grpChg chg="add mod">
+          <ac:chgData name="Fiechter Sebastian (IT-PTR-EXT-EXT2 - Extern)" userId="f23e6d81-0328-4361-b5a9-44eea62aa731" providerId="ADAL" clId="{9681DBBF-CC28-48CE-8222-BE1E4CADF4A4}" dt="2024-06-28T09:04:35.552" v="4844" actId="1038"/>
+          <ac:grpSpMkLst>
+            <pc:docMk/>
+            <pc:sldMk cId="1151215240" sldId="256"/>
+            <ac:grpSpMk id="35" creationId="{2BFBB1D2-CE8A-9504-CFFC-8085935F3107}"/>
+          </ac:grpSpMkLst>
+        </pc:grpChg>
+        <pc:grpChg chg="add mod">
+          <ac:chgData name="Fiechter Sebastian (IT-PTR-EXT-EXT2 - Extern)" userId="f23e6d81-0328-4361-b5a9-44eea62aa731" providerId="ADAL" clId="{9681DBBF-CC28-48CE-8222-BE1E4CADF4A4}" dt="2024-06-28T09:04:35.552" v="4844" actId="1038"/>
+          <ac:grpSpMkLst>
+            <pc:docMk/>
+            <pc:sldMk cId="1151215240" sldId="256"/>
+            <ac:grpSpMk id="39" creationId="{1CDA2FEC-2AC8-B645-2387-445A84D65674}"/>
+          </ac:grpSpMkLst>
+        </pc:grpChg>
+        <pc:grpChg chg="add mod">
+          <ac:chgData name="Fiechter Sebastian (IT-PTR-EXT-EXT2 - Extern)" userId="f23e6d81-0328-4361-b5a9-44eea62aa731" providerId="ADAL" clId="{9681DBBF-CC28-48CE-8222-BE1E4CADF4A4}" dt="2024-07-15T14:32:41.049" v="5277" actId="1038"/>
+          <ac:grpSpMkLst>
+            <pc:docMk/>
+            <pc:sldMk cId="1151215240" sldId="256"/>
+            <ac:grpSpMk id="43" creationId="{FC1A4126-11B2-5004-1997-153608DB0410}"/>
+          </ac:grpSpMkLst>
+        </pc:grpChg>
+        <pc:grpChg chg="add mod">
+          <ac:chgData name="Fiechter Sebastian (IT-PTR-EXT-EXT2 - Extern)" userId="f23e6d81-0328-4361-b5a9-44eea62aa731" providerId="ADAL" clId="{9681DBBF-CC28-48CE-8222-BE1E4CADF4A4}" dt="2024-06-28T09:03:19.345" v="4786" actId="1076"/>
+          <ac:grpSpMkLst>
+            <pc:docMk/>
+            <pc:sldMk cId="1151215240" sldId="256"/>
+            <ac:grpSpMk id="47" creationId="{ABFB85A2-6D93-FB35-81D5-E37E04FCFDA5}"/>
+          </ac:grpSpMkLst>
+        </pc:grpChg>
+        <pc:grpChg chg="add mod">
+          <ac:chgData name="Fiechter Sebastian (IT-PTR-EXT-EXT2 - Extern)" userId="f23e6d81-0328-4361-b5a9-44eea62aa731" providerId="ADAL" clId="{9681DBBF-CC28-48CE-8222-BE1E4CADF4A4}" dt="2024-07-15T14:32:24.856" v="5273" actId="1037"/>
+          <ac:grpSpMkLst>
+            <pc:docMk/>
+            <pc:sldMk cId="1151215240" sldId="256"/>
+            <ac:grpSpMk id="51" creationId="{8340234C-AF41-65DE-C09A-F7CF96895054}"/>
+          </ac:grpSpMkLst>
+        </pc:grpChg>
+        <pc:grpChg chg="add mod">
+          <ac:chgData name="Fiechter Sebastian (IT-PTR-EXT-EXT2 - Extern)" userId="f23e6d81-0328-4361-b5a9-44eea62aa731" providerId="ADAL" clId="{9681DBBF-CC28-48CE-8222-BE1E4CADF4A4}" dt="2024-06-28T09:02:49.719" v="4785" actId="1076"/>
+          <ac:grpSpMkLst>
+            <pc:docMk/>
+            <pc:sldMk cId="1151215240" sldId="256"/>
+            <ac:grpSpMk id="55" creationId="{6DBF1FF3-D634-6FCF-C197-5887C2958B00}"/>
+          </ac:grpSpMkLst>
+        </pc:grpChg>
+        <pc:grpChg chg="add del mod">
+          <ac:chgData name="Fiechter Sebastian (IT-PTR-EXT-EXT2 - Extern)" userId="f23e6d81-0328-4361-b5a9-44eea62aa731" providerId="ADAL" clId="{9681DBBF-CC28-48CE-8222-BE1E4CADF4A4}" dt="2024-06-24T13:35:16.738" v="1244" actId="478"/>
+          <ac:grpSpMkLst>
+            <pc:docMk/>
+            <pc:sldMk cId="1151215240" sldId="256"/>
+            <ac:grpSpMk id="62" creationId="{EE65AD5C-B44B-4575-3C75-FD8A163997A6}"/>
+          </ac:grpSpMkLst>
+        </pc:grpChg>
+        <pc:grpChg chg="add del mod">
+          <ac:chgData name="Fiechter Sebastian (IT-PTR-EXT-EXT2 - Extern)" userId="f23e6d81-0328-4361-b5a9-44eea62aa731" providerId="ADAL" clId="{9681DBBF-CC28-48CE-8222-BE1E4CADF4A4}" dt="2024-06-24T14:54:19.430" v="3103" actId="478"/>
+          <ac:grpSpMkLst>
+            <pc:docMk/>
+            <pc:sldMk cId="1151215240" sldId="256"/>
+            <ac:grpSpMk id="66" creationId="{469A1725-7FC3-7294-E2E4-98370DFC53B9}"/>
+          </ac:grpSpMkLst>
+        </pc:grpChg>
+        <pc:grpChg chg="add del mod">
+          <ac:chgData name="Fiechter Sebastian (IT-PTR-EXT-EXT2 - Extern)" userId="f23e6d81-0328-4361-b5a9-44eea62aa731" providerId="ADAL" clId="{9681DBBF-CC28-48CE-8222-BE1E4CADF4A4}" dt="2024-06-24T14:54:20.576" v="3104" actId="478"/>
+          <ac:grpSpMkLst>
+            <pc:docMk/>
+            <pc:sldMk cId="1151215240" sldId="256"/>
+            <ac:grpSpMk id="71" creationId="{92640A95-B411-17B3-6792-4921B3D27594}"/>
+          </ac:grpSpMkLst>
+        </pc:grpChg>
+        <pc:grpChg chg="add del mod">
+          <ac:chgData name="Fiechter Sebastian (IT-PTR-EXT-EXT2 - Extern)" userId="f23e6d81-0328-4361-b5a9-44eea62aa731" providerId="ADAL" clId="{9681DBBF-CC28-48CE-8222-BE1E4CADF4A4}" dt="2024-06-24T14:48:34.955" v="2777" actId="478"/>
+          <ac:grpSpMkLst>
+            <pc:docMk/>
+            <pc:sldMk cId="1151215240" sldId="256"/>
+            <ac:grpSpMk id="75" creationId="{3F67C7BD-05FE-91B1-117D-845EEF5FE1C4}"/>
+          </ac:grpSpMkLst>
+        </pc:grpChg>
+        <pc:grpChg chg="add del mod">
+          <ac:chgData name="Fiechter Sebastian (IT-PTR-EXT-EXT2 - Extern)" userId="f23e6d81-0328-4361-b5a9-44eea62aa731" providerId="ADAL" clId="{9681DBBF-CC28-48CE-8222-BE1E4CADF4A4}" dt="2024-06-24T14:35:54.328" v="2334" actId="478"/>
+          <ac:grpSpMkLst>
+            <pc:docMk/>
+            <pc:sldMk cId="1151215240" sldId="256"/>
+            <ac:grpSpMk id="125" creationId="{8FA937E2-4B09-6484-A837-CD36ED8D2E18}"/>
+          </ac:grpSpMkLst>
+        </pc:grpChg>
+        <pc:grpChg chg="add mod">
+          <ac:chgData name="Fiechter Sebastian (IT-PTR-EXT-EXT2 - Extern)" userId="f23e6d81-0328-4361-b5a9-44eea62aa731" providerId="ADAL" clId="{9681DBBF-CC28-48CE-8222-BE1E4CADF4A4}" dt="2024-06-24T14:45:16.271" v="2610"/>
+          <ac:grpSpMkLst>
+            <pc:docMk/>
+            <pc:sldMk cId="1151215240" sldId="256"/>
+            <ac:grpSpMk id="139" creationId="{19D24F79-F910-54DC-F51A-5E8AE321FDF4}"/>
+          </ac:grpSpMkLst>
+        </pc:grpChg>
+        <pc:grpChg chg="add mod">
+          <ac:chgData name="Fiechter Sebastian (IT-PTR-EXT-EXT2 - Extern)" userId="f23e6d81-0328-4361-b5a9-44eea62aa731" providerId="ADAL" clId="{9681DBBF-CC28-48CE-8222-BE1E4CADF4A4}" dt="2024-06-24T14:45:16.271" v="2610"/>
+          <ac:grpSpMkLst>
+            <pc:docMk/>
+            <pc:sldMk cId="1151215240" sldId="256"/>
+            <ac:grpSpMk id="143" creationId="{8254AACA-857A-FB86-841F-6205D95C7D9E}"/>
+          </ac:grpSpMkLst>
+        </pc:grpChg>
+        <pc:grpChg chg="add mod">
+          <ac:chgData name="Fiechter Sebastian (IT-PTR-EXT-EXT2 - Extern)" userId="f23e6d81-0328-4361-b5a9-44eea62aa731" providerId="ADAL" clId="{9681DBBF-CC28-48CE-8222-BE1E4CADF4A4}" dt="2024-06-24T14:45:16.271" v="2610"/>
+          <ac:grpSpMkLst>
+            <pc:docMk/>
+            <pc:sldMk cId="1151215240" sldId="256"/>
+            <ac:grpSpMk id="146" creationId="{AD6C54BF-0327-54E5-557F-386E957328B6}"/>
+          </ac:grpSpMkLst>
+        </pc:grpChg>
+        <pc:grpChg chg="add mod">
+          <ac:chgData name="Fiechter Sebastian (IT-PTR-EXT-EXT2 - Extern)" userId="f23e6d81-0328-4361-b5a9-44eea62aa731" providerId="ADAL" clId="{9681DBBF-CC28-48CE-8222-BE1E4CADF4A4}" dt="2024-06-24T14:45:16.271" v="2610"/>
+          <ac:grpSpMkLst>
+            <pc:docMk/>
+            <pc:sldMk cId="1151215240" sldId="256"/>
+            <ac:grpSpMk id="150" creationId="{BA891330-D322-C644-05DE-9A7FED672207}"/>
+          </ac:grpSpMkLst>
+        </pc:grpChg>
+        <pc:grpChg chg="add mod">
+          <ac:chgData name="Fiechter Sebastian (IT-PTR-EXT-EXT2 - Extern)" userId="f23e6d81-0328-4361-b5a9-44eea62aa731" providerId="ADAL" clId="{9681DBBF-CC28-48CE-8222-BE1E4CADF4A4}" dt="2024-06-24T14:45:16.271" v="2610"/>
+          <ac:grpSpMkLst>
+            <pc:docMk/>
+            <pc:sldMk cId="1151215240" sldId="256"/>
+            <ac:grpSpMk id="154" creationId="{26457344-2114-D109-4EFA-C9F8AB370452}"/>
+          </ac:grpSpMkLst>
+        </pc:grpChg>
+        <pc:grpChg chg="add mod">
+          <ac:chgData name="Fiechter Sebastian (IT-PTR-EXT-EXT2 - Extern)" userId="f23e6d81-0328-4361-b5a9-44eea62aa731" providerId="ADAL" clId="{9681DBBF-CC28-48CE-8222-BE1E4CADF4A4}" dt="2024-06-24T14:45:16.271" v="2610"/>
+          <ac:grpSpMkLst>
+            <pc:docMk/>
+            <pc:sldMk cId="1151215240" sldId="256"/>
+            <ac:grpSpMk id="158" creationId="{D9765E65-7892-FEA4-23B8-6C7456BB8B61}"/>
+          </ac:grpSpMkLst>
+        </pc:grpChg>
+        <pc:grpChg chg="add mod">
+          <ac:chgData name="Fiechter Sebastian (IT-PTR-EXT-EXT2 - Extern)" userId="f23e6d81-0328-4361-b5a9-44eea62aa731" providerId="ADAL" clId="{9681DBBF-CC28-48CE-8222-BE1E4CADF4A4}" dt="2024-06-24T14:45:16.271" v="2610"/>
+          <ac:grpSpMkLst>
+            <pc:docMk/>
+            <pc:sldMk cId="1151215240" sldId="256"/>
+            <ac:grpSpMk id="162" creationId="{CE1FEC40-88E9-0732-B68D-B0E027AAEAF3}"/>
+          </ac:grpSpMkLst>
+        </pc:grpChg>
+        <pc:grpChg chg="add mod">
+          <ac:chgData name="Fiechter Sebastian (IT-PTR-EXT-EXT2 - Extern)" userId="f23e6d81-0328-4361-b5a9-44eea62aa731" providerId="ADAL" clId="{9681DBBF-CC28-48CE-8222-BE1E4CADF4A4}" dt="2024-06-24T14:45:16.271" v="2610"/>
+          <ac:grpSpMkLst>
+            <pc:docMk/>
+            <pc:sldMk cId="1151215240" sldId="256"/>
+            <ac:grpSpMk id="166" creationId="{0C874BD2-15BA-5785-7473-AFE1EDE198D1}"/>
+          </ac:grpSpMkLst>
+        </pc:grpChg>
+        <pc:grpChg chg="add mod">
+          <ac:chgData name="Fiechter Sebastian (IT-PTR-EXT-EXT2 - Extern)" userId="f23e6d81-0328-4361-b5a9-44eea62aa731" providerId="ADAL" clId="{9681DBBF-CC28-48CE-8222-BE1E4CADF4A4}" dt="2024-06-24T14:45:16.271" v="2610"/>
+          <ac:grpSpMkLst>
+            <pc:docMk/>
+            <pc:sldMk cId="1151215240" sldId="256"/>
+            <ac:grpSpMk id="170" creationId="{E84CB26E-4193-F22F-6A29-C593F434CC8E}"/>
+          </ac:grpSpMkLst>
+        </pc:grpChg>
+        <pc:grpChg chg="add mod">
+          <ac:chgData name="Fiechter Sebastian (IT-PTR-EXT-EXT2 - Extern)" userId="f23e6d81-0328-4361-b5a9-44eea62aa731" providerId="ADAL" clId="{9681DBBF-CC28-48CE-8222-BE1E4CADF4A4}" dt="2024-06-24T14:45:16.271" v="2610"/>
+          <ac:grpSpMkLst>
+            <pc:docMk/>
+            <pc:sldMk cId="1151215240" sldId="256"/>
+            <ac:grpSpMk id="174" creationId="{2A3EBDE2-A24A-1A0F-9DD1-82B11325ABE5}"/>
+          </ac:grpSpMkLst>
+        </pc:grpChg>
+        <pc:grpChg chg="add mod">
+          <ac:chgData name="Fiechter Sebastian (IT-PTR-EXT-EXT2 - Extern)" userId="f23e6d81-0328-4361-b5a9-44eea62aa731" providerId="ADAL" clId="{9681DBBF-CC28-48CE-8222-BE1E4CADF4A4}" dt="2024-06-24T14:45:16.271" v="2610"/>
+          <ac:grpSpMkLst>
+            <pc:docMk/>
+            <pc:sldMk cId="1151215240" sldId="256"/>
+            <ac:grpSpMk id="178" creationId="{E57B2B9F-0F61-17F5-6FDE-53EE20A15299}"/>
+          </ac:grpSpMkLst>
+        </pc:grpChg>
+        <pc:grpChg chg="add mod">
+          <ac:chgData name="Fiechter Sebastian (IT-PTR-EXT-EXT2 - Extern)" userId="f23e6d81-0328-4361-b5a9-44eea62aa731" providerId="ADAL" clId="{9681DBBF-CC28-48CE-8222-BE1E4CADF4A4}" dt="2024-06-24T14:45:16.271" v="2610"/>
+          <ac:grpSpMkLst>
+            <pc:docMk/>
+            <pc:sldMk cId="1151215240" sldId="256"/>
+            <ac:grpSpMk id="182" creationId="{9C77013B-4B65-55A6-3134-8DE5D275F667}"/>
+          </ac:grpSpMkLst>
+        </pc:grpChg>
+        <pc:grpChg chg="add mod">
+          <ac:chgData name="Fiechter Sebastian (IT-PTR-EXT-EXT2 - Extern)" userId="f23e6d81-0328-4361-b5a9-44eea62aa731" providerId="ADAL" clId="{9681DBBF-CC28-48CE-8222-BE1E4CADF4A4}" dt="2024-06-28T09:01:50.923" v="4784" actId="1037"/>
+          <ac:grpSpMkLst>
+            <pc:docMk/>
+            <pc:sldMk cId="1151215240" sldId="256"/>
+            <ac:grpSpMk id="216" creationId="{92DE262A-C562-6EAA-0A5C-3A7B90D53212}"/>
+          </ac:grpSpMkLst>
+        </pc:grpChg>
+        <pc:grpChg chg="add mod">
+          <ac:chgData name="Fiechter Sebastian (IT-PTR-EXT-EXT2 - Extern)" userId="f23e6d81-0328-4361-b5a9-44eea62aa731" providerId="ADAL" clId="{9681DBBF-CC28-48CE-8222-BE1E4CADF4A4}" dt="2024-06-28T09:01:50.923" v="4784" actId="1037"/>
+          <ac:grpSpMkLst>
+            <pc:docMk/>
+            <pc:sldMk cId="1151215240" sldId="256"/>
+            <ac:grpSpMk id="220" creationId="{804241A9-3597-894B-1F3C-CBBAFDA18873}"/>
+          </ac:grpSpMkLst>
+        </pc:grpChg>
+        <pc:grpChg chg="add mod">
+          <ac:chgData name="Fiechter Sebastian (IT-PTR-EXT-EXT2 - Extern)" userId="f23e6d81-0328-4361-b5a9-44eea62aa731" providerId="ADAL" clId="{9681DBBF-CC28-48CE-8222-BE1E4CADF4A4}" dt="2024-06-28T09:01:50.923" v="4784" actId="1037"/>
+          <ac:grpSpMkLst>
+            <pc:docMk/>
+            <pc:sldMk cId="1151215240" sldId="256"/>
+            <ac:grpSpMk id="223" creationId="{BF4B5F24-8899-4BCD-6006-5CBE0A87F468}"/>
+          </ac:grpSpMkLst>
+        </pc:grpChg>
+        <pc:grpChg chg="add mod">
+          <ac:chgData name="Fiechter Sebastian (IT-PTR-EXT-EXT2 - Extern)" userId="f23e6d81-0328-4361-b5a9-44eea62aa731" providerId="ADAL" clId="{9681DBBF-CC28-48CE-8222-BE1E4CADF4A4}" dt="2024-06-28T09:01:50.923" v="4784" actId="1037"/>
+          <ac:grpSpMkLst>
+            <pc:docMk/>
+            <pc:sldMk cId="1151215240" sldId="256"/>
+            <ac:grpSpMk id="227" creationId="{61C0040B-3201-5395-883D-D8B9B71BD2D7}"/>
+          </ac:grpSpMkLst>
+        </pc:grpChg>
+        <pc:grpChg chg="add mod">
+          <ac:chgData name="Fiechter Sebastian (IT-PTR-EXT-EXT2 - Extern)" userId="f23e6d81-0328-4361-b5a9-44eea62aa731" providerId="ADAL" clId="{9681DBBF-CC28-48CE-8222-BE1E4CADF4A4}" dt="2024-06-28T09:01:50.923" v="4784" actId="1037"/>
+          <ac:grpSpMkLst>
+            <pc:docMk/>
+            <pc:sldMk cId="1151215240" sldId="256"/>
+            <ac:grpSpMk id="231" creationId="{C45C6D42-0C82-55BC-CDE6-2DDA0F431759}"/>
+          </ac:grpSpMkLst>
+        </pc:grpChg>
+        <pc:grpChg chg="add mod">
+          <ac:chgData name="Fiechter Sebastian (IT-PTR-EXT-EXT2 - Extern)" userId="f23e6d81-0328-4361-b5a9-44eea62aa731" providerId="ADAL" clId="{9681DBBF-CC28-48CE-8222-BE1E4CADF4A4}" dt="2024-06-28T09:01:50.923" v="4784" actId="1037"/>
+          <ac:grpSpMkLst>
+            <pc:docMk/>
+            <pc:sldMk cId="1151215240" sldId="256"/>
+            <ac:grpSpMk id="235" creationId="{0E10E691-4D74-D2C2-09DA-9FD2E9FEA63B}"/>
+          </ac:grpSpMkLst>
+        </pc:grpChg>
+        <pc:grpChg chg="add mod">
+          <ac:chgData name="Fiechter Sebastian (IT-PTR-EXT-EXT2 - Extern)" userId="f23e6d81-0328-4361-b5a9-44eea62aa731" providerId="ADAL" clId="{9681DBBF-CC28-48CE-8222-BE1E4CADF4A4}" dt="2024-07-16T14:34:23.812" v="5531" actId="1037"/>
+          <ac:grpSpMkLst>
+            <pc:docMk/>
+            <pc:sldMk cId="1151215240" sldId="256"/>
+            <ac:grpSpMk id="239" creationId="{0820E3D1-B002-297F-6C46-97FD615057C8}"/>
+          </ac:grpSpMkLst>
+        </pc:grpChg>
+        <pc:grpChg chg="add mod">
+          <ac:chgData name="Fiechter Sebastian (IT-PTR-EXT-EXT2 - Extern)" userId="f23e6d81-0328-4361-b5a9-44eea62aa731" providerId="ADAL" clId="{9681DBBF-CC28-48CE-8222-BE1E4CADF4A4}" dt="2024-06-26T07:57:34.718" v="4439" actId="1035"/>
+          <ac:grpSpMkLst>
+            <pc:docMk/>
+            <pc:sldMk cId="1151215240" sldId="256"/>
+            <ac:grpSpMk id="243" creationId="{E45F68CA-BBF2-9108-FE8C-D7DD8D879CA4}"/>
+          </ac:grpSpMkLst>
+        </pc:grpChg>
+        <pc:grpChg chg="add mod">
+          <ac:chgData name="Fiechter Sebastian (IT-PTR-EXT-EXT2 - Extern)" userId="f23e6d81-0328-4361-b5a9-44eea62aa731" providerId="ADAL" clId="{9681DBBF-CC28-48CE-8222-BE1E4CADF4A4}" dt="2024-06-26T07:57:34.718" v="4439" actId="1035"/>
+          <ac:grpSpMkLst>
+            <pc:docMk/>
+            <pc:sldMk cId="1151215240" sldId="256"/>
+            <ac:grpSpMk id="247" creationId="{04E9F4DF-C71D-7ABF-8AF4-34CC017C296B}"/>
+          </ac:grpSpMkLst>
+        </pc:grpChg>
+        <pc:grpChg chg="add mod">
+          <ac:chgData name="Fiechter Sebastian (IT-PTR-EXT-EXT2 - Extern)" userId="f23e6d81-0328-4361-b5a9-44eea62aa731" providerId="ADAL" clId="{9681DBBF-CC28-48CE-8222-BE1E4CADF4A4}" dt="2024-06-26T07:57:34.718" v="4439" actId="1035"/>
+          <ac:grpSpMkLst>
+            <pc:docMk/>
+            <pc:sldMk cId="1151215240" sldId="256"/>
+            <ac:grpSpMk id="251" creationId="{A9CE1213-CB71-7C89-7799-F46A98CAEA0B}"/>
+          </ac:grpSpMkLst>
+        </pc:grpChg>
+        <pc:grpChg chg="add mod">
+          <ac:chgData name="Fiechter Sebastian (IT-PTR-EXT-EXT2 - Extern)" userId="f23e6d81-0328-4361-b5a9-44eea62aa731" providerId="ADAL" clId="{9681DBBF-CC28-48CE-8222-BE1E4CADF4A4}" dt="2024-06-26T07:57:34.718" v="4439" actId="1035"/>
+          <ac:grpSpMkLst>
+            <pc:docMk/>
+            <pc:sldMk cId="1151215240" sldId="256"/>
+            <ac:grpSpMk id="255" creationId="{06052D20-4F9C-FA68-4E10-204F600C440A}"/>
+          </ac:grpSpMkLst>
+        </pc:grpChg>
+        <pc:grpChg chg="add mod">
+          <ac:chgData name="Fiechter Sebastian (IT-PTR-EXT-EXT2 - Extern)" userId="f23e6d81-0328-4361-b5a9-44eea62aa731" providerId="ADAL" clId="{9681DBBF-CC28-48CE-8222-BE1E4CADF4A4}" dt="2024-06-26T07:57:34.718" v="4439" actId="1035"/>
+          <ac:grpSpMkLst>
+            <pc:docMk/>
+            <pc:sldMk cId="1151215240" sldId="256"/>
+            <ac:grpSpMk id="259" creationId="{345F925D-340C-BE52-7995-D5CF1062E8D4}"/>
+          </ac:grpSpMkLst>
+        </pc:grpChg>
+        <pc:grpChg chg="add mod">
+          <ac:chgData name="Fiechter Sebastian (IT-PTR-EXT-EXT2 - Extern)" userId="f23e6d81-0328-4361-b5a9-44eea62aa731" providerId="ADAL" clId="{9681DBBF-CC28-48CE-8222-BE1E4CADF4A4}" dt="2024-06-26T07:59:04.179" v="4498" actId="1037"/>
+          <ac:grpSpMkLst>
+            <pc:docMk/>
+            <pc:sldMk cId="1151215240" sldId="256"/>
+            <ac:grpSpMk id="303" creationId="{BCA6009D-8362-3C1A-6239-4AD76864058D}"/>
+          </ac:grpSpMkLst>
+        </pc:grpChg>
+        <pc:cxnChg chg="add mod">
+          <ac:chgData name="Fiechter Sebastian (IT-PTR-EXT-EXT2 - Extern)" userId="f23e6d81-0328-4361-b5a9-44eea62aa731" providerId="ADAL" clId="{9681DBBF-CC28-48CE-8222-BE1E4CADF4A4}" dt="2024-06-26T07:57:46.971" v="4455" actId="1036"/>
+          <ac:cxnSpMkLst>
+            <pc:docMk/>
+            <pc:sldMk cId="1151215240" sldId="256"/>
+            <ac:cxnSpMk id="3" creationId="{F49FB3D0-B08A-7266-C56E-B9B85283E142}"/>
+          </ac:cxnSpMkLst>
+        </pc:cxnChg>
+        <pc:cxnChg chg="mod">
+          <ac:chgData name="Fiechter Sebastian (IT-PTR-EXT-EXT2 - Extern)" userId="f23e6d81-0328-4361-b5a9-44eea62aa731" providerId="ADAL" clId="{9681DBBF-CC28-48CE-8222-BE1E4CADF4A4}" dt="2024-06-24T13:05:31.434" v="200" actId="1035"/>
+          <ac:cxnSpMkLst>
+            <pc:docMk/>
+            <pc:sldMk cId="1151215240" sldId="256"/>
+            <ac:cxnSpMk id="8" creationId="{837D66A9-5031-A241-FED6-FE8E1B008EA8}"/>
+          </ac:cxnSpMkLst>
+        </pc:cxnChg>
+        <pc:cxnChg chg="mod">
+          <ac:chgData name="Fiechter Sebastian (IT-PTR-EXT-EXT2 - Extern)" userId="f23e6d81-0328-4361-b5a9-44eea62aa731" providerId="ADAL" clId="{9681DBBF-CC28-48CE-8222-BE1E4CADF4A4}" dt="2024-06-24T14:26:00.513" v="2192" actId="1036"/>
+          <ac:cxnSpMkLst>
+            <pc:docMk/>
+            <pc:sldMk cId="1151215240" sldId="256"/>
+            <ac:cxnSpMk id="10" creationId="{FE5F2328-F4E2-9E91-DB79-FC59821E1B9E}"/>
+          </ac:cxnSpMkLst>
+        </pc:cxnChg>
+        <pc:cxnChg chg="add mod">
+          <ac:chgData name="Fiechter Sebastian (IT-PTR-EXT-EXT2 - Extern)" userId="f23e6d81-0328-4361-b5a9-44eea62aa731" providerId="ADAL" clId="{9681DBBF-CC28-48CE-8222-BE1E4CADF4A4}" dt="2024-06-24T13:00:54.806" v="28"/>
+          <ac:cxnSpMkLst>
+            <pc:docMk/>
+            <pc:sldMk cId="1151215240" sldId="256"/>
+            <ac:cxnSpMk id="12" creationId="{39E3C9CC-C6A5-B50A-8C10-7D7F0623DB36}"/>
+          </ac:cxnSpMkLst>
+        </pc:cxnChg>
+        <pc:cxnChg chg="add mod">
+          <ac:chgData name="Fiechter Sebastian (IT-PTR-EXT-EXT2 - Extern)" userId="f23e6d81-0328-4361-b5a9-44eea62aa731" providerId="ADAL" clId="{9681DBBF-CC28-48CE-8222-BE1E4CADF4A4}" dt="2024-06-24T13:00:54.806" v="28"/>
+          <ac:cxnSpMkLst>
+            <pc:docMk/>
+            <pc:sldMk cId="1151215240" sldId="256"/>
+            <ac:cxnSpMk id="13" creationId="{4A76861F-8B5D-D7FE-FDAF-3A6FA86CA520}"/>
+          </ac:cxnSpMkLst>
+        </pc:cxnChg>
+        <pc:cxnChg chg="mod">
+          <ac:chgData name="Fiechter Sebastian (IT-PTR-EXT-EXT2 - Extern)" userId="f23e6d81-0328-4361-b5a9-44eea62aa731" providerId="ADAL" clId="{9681DBBF-CC28-48CE-8222-BE1E4CADF4A4}" dt="2024-06-24T13:05:25.772" v="192" actId="1035"/>
+          <ac:cxnSpMkLst>
+            <pc:docMk/>
+            <pc:sldMk cId="1151215240" sldId="256"/>
+            <ac:cxnSpMk id="17" creationId="{DB0CC850-2319-73AE-0C78-46068D7B243E}"/>
+          </ac:cxnSpMkLst>
+        </pc:cxnChg>
+        <pc:cxnChg chg="mod">
+          <ac:chgData name="Fiechter Sebastian (IT-PTR-EXT-EXT2 - Extern)" userId="f23e6d81-0328-4361-b5a9-44eea62aa731" providerId="ADAL" clId="{9681DBBF-CC28-48CE-8222-BE1E4CADF4A4}" dt="2024-06-24T13:02:14.878" v="76"/>
+          <ac:cxnSpMkLst>
+            <pc:docMk/>
+            <pc:sldMk cId="1151215240" sldId="256"/>
+            <ac:cxnSpMk id="18" creationId="{5D3F1CA7-2501-DAEE-B7E5-7CA2E37AB74C}"/>
+          </ac:cxnSpMkLst>
+        </pc:cxnChg>
+        <pc:cxnChg chg="mod">
+          <ac:chgData name="Fiechter Sebastian (IT-PTR-EXT-EXT2 - Extern)" userId="f23e6d81-0328-4361-b5a9-44eea62aa731" providerId="ADAL" clId="{9681DBBF-CC28-48CE-8222-BE1E4CADF4A4}" dt="2024-06-24T13:05:08.725" v="182" actId="1036"/>
+          <ac:cxnSpMkLst>
+            <pc:docMk/>
+            <pc:sldMk cId="1151215240" sldId="256"/>
+            <ac:cxnSpMk id="21" creationId="{9F6126FC-1EF3-0171-255C-67201F5562E4}"/>
+          </ac:cxnSpMkLst>
+        </pc:cxnChg>
+        <pc:cxnChg chg="mod">
+          <ac:chgData name="Fiechter Sebastian (IT-PTR-EXT-EXT2 - Extern)" userId="f23e6d81-0328-4361-b5a9-44eea62aa731" providerId="ADAL" clId="{9681DBBF-CC28-48CE-8222-BE1E4CADF4A4}" dt="2024-06-24T14:26:02.436" v="2193" actId="1036"/>
+          <ac:cxnSpMkLst>
+            <pc:docMk/>
+            <pc:sldMk cId="1151215240" sldId="256"/>
+            <ac:cxnSpMk id="22" creationId="{247081E4-10D6-28A1-B6B7-250202C35D23}"/>
+          </ac:cxnSpMkLst>
+        </pc:cxnChg>
+        <pc:cxnChg chg="mod">
+          <ac:chgData name="Fiechter Sebastian (IT-PTR-EXT-EXT2 - Extern)" userId="f23e6d81-0328-4361-b5a9-44eea62aa731" providerId="ADAL" clId="{9681DBBF-CC28-48CE-8222-BE1E4CADF4A4}" dt="2024-06-24T15:05:29.007" v="3224" actId="207"/>
+          <ac:cxnSpMkLst>
+            <pc:docMk/>
+            <pc:sldMk cId="1151215240" sldId="256"/>
+            <ac:cxnSpMk id="25" creationId="{64B4D1EC-D83D-B867-3414-59EEDAD32506}"/>
+          </ac:cxnSpMkLst>
+        </pc:cxnChg>
+        <pc:cxnChg chg="mod">
+          <ac:chgData name="Fiechter Sebastian (IT-PTR-EXT-EXT2 - Extern)" userId="f23e6d81-0328-4361-b5a9-44eea62aa731" providerId="ADAL" clId="{9681DBBF-CC28-48CE-8222-BE1E4CADF4A4}" dt="2024-06-24T15:05:29.007" v="3224" actId="207"/>
+          <ac:cxnSpMkLst>
+            <pc:docMk/>
+            <pc:sldMk cId="1151215240" sldId="256"/>
+            <ac:cxnSpMk id="26" creationId="{3937DE97-77EA-1287-7428-E5EF5842BCD4}"/>
+          </ac:cxnSpMkLst>
+        </pc:cxnChg>
+        <pc:cxnChg chg="mod">
+          <ac:chgData name="Fiechter Sebastian (IT-PTR-EXT-EXT2 - Extern)" userId="f23e6d81-0328-4361-b5a9-44eea62aa731" providerId="ADAL" clId="{9681DBBF-CC28-48CE-8222-BE1E4CADF4A4}" dt="2024-06-24T15:05:29.007" v="3224" actId="207"/>
+          <ac:cxnSpMkLst>
+            <pc:docMk/>
+            <pc:sldMk cId="1151215240" sldId="256"/>
+            <ac:cxnSpMk id="29" creationId="{9CEB2AA0-2CA1-ABF6-896C-0402E8A017E4}"/>
+          </ac:cxnSpMkLst>
+        </pc:cxnChg>
+        <pc:cxnChg chg="mod">
+          <ac:chgData name="Fiechter Sebastian (IT-PTR-EXT-EXT2 - Extern)" userId="f23e6d81-0328-4361-b5a9-44eea62aa731" providerId="ADAL" clId="{9681DBBF-CC28-48CE-8222-BE1E4CADF4A4}" dt="2024-06-24T15:05:29.007" v="3224" actId="207"/>
+          <ac:cxnSpMkLst>
+            <pc:docMk/>
+            <pc:sldMk cId="1151215240" sldId="256"/>
+            <ac:cxnSpMk id="30" creationId="{89BAB7A7-69FC-92C2-5C0D-523428FF5C3F}"/>
+          </ac:cxnSpMkLst>
+        </pc:cxnChg>
+        <pc:cxnChg chg="mod">
+          <ac:chgData name="Fiechter Sebastian (IT-PTR-EXT-EXT2 - Extern)" userId="f23e6d81-0328-4361-b5a9-44eea62aa731" providerId="ADAL" clId="{9681DBBF-CC28-48CE-8222-BE1E4CADF4A4}" dt="2024-06-24T15:05:29.007" v="3224" actId="207"/>
+          <ac:cxnSpMkLst>
+            <pc:docMk/>
+            <pc:sldMk cId="1151215240" sldId="256"/>
+            <ac:cxnSpMk id="33" creationId="{DFF531EF-8497-00A6-2F54-224D6F407366}"/>
+          </ac:cxnSpMkLst>
+        </pc:cxnChg>
+        <pc:cxnChg chg="mod">
+          <ac:chgData name="Fiechter Sebastian (IT-PTR-EXT-EXT2 - Extern)" userId="f23e6d81-0328-4361-b5a9-44eea62aa731" providerId="ADAL" clId="{9681DBBF-CC28-48CE-8222-BE1E4CADF4A4}" dt="2024-06-24T15:05:29.007" v="3224" actId="207"/>
+          <ac:cxnSpMkLst>
+            <pc:docMk/>
+            <pc:sldMk cId="1151215240" sldId="256"/>
+            <ac:cxnSpMk id="34" creationId="{5CA7D30E-687E-98F5-3289-D55CB96F3764}"/>
+          </ac:cxnSpMkLst>
+        </pc:cxnChg>
+        <pc:cxnChg chg="mod">
+          <ac:chgData name="Fiechter Sebastian (IT-PTR-EXT-EXT2 - Extern)" userId="f23e6d81-0328-4361-b5a9-44eea62aa731" providerId="ADAL" clId="{9681DBBF-CC28-48CE-8222-BE1E4CADF4A4}" dt="2024-06-24T13:09:37.309" v="382"/>
+          <ac:cxnSpMkLst>
+            <pc:docMk/>
+            <pc:sldMk cId="1151215240" sldId="256"/>
+            <ac:cxnSpMk id="37" creationId="{99601F60-127A-21D9-B792-CC89E86F9D93}"/>
+          </ac:cxnSpMkLst>
+        </pc:cxnChg>
+        <pc:cxnChg chg="mod">
+          <ac:chgData name="Fiechter Sebastian (IT-PTR-EXT-EXT2 - Extern)" userId="f23e6d81-0328-4361-b5a9-44eea62aa731" providerId="ADAL" clId="{9681DBBF-CC28-48CE-8222-BE1E4CADF4A4}" dt="2024-06-24T14:26:11.213" v="2197" actId="1036"/>
+          <ac:cxnSpMkLst>
+            <pc:docMk/>
+            <pc:sldMk cId="1151215240" sldId="256"/>
+            <ac:cxnSpMk id="38" creationId="{CEEF527B-C68D-2C0D-83E0-DDA609F0BB5F}"/>
+          </ac:cxnSpMkLst>
+        </pc:cxnChg>
+        <pc:cxnChg chg="mod">
+          <ac:chgData name="Fiechter Sebastian (IT-PTR-EXT-EXT2 - Extern)" userId="f23e6d81-0328-4361-b5a9-44eea62aa731" providerId="ADAL" clId="{9681DBBF-CC28-48CE-8222-BE1E4CADF4A4}" dt="2024-06-24T15:05:29.007" v="3224" actId="207"/>
+          <ac:cxnSpMkLst>
+            <pc:docMk/>
+            <pc:sldMk cId="1151215240" sldId="256"/>
+            <ac:cxnSpMk id="41" creationId="{51F19173-BB88-186F-8109-9C0BE13CC0A3}"/>
+          </ac:cxnSpMkLst>
+        </pc:cxnChg>
+        <pc:cxnChg chg="mod">
+          <ac:chgData name="Fiechter Sebastian (IT-PTR-EXT-EXT2 - Extern)" userId="f23e6d81-0328-4361-b5a9-44eea62aa731" providerId="ADAL" clId="{9681DBBF-CC28-48CE-8222-BE1E4CADF4A4}" dt="2024-06-24T15:05:29.007" v="3224" actId="207"/>
+          <ac:cxnSpMkLst>
+            <pc:docMk/>
+            <pc:sldMk cId="1151215240" sldId="256"/>
+            <ac:cxnSpMk id="42" creationId="{B54BA7A7-6A52-57BD-3A9B-BDA7CB6872D6}"/>
+          </ac:cxnSpMkLst>
+        </pc:cxnChg>
+        <pc:cxnChg chg="mod">
+          <ac:chgData name="Fiechter Sebastian (IT-PTR-EXT-EXT2 - Extern)" userId="f23e6d81-0328-4361-b5a9-44eea62aa731" providerId="ADAL" clId="{9681DBBF-CC28-48CE-8222-BE1E4CADF4A4}" dt="2024-06-24T13:11:56.328" v="493"/>
+          <ac:cxnSpMkLst>
+            <pc:docMk/>
+            <pc:sldMk cId="1151215240" sldId="256"/>
+            <ac:cxnSpMk id="45" creationId="{CBF44F3F-A605-290C-A231-B3ED6739FFA2}"/>
+          </ac:cxnSpMkLst>
+        </pc:cxnChg>
+        <pc:cxnChg chg="mod">
+          <ac:chgData name="Fiechter Sebastian (IT-PTR-EXT-EXT2 - Extern)" userId="f23e6d81-0328-4361-b5a9-44eea62aa731" providerId="ADAL" clId="{9681DBBF-CC28-48CE-8222-BE1E4CADF4A4}" dt="2024-06-24T14:25:19.462" v="2128" actId="1036"/>
+          <ac:cxnSpMkLst>
+            <pc:docMk/>
+            <pc:sldMk cId="1151215240" sldId="256"/>
+            <ac:cxnSpMk id="46" creationId="{60E0D5AF-2F40-ED89-74E2-25761A5C9648}"/>
+          </ac:cxnSpMkLst>
+        </pc:cxnChg>
+        <pc:cxnChg chg="mod">
+          <ac:chgData name="Fiechter Sebastian (IT-PTR-EXT-EXT2 - Extern)" userId="f23e6d81-0328-4361-b5a9-44eea62aa731" providerId="ADAL" clId="{9681DBBF-CC28-48CE-8222-BE1E4CADF4A4}" dt="2024-06-24T15:05:29.007" v="3224" actId="207"/>
+          <ac:cxnSpMkLst>
+            <pc:docMk/>
+            <pc:sldMk cId="1151215240" sldId="256"/>
+            <ac:cxnSpMk id="49" creationId="{8DC75392-9DA1-AB95-2135-C692BBCBF8B0}"/>
+          </ac:cxnSpMkLst>
+        </pc:cxnChg>
+        <pc:cxnChg chg="mod">
+          <ac:chgData name="Fiechter Sebastian (IT-PTR-EXT-EXT2 - Extern)" userId="f23e6d81-0328-4361-b5a9-44eea62aa731" providerId="ADAL" clId="{9681DBBF-CC28-48CE-8222-BE1E4CADF4A4}" dt="2024-06-24T15:05:29.007" v="3224" actId="207"/>
+          <ac:cxnSpMkLst>
+            <pc:docMk/>
+            <pc:sldMk cId="1151215240" sldId="256"/>
+            <ac:cxnSpMk id="50" creationId="{A36D8F13-189F-05B0-AFA7-9F53AEBFF378}"/>
+          </ac:cxnSpMkLst>
+        </pc:cxnChg>
+        <pc:cxnChg chg="mod">
+          <ac:chgData name="Fiechter Sebastian (IT-PTR-EXT-EXT2 - Extern)" userId="f23e6d81-0328-4361-b5a9-44eea62aa731" providerId="ADAL" clId="{9681DBBF-CC28-48CE-8222-BE1E4CADF4A4}" dt="2024-06-24T13:13:00.072" v="597"/>
+          <ac:cxnSpMkLst>
+            <pc:docMk/>
+            <pc:sldMk cId="1151215240" sldId="256"/>
+            <ac:cxnSpMk id="53" creationId="{FB097BDE-249E-59E2-ECC0-1EED7061024F}"/>
+          </ac:cxnSpMkLst>
+        </pc:cxnChg>
+        <pc:cxnChg chg="mod">
+          <ac:chgData name="Fiechter Sebastian (IT-PTR-EXT-EXT2 - Extern)" userId="f23e6d81-0328-4361-b5a9-44eea62aa731" providerId="ADAL" clId="{9681DBBF-CC28-48CE-8222-BE1E4CADF4A4}" dt="2024-06-24T14:25:02.583" v="2102" actId="1035"/>
+          <ac:cxnSpMkLst>
+            <pc:docMk/>
+            <pc:sldMk cId="1151215240" sldId="256"/>
+            <ac:cxnSpMk id="54" creationId="{3B4DD4B6-C865-82E6-AD54-9342F251DA33}"/>
+          </ac:cxnSpMkLst>
+        </pc:cxnChg>
+        <pc:cxnChg chg="mod">
+          <ac:chgData name="Fiechter Sebastian (IT-PTR-EXT-EXT2 - Extern)" userId="f23e6d81-0328-4361-b5a9-44eea62aa731" providerId="ADAL" clId="{9681DBBF-CC28-48CE-8222-BE1E4CADF4A4}" dt="2024-06-24T15:05:29.007" v="3224" actId="207"/>
+          <ac:cxnSpMkLst>
+            <pc:docMk/>
+            <pc:sldMk cId="1151215240" sldId="256"/>
+            <ac:cxnSpMk id="57" creationId="{CA43EAB1-0948-97F5-199E-42C8EDFA1F39}"/>
+          </ac:cxnSpMkLst>
+        </pc:cxnChg>
+        <pc:cxnChg chg="mod">
+          <ac:chgData name="Fiechter Sebastian (IT-PTR-EXT-EXT2 - Extern)" userId="f23e6d81-0328-4361-b5a9-44eea62aa731" providerId="ADAL" clId="{9681DBBF-CC28-48CE-8222-BE1E4CADF4A4}" dt="2024-06-24T15:05:29.007" v="3224" actId="207"/>
+          <ac:cxnSpMkLst>
+            <pc:docMk/>
+            <pc:sldMk cId="1151215240" sldId="256"/>
+            <ac:cxnSpMk id="58" creationId="{F7499BC2-D305-C154-AA9B-68C4FE81DE9A}"/>
+          </ac:cxnSpMkLst>
+        </pc:cxnChg>
+        <pc:cxnChg chg="mod">
+          <ac:chgData name="Fiechter Sebastian (IT-PTR-EXT-EXT2 - Extern)" userId="f23e6d81-0328-4361-b5a9-44eea62aa731" providerId="ADAL" clId="{9681DBBF-CC28-48CE-8222-BE1E4CADF4A4}" dt="2024-06-24T13:29:18.564" v="1096" actId="207"/>
+          <ac:cxnSpMkLst>
+            <pc:docMk/>
+            <pc:sldMk cId="1151215240" sldId="256"/>
+            <ac:cxnSpMk id="64" creationId="{432D1E8E-1789-C021-D255-327BC83AE8B6}"/>
+          </ac:cxnSpMkLst>
+        </pc:cxnChg>
+        <pc:cxnChg chg="mod">
+          <ac:chgData name="Fiechter Sebastian (IT-PTR-EXT-EXT2 - Extern)" userId="f23e6d81-0328-4361-b5a9-44eea62aa731" providerId="ADAL" clId="{9681DBBF-CC28-48CE-8222-BE1E4CADF4A4}" dt="2024-06-24T13:29:18.564" v="1096" actId="207"/>
+          <ac:cxnSpMkLst>
+            <pc:docMk/>
+            <pc:sldMk cId="1151215240" sldId="256"/>
+            <ac:cxnSpMk id="65" creationId="{E59E7812-C542-DE7E-1347-A837D8E3CF76}"/>
+          </ac:cxnSpMkLst>
+        </pc:cxnChg>
+        <pc:cxnChg chg="mod">
+          <ac:chgData name="Fiechter Sebastian (IT-PTR-EXT-EXT2 - Extern)" userId="f23e6d81-0328-4361-b5a9-44eea62aa731" providerId="ADAL" clId="{9681DBBF-CC28-48CE-8222-BE1E4CADF4A4}" dt="2024-06-24T13:32:45.750" v="1157"/>
+          <ac:cxnSpMkLst>
+            <pc:docMk/>
+            <pc:sldMk cId="1151215240" sldId="256"/>
+            <ac:cxnSpMk id="68" creationId="{7B44A1FC-E747-64CF-C8B4-F9759560FD68}"/>
+          </ac:cxnSpMkLst>
+        </pc:cxnChg>
+        <pc:cxnChg chg="mod">
+          <ac:chgData name="Fiechter Sebastian (IT-PTR-EXT-EXT2 - Extern)" userId="f23e6d81-0328-4361-b5a9-44eea62aa731" providerId="ADAL" clId="{9681DBBF-CC28-48CE-8222-BE1E4CADF4A4}" dt="2024-06-24T13:32:45.750" v="1157"/>
+          <ac:cxnSpMkLst>
+            <pc:docMk/>
+            <pc:sldMk cId="1151215240" sldId="256"/>
+            <ac:cxnSpMk id="69" creationId="{106D116D-709D-53D4-D809-3171AEC2F113}"/>
+          </ac:cxnSpMkLst>
+        </pc:cxnChg>
+        <pc:cxnChg chg="mod">
+          <ac:chgData name="Fiechter Sebastian (IT-PTR-EXT-EXT2 - Extern)" userId="f23e6d81-0328-4361-b5a9-44eea62aa731" providerId="ADAL" clId="{9681DBBF-CC28-48CE-8222-BE1E4CADF4A4}" dt="2024-06-24T13:34:55.624" v="1224"/>
+          <ac:cxnSpMkLst>
+            <pc:docMk/>
+            <pc:sldMk cId="1151215240" sldId="256"/>
+            <ac:cxnSpMk id="73" creationId="{984A42DE-E01A-D3D7-1A50-3D31FCEB474F}"/>
+          </ac:cxnSpMkLst>
+        </pc:cxnChg>
+        <pc:cxnChg chg="mod">
+          <ac:chgData name="Fiechter Sebastian (IT-PTR-EXT-EXT2 - Extern)" userId="f23e6d81-0328-4361-b5a9-44eea62aa731" providerId="ADAL" clId="{9681DBBF-CC28-48CE-8222-BE1E4CADF4A4}" dt="2024-06-24T13:34:55.624" v="1224"/>
+          <ac:cxnSpMkLst>
+            <pc:docMk/>
+            <pc:sldMk cId="1151215240" sldId="256"/>
+            <ac:cxnSpMk id="74" creationId="{315D789C-441E-95B7-1114-07BBC10E172A}"/>
+          </ac:cxnSpMkLst>
+        </pc:cxnChg>
+        <pc:cxnChg chg="mod">
+          <ac:chgData name="Fiechter Sebastian (IT-PTR-EXT-EXT2 - Extern)" userId="f23e6d81-0328-4361-b5a9-44eea62aa731" providerId="ADAL" clId="{9681DBBF-CC28-48CE-8222-BE1E4CADF4A4}" dt="2024-06-24T13:35:54.164" v="1245"/>
+          <ac:cxnSpMkLst>
+            <pc:docMk/>
+            <pc:sldMk cId="1151215240" sldId="256"/>
+            <ac:cxnSpMk id="77" creationId="{4182ACB8-9545-CCB9-18C0-57FC4C5DBAF9}"/>
+          </ac:cxnSpMkLst>
+        </pc:cxnChg>
+        <pc:cxnChg chg="mod">
+          <ac:chgData name="Fiechter Sebastian (IT-PTR-EXT-EXT2 - Extern)" userId="f23e6d81-0328-4361-b5a9-44eea62aa731" providerId="ADAL" clId="{9681DBBF-CC28-48CE-8222-BE1E4CADF4A4}" dt="2024-06-24T13:35:54.164" v="1245"/>
+          <ac:cxnSpMkLst>
+            <pc:docMk/>
+            <pc:sldMk cId="1151215240" sldId="256"/>
+            <ac:cxnSpMk id="78" creationId="{74E5C06A-9A1A-4896-9999-C31B1EF1B291}"/>
+          </ac:cxnSpMkLst>
+        </pc:cxnChg>
+        <pc:cxnChg chg="del mod">
+          <ac:chgData name="Fiechter Sebastian (IT-PTR-EXT-EXT2 - Extern)" userId="f23e6d81-0328-4361-b5a9-44eea62aa731" providerId="ADAL" clId="{9681DBBF-CC28-48CE-8222-BE1E4CADF4A4}" dt="2024-06-24T14:35:49.501" v="2331" actId="478"/>
+          <ac:cxnSpMkLst>
+            <pc:docMk/>
+            <pc:sldMk cId="1151215240" sldId="256"/>
+            <ac:cxnSpMk id="127" creationId="{7BDA171F-D3BE-63AB-6027-87006F19FBC7}"/>
+          </ac:cxnSpMkLst>
+        </pc:cxnChg>
+        <pc:cxnChg chg="del mod topLvl">
+          <ac:chgData name="Fiechter Sebastian (IT-PTR-EXT-EXT2 - Extern)" userId="f23e6d81-0328-4361-b5a9-44eea62aa731" providerId="ADAL" clId="{9681DBBF-CC28-48CE-8222-BE1E4CADF4A4}" dt="2024-06-24T14:35:54.328" v="2334" actId="478"/>
+          <ac:cxnSpMkLst>
+            <pc:docMk/>
+            <pc:sldMk cId="1151215240" sldId="256"/>
+            <ac:cxnSpMk id="128" creationId="{06431104-403E-4C1C-7562-1DE28BA36E33}"/>
+          </ac:cxnSpMkLst>
+        </pc:cxnChg>
+        <pc:cxnChg chg="mod">
+          <ac:chgData name="Fiechter Sebastian (IT-PTR-EXT-EXT2 - Extern)" userId="f23e6d81-0328-4361-b5a9-44eea62aa731" providerId="ADAL" clId="{9681DBBF-CC28-48CE-8222-BE1E4CADF4A4}" dt="2024-06-24T14:45:16.271" v="2610"/>
+          <ac:cxnSpMkLst>
+            <pc:docMk/>
+            <pc:sldMk cId="1151215240" sldId="256"/>
+            <ac:cxnSpMk id="141" creationId="{443CA054-C1BC-2F4A-B458-F06E41905BD4}"/>
+          </ac:cxnSpMkLst>
+        </pc:cxnChg>
+        <pc:cxnChg chg="mod">
+          <ac:chgData name="Fiechter Sebastian (IT-PTR-EXT-EXT2 - Extern)" userId="f23e6d81-0328-4361-b5a9-44eea62aa731" providerId="ADAL" clId="{9681DBBF-CC28-48CE-8222-BE1E4CADF4A4}" dt="2024-06-24T14:45:16.271" v="2610"/>
+          <ac:cxnSpMkLst>
+            <pc:docMk/>
+            <pc:sldMk cId="1151215240" sldId="256"/>
+            <ac:cxnSpMk id="142" creationId="{4528689F-1D8E-A5EB-1C7F-42520A32AE57}"/>
+          </ac:cxnSpMkLst>
+        </pc:cxnChg>
+        <pc:cxnChg chg="mod">
+          <ac:chgData name="Fiechter Sebastian (IT-PTR-EXT-EXT2 - Extern)" userId="f23e6d81-0328-4361-b5a9-44eea62aa731" providerId="ADAL" clId="{9681DBBF-CC28-48CE-8222-BE1E4CADF4A4}" dt="2024-06-24T14:45:16.271" v="2610"/>
+          <ac:cxnSpMkLst>
+            <pc:docMk/>
+            <pc:sldMk cId="1151215240" sldId="256"/>
+            <ac:cxnSpMk id="144" creationId="{56236EE7-5C48-B31F-08AD-A639CE8BE2B2}"/>
+          </ac:cxnSpMkLst>
+        </pc:cxnChg>
+        <pc:cxnChg chg="mod">
+          <ac:chgData name="Fiechter Sebastian (IT-PTR-EXT-EXT2 - Extern)" userId="f23e6d81-0328-4361-b5a9-44eea62aa731" providerId="ADAL" clId="{9681DBBF-CC28-48CE-8222-BE1E4CADF4A4}" dt="2024-06-24T14:45:16.271" v="2610"/>
+          <ac:cxnSpMkLst>
+            <pc:docMk/>
+            <pc:sldMk cId="1151215240" sldId="256"/>
+            <ac:cxnSpMk id="145" creationId="{D9126BC3-038A-1794-5E37-D1DCE6673F5D}"/>
+          </ac:cxnSpMkLst>
+        </pc:cxnChg>
+        <pc:cxnChg chg="mod">
+          <ac:chgData name="Fiechter Sebastian (IT-PTR-EXT-EXT2 - Extern)" userId="f23e6d81-0328-4361-b5a9-44eea62aa731" providerId="ADAL" clId="{9681DBBF-CC28-48CE-8222-BE1E4CADF4A4}" dt="2024-06-24T14:45:16.271" v="2610"/>
+          <ac:cxnSpMkLst>
+            <pc:docMk/>
+            <pc:sldMk cId="1151215240" sldId="256"/>
+            <ac:cxnSpMk id="148" creationId="{95991253-6556-6251-8F14-00B32E52FB16}"/>
+          </ac:cxnSpMkLst>
+        </pc:cxnChg>
+        <pc:cxnChg chg="mod">
+          <ac:chgData name="Fiechter Sebastian (IT-PTR-EXT-EXT2 - Extern)" userId="f23e6d81-0328-4361-b5a9-44eea62aa731" providerId="ADAL" clId="{9681DBBF-CC28-48CE-8222-BE1E4CADF4A4}" dt="2024-06-24T14:45:16.271" v="2610"/>
+          <ac:cxnSpMkLst>
+            <pc:docMk/>
+            <pc:sldMk cId="1151215240" sldId="256"/>
+            <ac:cxnSpMk id="149" creationId="{D8C83932-2A36-7369-04E3-F7728C819CFA}"/>
+          </ac:cxnSpMkLst>
+        </pc:cxnChg>
+        <pc:cxnChg chg="mod">
+          <ac:chgData name="Fiechter Sebastian (IT-PTR-EXT-EXT2 - Extern)" userId="f23e6d81-0328-4361-b5a9-44eea62aa731" providerId="ADAL" clId="{9681DBBF-CC28-48CE-8222-BE1E4CADF4A4}" dt="2024-06-24T14:45:16.271" v="2610"/>
+          <ac:cxnSpMkLst>
+            <pc:docMk/>
+            <pc:sldMk cId="1151215240" sldId="256"/>
+            <ac:cxnSpMk id="152" creationId="{5A30BA2F-288E-C933-AA22-521051F0F2D3}"/>
+          </ac:cxnSpMkLst>
+        </pc:cxnChg>
+        <pc:cxnChg chg="mod">
+          <ac:chgData name="Fiechter Sebastian (IT-PTR-EXT-EXT2 - Extern)" userId="f23e6d81-0328-4361-b5a9-44eea62aa731" providerId="ADAL" clId="{9681DBBF-CC28-48CE-8222-BE1E4CADF4A4}" dt="2024-06-24T14:45:16.271" v="2610"/>
+          <ac:cxnSpMkLst>
+            <pc:docMk/>
+            <pc:sldMk cId="1151215240" sldId="256"/>
+            <ac:cxnSpMk id="153" creationId="{4B7969D3-6B2B-B277-2FFF-10B213AD8CB3}"/>
+          </ac:cxnSpMkLst>
+        </pc:cxnChg>
+        <pc:cxnChg chg="mod">
+          <ac:chgData name="Fiechter Sebastian (IT-PTR-EXT-EXT2 - Extern)" userId="f23e6d81-0328-4361-b5a9-44eea62aa731" providerId="ADAL" clId="{9681DBBF-CC28-48CE-8222-BE1E4CADF4A4}" dt="2024-06-24T14:45:16.271" v="2610"/>
+          <ac:cxnSpMkLst>
+            <pc:docMk/>
+            <pc:sldMk cId="1151215240" sldId="256"/>
+            <ac:cxnSpMk id="156" creationId="{8A0A53D6-07E9-91F0-6054-9A0E29620D32}"/>
+          </ac:cxnSpMkLst>
+        </pc:cxnChg>
+        <pc:cxnChg chg="mod">
+          <ac:chgData name="Fiechter Sebastian (IT-PTR-EXT-EXT2 - Extern)" userId="f23e6d81-0328-4361-b5a9-44eea62aa731" providerId="ADAL" clId="{9681DBBF-CC28-48CE-8222-BE1E4CADF4A4}" dt="2024-06-24T14:45:16.271" v="2610"/>
+          <ac:cxnSpMkLst>
+            <pc:docMk/>
+            <pc:sldMk cId="1151215240" sldId="256"/>
+            <ac:cxnSpMk id="157" creationId="{EFD3F73C-B1F9-E1E3-1FFE-0AECA1BBFD81}"/>
+          </ac:cxnSpMkLst>
+        </pc:cxnChg>
+        <pc:cxnChg chg="mod">
+          <ac:chgData name="Fiechter Sebastian (IT-PTR-EXT-EXT2 - Extern)" userId="f23e6d81-0328-4361-b5a9-44eea62aa731" providerId="ADAL" clId="{9681DBBF-CC28-48CE-8222-BE1E4CADF4A4}" dt="2024-06-24T14:45:16.271" v="2610"/>
+          <ac:cxnSpMkLst>
+            <pc:docMk/>
+            <pc:sldMk cId="1151215240" sldId="256"/>
+            <ac:cxnSpMk id="160" creationId="{5ADF684D-79A8-8014-7FB9-C0DECF7DBF95}"/>
+          </ac:cxnSpMkLst>
+        </pc:cxnChg>
+        <pc:cxnChg chg="mod">
+          <ac:chgData name="Fiechter Sebastian (IT-PTR-EXT-EXT2 - Extern)" userId="f23e6d81-0328-4361-b5a9-44eea62aa731" providerId="ADAL" clId="{9681DBBF-CC28-48CE-8222-BE1E4CADF4A4}" dt="2024-06-24T14:45:16.271" v="2610"/>
+          <ac:cxnSpMkLst>
+            <pc:docMk/>
+            <pc:sldMk cId="1151215240" sldId="256"/>
+            <ac:cxnSpMk id="161" creationId="{BB56DE32-EC93-1C60-7439-5DB426D39E83}"/>
+          </ac:cxnSpMkLst>
+        </pc:cxnChg>
+        <pc:cxnChg chg="mod">
+          <ac:chgData name="Fiechter Sebastian (IT-PTR-EXT-EXT2 - Extern)" userId="f23e6d81-0328-4361-b5a9-44eea62aa731" providerId="ADAL" clId="{9681DBBF-CC28-48CE-8222-BE1E4CADF4A4}" dt="2024-06-24T14:45:16.271" v="2610"/>
+          <ac:cxnSpMkLst>
+            <pc:docMk/>
+            <pc:sldMk cId="1151215240" sldId="256"/>
+            <ac:cxnSpMk id="164" creationId="{317E4BD3-8B41-59DC-802B-619267DD0C6D}"/>
+          </ac:cxnSpMkLst>
+        </pc:cxnChg>
+        <pc:cxnChg chg="mod">
+          <ac:chgData name="Fiechter Sebastian (IT-PTR-EXT-EXT2 - Extern)" userId="f23e6d81-0328-4361-b5a9-44eea62aa731" providerId="ADAL" clId="{9681DBBF-CC28-48CE-8222-BE1E4CADF4A4}" dt="2024-06-24T14:45:16.271" v="2610"/>
+          <ac:cxnSpMkLst>
+            <pc:docMk/>
+            <pc:sldMk cId="1151215240" sldId="256"/>
+            <ac:cxnSpMk id="165" creationId="{99473C16-1EA9-30B7-B5E4-397563A9D277}"/>
+          </ac:cxnSpMkLst>
+        </pc:cxnChg>
+        <pc:cxnChg chg="mod">
+          <ac:chgData name="Fiechter Sebastian (IT-PTR-EXT-EXT2 - Extern)" userId="f23e6d81-0328-4361-b5a9-44eea62aa731" providerId="ADAL" clId="{9681DBBF-CC28-48CE-8222-BE1E4CADF4A4}" dt="2024-06-24T14:45:16.271" v="2610"/>
+          <ac:cxnSpMkLst>
+            <pc:docMk/>
+            <pc:sldMk cId="1151215240" sldId="256"/>
+            <ac:cxnSpMk id="168" creationId="{812DE5FC-990F-4193-D9B4-8C4EDD5E6B2D}"/>
+          </ac:cxnSpMkLst>
+        </pc:cxnChg>
+        <pc:cxnChg chg="mod">
+          <ac:chgData name="Fiechter Sebastian (IT-PTR-EXT-EXT2 - Extern)" userId="f23e6d81-0328-4361-b5a9-44eea62aa731" providerId="ADAL" clId="{9681DBBF-CC28-48CE-8222-BE1E4CADF4A4}" dt="2024-06-24T14:45:16.271" v="2610"/>
+          <ac:cxnSpMkLst>
+            <pc:docMk/>
+            <pc:sldMk cId="1151215240" sldId="256"/>
+            <ac:cxnSpMk id="169" creationId="{0D052B27-93AA-6A9E-7A0C-A707E9805230}"/>
+          </ac:cxnSpMkLst>
+        </pc:cxnChg>
+        <pc:cxnChg chg="mod">
+          <ac:chgData name="Fiechter Sebastian (IT-PTR-EXT-EXT2 - Extern)" userId="f23e6d81-0328-4361-b5a9-44eea62aa731" providerId="ADAL" clId="{9681DBBF-CC28-48CE-8222-BE1E4CADF4A4}" dt="2024-06-24T14:45:16.271" v="2610"/>
+          <ac:cxnSpMkLst>
+            <pc:docMk/>
+            <pc:sldMk cId="1151215240" sldId="256"/>
+            <ac:cxnSpMk id="172" creationId="{8218A6E2-29BE-62D2-2E1A-F1DA9259A401}"/>
+          </ac:cxnSpMkLst>
+        </pc:cxnChg>
+        <pc:cxnChg chg="mod">
+          <ac:chgData name="Fiechter Sebastian (IT-PTR-EXT-EXT2 - Extern)" userId="f23e6d81-0328-4361-b5a9-44eea62aa731" providerId="ADAL" clId="{9681DBBF-CC28-48CE-8222-BE1E4CADF4A4}" dt="2024-06-24T14:45:16.271" v="2610"/>
+          <ac:cxnSpMkLst>
+            <pc:docMk/>
+            <pc:sldMk cId="1151215240" sldId="256"/>
+            <ac:cxnSpMk id="173" creationId="{66BF35E9-0D58-CF63-FE08-587EBB0964AA}"/>
+          </ac:cxnSpMkLst>
+        </pc:cxnChg>
+        <pc:cxnChg chg="mod">
+          <ac:chgData name="Fiechter Sebastian (IT-PTR-EXT-EXT2 - Extern)" userId="f23e6d81-0328-4361-b5a9-44eea62aa731" providerId="ADAL" clId="{9681DBBF-CC28-48CE-8222-BE1E4CADF4A4}" dt="2024-06-24T14:45:16.271" v="2610"/>
+          <ac:cxnSpMkLst>
+            <pc:docMk/>
+            <pc:sldMk cId="1151215240" sldId="256"/>
+            <ac:cxnSpMk id="176" creationId="{AE138720-0DF0-882F-DE61-F9209717F474}"/>
+          </ac:cxnSpMkLst>
+        </pc:cxnChg>
+        <pc:cxnChg chg="mod">
+          <ac:chgData name="Fiechter Sebastian (IT-PTR-EXT-EXT2 - Extern)" userId="f23e6d81-0328-4361-b5a9-44eea62aa731" providerId="ADAL" clId="{9681DBBF-CC28-48CE-8222-BE1E4CADF4A4}" dt="2024-06-24T14:45:16.271" v="2610"/>
+          <ac:cxnSpMkLst>
+            <pc:docMk/>
+            <pc:sldMk cId="1151215240" sldId="256"/>
+            <ac:cxnSpMk id="177" creationId="{376891CD-9562-8B36-057E-EB7F1C675828}"/>
+          </ac:cxnSpMkLst>
+        </pc:cxnChg>
+        <pc:cxnChg chg="mod">
+          <ac:chgData name="Fiechter Sebastian (IT-PTR-EXT-EXT2 - Extern)" userId="f23e6d81-0328-4361-b5a9-44eea62aa731" providerId="ADAL" clId="{9681DBBF-CC28-48CE-8222-BE1E4CADF4A4}" dt="2024-06-24T14:45:16.271" v="2610"/>
+          <ac:cxnSpMkLst>
+            <pc:docMk/>
+            <pc:sldMk cId="1151215240" sldId="256"/>
+            <ac:cxnSpMk id="180" creationId="{DDE42A2C-4252-9524-A4C0-E199D4F1BF17}"/>
+          </ac:cxnSpMkLst>
+        </pc:cxnChg>
+        <pc:cxnChg chg="mod">
+          <ac:chgData name="Fiechter Sebastian (IT-PTR-EXT-EXT2 - Extern)" userId="f23e6d81-0328-4361-b5a9-44eea62aa731" providerId="ADAL" clId="{9681DBBF-CC28-48CE-8222-BE1E4CADF4A4}" dt="2024-06-24T14:45:16.271" v="2610"/>
+          <ac:cxnSpMkLst>
+            <pc:docMk/>
+            <pc:sldMk cId="1151215240" sldId="256"/>
+            <ac:cxnSpMk id="181" creationId="{BEA8D136-DDB2-83A3-52B4-F8E9CB3BE560}"/>
+          </ac:cxnSpMkLst>
+        </pc:cxnChg>
+        <pc:cxnChg chg="mod">
+          <ac:chgData name="Fiechter Sebastian (IT-PTR-EXT-EXT2 - Extern)" userId="f23e6d81-0328-4361-b5a9-44eea62aa731" providerId="ADAL" clId="{9681DBBF-CC28-48CE-8222-BE1E4CADF4A4}" dt="2024-06-24T14:45:16.271" v="2610"/>
+          <ac:cxnSpMkLst>
+            <pc:docMk/>
+            <pc:sldMk cId="1151215240" sldId="256"/>
+            <ac:cxnSpMk id="184" creationId="{C32EBFAD-0A0D-ADC8-B060-0C27A24EC1E1}"/>
+          </ac:cxnSpMkLst>
+        </pc:cxnChg>
+        <pc:cxnChg chg="mod">
+          <ac:chgData name="Fiechter Sebastian (IT-PTR-EXT-EXT2 - Extern)" userId="f23e6d81-0328-4361-b5a9-44eea62aa731" providerId="ADAL" clId="{9681DBBF-CC28-48CE-8222-BE1E4CADF4A4}" dt="2024-06-24T14:45:16.271" v="2610"/>
+          <ac:cxnSpMkLst>
+            <pc:docMk/>
+            <pc:sldMk cId="1151215240" sldId="256"/>
+            <ac:cxnSpMk id="185" creationId="{29832304-8BDE-C437-927A-568990D8A2FB}"/>
+          </ac:cxnSpMkLst>
+        </pc:cxnChg>
+        <pc:cxnChg chg="mod">
+          <ac:chgData name="Fiechter Sebastian (IT-PTR-EXT-EXT2 - Extern)" userId="f23e6d81-0328-4361-b5a9-44eea62aa731" providerId="ADAL" clId="{9681DBBF-CC28-48CE-8222-BE1E4CADF4A4}" dt="2024-06-25T08:16:57.521" v="3815" actId="207"/>
+          <ac:cxnSpMkLst>
+            <pc:docMk/>
+            <pc:sldMk cId="1151215240" sldId="256"/>
+            <ac:cxnSpMk id="218" creationId="{01D223C2-D8F1-3CF0-D46A-37A88E46C826}"/>
+          </ac:cxnSpMkLst>
+        </pc:cxnChg>
+        <pc:cxnChg chg="mod">
+          <ac:chgData name="Fiechter Sebastian (IT-PTR-EXT-EXT2 - Extern)" userId="f23e6d81-0328-4361-b5a9-44eea62aa731" providerId="ADAL" clId="{9681DBBF-CC28-48CE-8222-BE1E4CADF4A4}" dt="2024-06-25T08:16:57.521" v="3815" actId="207"/>
+          <ac:cxnSpMkLst>
+            <pc:docMk/>
+            <pc:sldMk cId="1151215240" sldId="256"/>
+            <ac:cxnSpMk id="219" creationId="{B890E64C-F286-E09F-D4AF-01A6BA729AFE}"/>
+          </ac:cxnSpMkLst>
+        </pc:cxnChg>
+        <pc:cxnChg chg="mod">
+          <ac:chgData name="Fiechter Sebastian (IT-PTR-EXT-EXT2 - Extern)" userId="f23e6d81-0328-4361-b5a9-44eea62aa731" providerId="ADAL" clId="{9681DBBF-CC28-48CE-8222-BE1E4CADF4A4}" dt="2024-06-24T14:45:21.501" v="2611"/>
+          <ac:cxnSpMkLst>
+            <pc:docMk/>
+            <pc:sldMk cId="1151215240" sldId="256"/>
+            <ac:cxnSpMk id="221" creationId="{87A9BC50-93B4-7907-01FF-57C139717AC8}"/>
+          </ac:cxnSpMkLst>
+        </pc:cxnChg>
+        <pc:cxnChg chg="mod">
+          <ac:chgData name="Fiechter Sebastian (IT-PTR-EXT-EXT2 - Extern)" userId="f23e6d81-0328-4361-b5a9-44eea62aa731" providerId="ADAL" clId="{9681DBBF-CC28-48CE-8222-BE1E4CADF4A4}" dt="2024-06-24T14:45:21.501" v="2611"/>
+          <ac:cxnSpMkLst>
+            <pc:docMk/>
+            <pc:sldMk cId="1151215240" sldId="256"/>
+            <ac:cxnSpMk id="222" creationId="{9E1B104B-387E-0505-E521-049517AB0BF3}"/>
+          </ac:cxnSpMkLst>
+        </pc:cxnChg>
+        <pc:cxnChg chg="mod">
+          <ac:chgData name="Fiechter Sebastian (IT-PTR-EXT-EXT2 - Extern)" userId="f23e6d81-0328-4361-b5a9-44eea62aa731" providerId="ADAL" clId="{9681DBBF-CC28-48CE-8222-BE1E4CADF4A4}" dt="2024-06-25T08:16:57.521" v="3815" actId="207"/>
+          <ac:cxnSpMkLst>
+            <pc:docMk/>
+            <pc:sldMk cId="1151215240" sldId="256"/>
+            <ac:cxnSpMk id="225" creationId="{6E8F540D-BFC6-FA0E-42F5-64FAB3EFB328}"/>
+          </ac:cxnSpMkLst>
+        </pc:cxnChg>
+        <pc:cxnChg chg="mod">
+          <ac:chgData name="Fiechter Sebastian (IT-PTR-EXT-EXT2 - Extern)" userId="f23e6d81-0328-4361-b5a9-44eea62aa731" providerId="ADAL" clId="{9681DBBF-CC28-48CE-8222-BE1E4CADF4A4}" dt="2024-06-25T08:16:57.521" v="3815" actId="207"/>
+          <ac:cxnSpMkLst>
+            <pc:docMk/>
+            <pc:sldMk cId="1151215240" sldId="256"/>
+            <ac:cxnSpMk id="226" creationId="{01C68BB6-639A-C4BD-295C-566C41F17EDD}"/>
+          </ac:cxnSpMkLst>
+        </pc:cxnChg>
+        <pc:cxnChg chg="mod">
+          <ac:chgData name="Fiechter Sebastian (IT-PTR-EXT-EXT2 - Extern)" userId="f23e6d81-0328-4361-b5a9-44eea62aa731" providerId="ADAL" clId="{9681DBBF-CC28-48CE-8222-BE1E4CADF4A4}" dt="2024-06-25T08:16:57.521" v="3815" actId="207"/>
+          <ac:cxnSpMkLst>
+            <pc:docMk/>
+            <pc:sldMk cId="1151215240" sldId="256"/>
+            <ac:cxnSpMk id="229" creationId="{652B9BE9-0500-2723-07C6-075BE251284B}"/>
+          </ac:cxnSpMkLst>
+        </pc:cxnChg>
+        <pc:cxnChg chg="mod">
+          <ac:chgData name="Fiechter Sebastian (IT-PTR-EXT-EXT2 - Extern)" userId="f23e6d81-0328-4361-b5a9-44eea62aa731" providerId="ADAL" clId="{9681DBBF-CC28-48CE-8222-BE1E4CADF4A4}" dt="2024-06-25T08:16:57.521" v="3815" actId="207"/>
+          <ac:cxnSpMkLst>
+            <pc:docMk/>
+            <pc:sldMk cId="1151215240" sldId="256"/>
+            <ac:cxnSpMk id="230" creationId="{110AE289-7542-750B-BCB5-4E63B19AFBED}"/>
+          </ac:cxnSpMkLst>
+        </pc:cxnChg>
+        <pc:cxnChg chg="mod">
+          <ac:chgData name="Fiechter Sebastian (IT-PTR-EXT-EXT2 - Extern)" userId="f23e6d81-0328-4361-b5a9-44eea62aa731" providerId="ADAL" clId="{9681DBBF-CC28-48CE-8222-BE1E4CADF4A4}" dt="2024-06-25T08:16:57.521" v="3815" actId="207"/>
+          <ac:cxnSpMkLst>
+            <pc:docMk/>
+            <pc:sldMk cId="1151215240" sldId="256"/>
+            <ac:cxnSpMk id="233" creationId="{15EA2892-17A4-681C-67FB-826B1F8D2594}"/>
+          </ac:cxnSpMkLst>
+        </pc:cxnChg>
+        <pc:cxnChg chg="mod">
+          <ac:chgData name="Fiechter Sebastian (IT-PTR-EXT-EXT2 - Extern)" userId="f23e6d81-0328-4361-b5a9-44eea62aa731" providerId="ADAL" clId="{9681DBBF-CC28-48CE-8222-BE1E4CADF4A4}" dt="2024-06-25T08:16:57.521" v="3815" actId="207"/>
+          <ac:cxnSpMkLst>
+            <pc:docMk/>
+            <pc:sldMk cId="1151215240" sldId="256"/>
+            <ac:cxnSpMk id="234" creationId="{413CBC2E-2485-0978-3A3C-395CF725454F}"/>
+          </ac:cxnSpMkLst>
+        </pc:cxnChg>
+        <pc:cxnChg chg="mod">
+          <ac:chgData name="Fiechter Sebastian (IT-PTR-EXT-EXT2 - Extern)" userId="f23e6d81-0328-4361-b5a9-44eea62aa731" providerId="ADAL" clId="{9681DBBF-CC28-48CE-8222-BE1E4CADF4A4}" dt="2024-06-25T08:16:57.521" v="3815" actId="207"/>
+          <ac:cxnSpMkLst>
+            <pc:docMk/>
+            <pc:sldMk cId="1151215240" sldId="256"/>
+            <ac:cxnSpMk id="237" creationId="{E73D4BFC-49E7-04F0-19C0-80D084C3AC27}"/>
+          </ac:cxnSpMkLst>
+        </pc:cxnChg>
+        <pc:cxnChg chg="mod">
+          <ac:chgData name="Fiechter Sebastian (IT-PTR-EXT-EXT2 - Extern)" userId="f23e6d81-0328-4361-b5a9-44eea62aa731" providerId="ADAL" clId="{9681DBBF-CC28-48CE-8222-BE1E4CADF4A4}" dt="2024-06-25T08:16:57.521" v="3815" actId="207"/>
+          <ac:cxnSpMkLst>
+            <pc:docMk/>
+            <pc:sldMk cId="1151215240" sldId="256"/>
+            <ac:cxnSpMk id="238" creationId="{CD6CB446-FDCE-D040-8A91-61EE83F252A0}"/>
+          </ac:cxnSpMkLst>
+        </pc:cxnChg>
+        <pc:cxnChg chg="mod">
+          <ac:chgData name="Fiechter Sebastian (IT-PTR-EXT-EXT2 - Extern)" userId="f23e6d81-0328-4361-b5a9-44eea62aa731" providerId="ADAL" clId="{9681DBBF-CC28-48CE-8222-BE1E4CADF4A4}" dt="2024-06-24T14:45:21.501" v="2611"/>
+          <ac:cxnSpMkLst>
+            <pc:docMk/>
+            <pc:sldMk cId="1151215240" sldId="256"/>
+            <ac:cxnSpMk id="241" creationId="{69E0E9C7-0A22-B1A6-3C7C-35B5ABBF7844}"/>
+          </ac:cxnSpMkLst>
+        </pc:cxnChg>
+        <pc:cxnChg chg="mod">
+          <ac:chgData name="Fiechter Sebastian (IT-PTR-EXT-EXT2 - Extern)" userId="f23e6d81-0328-4361-b5a9-44eea62aa731" providerId="ADAL" clId="{9681DBBF-CC28-48CE-8222-BE1E4CADF4A4}" dt="2024-06-24T14:45:21.501" v="2611"/>
+          <ac:cxnSpMkLst>
+            <pc:docMk/>
+            <pc:sldMk cId="1151215240" sldId="256"/>
+            <ac:cxnSpMk id="242" creationId="{DAB56C4A-C1AC-4948-07EC-DFFED6D77FE0}"/>
+          </ac:cxnSpMkLst>
+        </pc:cxnChg>
+        <pc:cxnChg chg="mod">
+          <ac:chgData name="Fiechter Sebastian (IT-PTR-EXT-EXT2 - Extern)" userId="f23e6d81-0328-4361-b5a9-44eea62aa731" providerId="ADAL" clId="{9681DBBF-CC28-48CE-8222-BE1E4CADF4A4}" dt="2024-06-24T15:06:21.683" v="3226" actId="207"/>
+          <ac:cxnSpMkLst>
+            <pc:docMk/>
+            <pc:sldMk cId="1151215240" sldId="256"/>
+            <ac:cxnSpMk id="245" creationId="{F5A223D0-A293-BD84-7BAC-B7770235B425}"/>
+          </ac:cxnSpMkLst>
+        </pc:cxnChg>
+        <pc:cxnChg chg="mod">
+          <ac:chgData name="Fiechter Sebastian (IT-PTR-EXT-EXT2 - Extern)" userId="f23e6d81-0328-4361-b5a9-44eea62aa731" providerId="ADAL" clId="{9681DBBF-CC28-48CE-8222-BE1E4CADF4A4}" dt="2024-06-24T15:06:21.683" v="3226" actId="207"/>
+          <ac:cxnSpMkLst>
+            <pc:docMk/>
+            <pc:sldMk cId="1151215240" sldId="256"/>
+            <ac:cxnSpMk id="246" creationId="{4E9BB5F2-CD87-5C2B-0D93-8864C6B334EA}"/>
+          </ac:cxnSpMkLst>
+        </pc:cxnChg>
+        <pc:cxnChg chg="mod">
+          <ac:chgData name="Fiechter Sebastian (IT-PTR-EXT-EXT2 - Extern)" userId="f23e6d81-0328-4361-b5a9-44eea62aa731" providerId="ADAL" clId="{9681DBBF-CC28-48CE-8222-BE1E4CADF4A4}" dt="2024-06-24T14:45:21.501" v="2611"/>
+          <ac:cxnSpMkLst>
+            <pc:docMk/>
+            <pc:sldMk cId="1151215240" sldId="256"/>
+            <ac:cxnSpMk id="249" creationId="{9ADE8A7F-5A5C-1456-1DCB-09322AE95AAD}"/>
+          </ac:cxnSpMkLst>
+        </pc:cxnChg>
+        <pc:cxnChg chg="mod">
+          <ac:chgData name="Fiechter Sebastian (IT-PTR-EXT-EXT2 - Extern)" userId="f23e6d81-0328-4361-b5a9-44eea62aa731" providerId="ADAL" clId="{9681DBBF-CC28-48CE-8222-BE1E4CADF4A4}" dt="2024-06-24T14:45:21.501" v="2611"/>
+          <ac:cxnSpMkLst>
+            <pc:docMk/>
+            <pc:sldMk cId="1151215240" sldId="256"/>
+            <ac:cxnSpMk id="250" creationId="{21642D67-7239-53D5-4D5A-192059C2F853}"/>
+          </ac:cxnSpMkLst>
+        </pc:cxnChg>
+        <pc:cxnChg chg="mod">
+          <ac:chgData name="Fiechter Sebastian (IT-PTR-EXT-EXT2 - Extern)" userId="f23e6d81-0328-4361-b5a9-44eea62aa731" providerId="ADAL" clId="{9681DBBF-CC28-48CE-8222-BE1E4CADF4A4}" dt="2024-06-24T15:06:21.683" v="3226" actId="207"/>
+          <ac:cxnSpMkLst>
+            <pc:docMk/>
+            <pc:sldMk cId="1151215240" sldId="256"/>
+            <ac:cxnSpMk id="253" creationId="{D7A01F6A-BAF5-353B-4CC7-60CF813F7C6A}"/>
+          </ac:cxnSpMkLst>
+        </pc:cxnChg>
+        <pc:cxnChg chg="mod">
+          <ac:chgData name="Fiechter Sebastian (IT-PTR-EXT-EXT2 - Extern)" userId="f23e6d81-0328-4361-b5a9-44eea62aa731" providerId="ADAL" clId="{9681DBBF-CC28-48CE-8222-BE1E4CADF4A4}" dt="2024-06-24T15:06:21.683" v="3226" actId="207"/>
+          <ac:cxnSpMkLst>
+            <pc:docMk/>
+            <pc:sldMk cId="1151215240" sldId="256"/>
+            <ac:cxnSpMk id="254" creationId="{D91C292B-FCD9-B212-10CB-A8A349529850}"/>
+          </ac:cxnSpMkLst>
+        </pc:cxnChg>
+        <pc:cxnChg chg="mod">
+          <ac:chgData name="Fiechter Sebastian (IT-PTR-EXT-EXT2 - Extern)" userId="f23e6d81-0328-4361-b5a9-44eea62aa731" providerId="ADAL" clId="{9681DBBF-CC28-48CE-8222-BE1E4CADF4A4}" dt="2024-06-24T15:02:39.483" v="3220" actId="108"/>
+          <ac:cxnSpMkLst>
+            <pc:docMk/>
+            <pc:sldMk cId="1151215240" sldId="256"/>
+            <ac:cxnSpMk id="257" creationId="{4F4DFA61-028F-7EE7-95DC-8AE0B52119DF}"/>
+          </ac:cxnSpMkLst>
+        </pc:cxnChg>
+        <pc:cxnChg chg="mod">
+          <ac:chgData name="Fiechter Sebastian (IT-PTR-EXT-EXT2 - Extern)" userId="f23e6d81-0328-4361-b5a9-44eea62aa731" providerId="ADAL" clId="{9681DBBF-CC28-48CE-8222-BE1E4CADF4A4}" dt="2024-06-24T15:02:39.483" v="3220" actId="108"/>
+          <ac:cxnSpMkLst>
+            <pc:docMk/>
+            <pc:sldMk cId="1151215240" sldId="256"/>
+            <ac:cxnSpMk id="258" creationId="{91D2B3AE-4408-44AD-6CBA-7E51DDC4AE5A}"/>
+          </ac:cxnSpMkLst>
+        </pc:cxnChg>
+        <pc:cxnChg chg="mod">
+          <ac:chgData name="Fiechter Sebastian (IT-PTR-EXT-EXT2 - Extern)" userId="f23e6d81-0328-4361-b5a9-44eea62aa731" providerId="ADAL" clId="{9681DBBF-CC28-48CE-8222-BE1E4CADF4A4}" dt="2024-06-24T15:06:21.683" v="3226" actId="207"/>
+          <ac:cxnSpMkLst>
+            <pc:docMk/>
+            <pc:sldMk cId="1151215240" sldId="256"/>
+            <ac:cxnSpMk id="261" creationId="{BDB2E23B-83D2-4414-885C-A49ADC930FCB}"/>
+          </ac:cxnSpMkLst>
+        </pc:cxnChg>
+        <pc:cxnChg chg="mod">
+          <ac:chgData name="Fiechter Sebastian (IT-PTR-EXT-EXT2 - Extern)" userId="f23e6d81-0328-4361-b5a9-44eea62aa731" providerId="ADAL" clId="{9681DBBF-CC28-48CE-8222-BE1E4CADF4A4}" dt="2024-06-24T15:06:21.683" v="3226" actId="207"/>
+          <ac:cxnSpMkLst>
+            <pc:docMk/>
+            <pc:sldMk cId="1151215240" sldId="256"/>
+            <ac:cxnSpMk id="262" creationId="{EB6B7A9B-B82D-2F50-D9E7-CE42B9E6641D}"/>
+          </ac:cxnSpMkLst>
+        </pc:cxnChg>
+        <pc:cxnChg chg="del mod">
+          <ac:chgData name="Fiechter Sebastian (IT-PTR-EXT-EXT2 - Extern)" userId="f23e6d81-0328-4361-b5a9-44eea62aa731" providerId="ADAL" clId="{9681DBBF-CC28-48CE-8222-BE1E4CADF4A4}" dt="2024-06-26T09:23:29.253" v="4544" actId="478"/>
+          <ac:cxnSpMkLst>
+            <pc:docMk/>
+            <pc:sldMk cId="1151215240" sldId="256"/>
+            <ac:cxnSpMk id="267" creationId="{A4AC9A5E-56F9-34EC-4BC6-AA718024B176}"/>
+          </ac:cxnSpMkLst>
+        </pc:cxnChg>
+        <pc:cxnChg chg="del mod topLvl">
+          <ac:chgData name="Fiechter Sebastian (IT-PTR-EXT-EXT2 - Extern)" userId="f23e6d81-0328-4361-b5a9-44eea62aa731" providerId="ADAL" clId="{9681DBBF-CC28-48CE-8222-BE1E4CADF4A4}" dt="2024-06-26T09:23:33.065" v="4546" actId="478"/>
+          <ac:cxnSpMkLst>
+            <pc:docMk/>
+            <pc:sldMk cId="1151215240" sldId="256"/>
+            <ac:cxnSpMk id="268" creationId="{AC86482F-168F-FFDB-1964-08CA685A9E50}"/>
+          </ac:cxnSpMkLst>
+        </pc:cxnChg>
+        <pc:cxnChg chg="add mod">
+          <ac:chgData name="Fiechter Sebastian (IT-PTR-EXT-EXT2 - Extern)" userId="f23e6d81-0328-4361-b5a9-44eea62aa731" providerId="ADAL" clId="{9681DBBF-CC28-48CE-8222-BE1E4CADF4A4}" dt="2024-06-26T07:58:31.089" v="4460" actId="1582"/>
+          <ac:cxnSpMkLst>
+            <pc:docMk/>
+            <pc:sldMk cId="1151215240" sldId="256"/>
+            <ac:cxnSpMk id="302" creationId="{2E33902B-4A75-29D9-E4A7-3539B0F01BDA}"/>
+          </ac:cxnSpMkLst>
+        </pc:cxnChg>
+        <pc:cxnChg chg="mod">
+          <ac:chgData name="Fiechter Sebastian (IT-PTR-EXT-EXT2 - Extern)" userId="f23e6d81-0328-4361-b5a9-44eea62aa731" providerId="ADAL" clId="{9681DBBF-CC28-48CE-8222-BE1E4CADF4A4}" dt="2024-06-25T08:17:42.555" v="3816" actId="207"/>
+          <ac:cxnSpMkLst>
+            <pc:docMk/>
+            <pc:sldMk cId="1151215240" sldId="256"/>
+            <ac:cxnSpMk id="305" creationId="{85575911-2F15-C175-FB2E-1A21F585F40E}"/>
+          </ac:cxnSpMkLst>
+        </pc:cxnChg>
+        <pc:cxnChg chg="mod">
+          <ac:chgData name="Fiechter Sebastian (IT-PTR-EXT-EXT2 - Extern)" userId="f23e6d81-0328-4361-b5a9-44eea62aa731" providerId="ADAL" clId="{9681DBBF-CC28-48CE-8222-BE1E4CADF4A4}" dt="2024-06-25T08:17:42.555" v="3816" actId="207"/>
+          <ac:cxnSpMkLst>
+            <pc:docMk/>
+            <pc:sldMk cId="1151215240" sldId="256"/>
+            <ac:cxnSpMk id="306" creationId="{4BC179A5-BE99-CFE3-CD75-32936A91BD92}"/>
+          </ac:cxnSpMkLst>
+        </pc:cxnChg>
+        <pc:cxnChg chg="add mod">
+          <ac:chgData name="Fiechter Sebastian (IT-PTR-EXT-EXT2 - Extern)" userId="f23e6d81-0328-4361-b5a9-44eea62aa731" providerId="ADAL" clId="{9681DBBF-CC28-48CE-8222-BE1E4CADF4A4}" dt="2024-06-26T07:57:34.718" v="4439" actId="1035"/>
+          <ac:cxnSpMkLst>
+            <pc:docMk/>
+            <pc:sldMk cId="1151215240" sldId="256"/>
+            <ac:cxnSpMk id="314" creationId="{8418456E-2B41-E1C5-1F00-C6EC14926CDC}"/>
+          </ac:cxnSpMkLst>
+        </pc:cxnChg>
+        <pc:cxnChg chg="add mod">
+          <ac:chgData name="Fiechter Sebastian (IT-PTR-EXT-EXT2 - Extern)" userId="f23e6d81-0328-4361-b5a9-44eea62aa731" providerId="ADAL" clId="{9681DBBF-CC28-48CE-8222-BE1E4CADF4A4}" dt="2024-06-26T07:57:34.718" v="4439" actId="1035"/>
+          <ac:cxnSpMkLst>
+            <pc:docMk/>
+            <pc:sldMk cId="1151215240" sldId="256"/>
+            <ac:cxnSpMk id="316" creationId="{0EE1EBBA-4435-5E39-9A8F-533B9FE28AF4}"/>
+          </ac:cxnSpMkLst>
+        </pc:cxnChg>
+        <pc:cxnChg chg="add mod">
+          <ac:chgData name="Fiechter Sebastian (IT-PTR-EXT-EXT2 - Extern)" userId="f23e6d81-0328-4361-b5a9-44eea62aa731" providerId="ADAL" clId="{9681DBBF-CC28-48CE-8222-BE1E4CADF4A4}" dt="2024-06-26T07:57:34.718" v="4439" actId="1035"/>
+          <ac:cxnSpMkLst>
+            <pc:docMk/>
+            <pc:sldMk cId="1151215240" sldId="256"/>
+            <ac:cxnSpMk id="317" creationId="{779E71CB-C8BD-283A-6EE6-327DC8A8D5A4}"/>
+          </ac:cxnSpMkLst>
+        </pc:cxnChg>
+        <pc:cxnChg chg="add mod">
+          <ac:chgData name="Fiechter Sebastian (IT-PTR-EXT-EXT2 - Extern)" userId="f23e6d81-0328-4361-b5a9-44eea62aa731" providerId="ADAL" clId="{9681DBBF-CC28-48CE-8222-BE1E4CADF4A4}" dt="2024-06-26T07:57:34.718" v="4439" actId="1035"/>
+          <ac:cxnSpMkLst>
+            <pc:docMk/>
+            <pc:sldMk cId="1151215240" sldId="256"/>
+            <ac:cxnSpMk id="319" creationId="{2865260A-DB62-A7C2-5C41-C4D943C663AD}"/>
+          </ac:cxnSpMkLst>
+        </pc:cxnChg>
+        <pc:cxnChg chg="add mod">
+          <ac:chgData name="Fiechter Sebastian (IT-PTR-EXT-EXT2 - Extern)" userId="f23e6d81-0328-4361-b5a9-44eea62aa731" providerId="ADAL" clId="{9681DBBF-CC28-48CE-8222-BE1E4CADF4A4}" dt="2024-06-26T07:57:34.718" v="4439" actId="1035"/>
+          <ac:cxnSpMkLst>
+            <pc:docMk/>
+            <pc:sldMk cId="1151215240" sldId="256"/>
+            <ac:cxnSpMk id="320" creationId="{60DE216B-0F3B-A4C2-4EA2-B095D77CBF73}"/>
+          </ac:cxnSpMkLst>
+        </pc:cxnChg>
+        <pc:cxnChg chg="add mod">
+          <ac:chgData name="Fiechter Sebastian (IT-PTR-EXT-EXT2 - Extern)" userId="f23e6d81-0328-4361-b5a9-44eea62aa731" providerId="ADAL" clId="{9681DBBF-CC28-48CE-8222-BE1E4CADF4A4}" dt="2024-06-26T07:57:34.718" v="4439" actId="1035"/>
+          <ac:cxnSpMkLst>
+            <pc:docMk/>
+            <pc:sldMk cId="1151215240" sldId="256"/>
+            <ac:cxnSpMk id="325" creationId="{9EB266B0-2116-FAA2-235A-6942B64B250A}"/>
+          </ac:cxnSpMkLst>
+        </pc:cxnChg>
+        <pc:cxnChg chg="add mod">
+          <ac:chgData name="Fiechter Sebastian (IT-PTR-EXT-EXT2 - Extern)" userId="f23e6d81-0328-4361-b5a9-44eea62aa731" providerId="ADAL" clId="{9681DBBF-CC28-48CE-8222-BE1E4CADF4A4}" dt="2024-06-26T07:57:34.718" v="4439" actId="1035"/>
+          <ac:cxnSpMkLst>
+            <pc:docMk/>
+            <pc:sldMk cId="1151215240" sldId="256"/>
+            <ac:cxnSpMk id="326" creationId="{1F5B2737-3786-F7F3-94F7-FE71B2C4D4AA}"/>
+          </ac:cxnSpMkLst>
+        </pc:cxnChg>
+        <pc:cxnChg chg="add mod ord">
+          <ac:chgData name="Fiechter Sebastian (IT-PTR-EXT-EXT2 - Extern)" userId="f23e6d81-0328-4361-b5a9-44eea62aa731" providerId="ADAL" clId="{9681DBBF-CC28-48CE-8222-BE1E4CADF4A4}" dt="2024-07-18T06:25:22.906" v="5607" actId="167"/>
+          <ac:cxnSpMkLst>
+            <pc:docMk/>
+            <pc:sldMk cId="1151215240" sldId="256"/>
+            <ac:cxnSpMk id="328" creationId="{BB4C371E-C7CE-4A49-9211-FA03320B856F}"/>
+          </ac:cxnSpMkLst>
+        </pc:cxnChg>
+        <pc:cxnChg chg="add mod">
+          <ac:chgData name="Fiechter Sebastian (IT-PTR-EXT-EXT2 - Extern)" userId="f23e6d81-0328-4361-b5a9-44eea62aa731" providerId="ADAL" clId="{9681DBBF-CC28-48CE-8222-BE1E4CADF4A4}" dt="2024-06-26T07:57:34.718" v="4439" actId="1035"/>
+          <ac:cxnSpMkLst>
+            <pc:docMk/>
+            <pc:sldMk cId="1151215240" sldId="256"/>
+            <ac:cxnSpMk id="330" creationId="{E205D36B-33B1-EF02-18DB-D4A364DE4BEC}"/>
+          </ac:cxnSpMkLst>
+        </pc:cxnChg>
+        <pc:cxnChg chg="add mod">
+          <ac:chgData name="Fiechter Sebastian (IT-PTR-EXT-EXT2 - Extern)" userId="f23e6d81-0328-4361-b5a9-44eea62aa731" providerId="ADAL" clId="{9681DBBF-CC28-48CE-8222-BE1E4CADF4A4}" dt="2024-06-26T07:57:34.718" v="4439" actId="1035"/>
+          <ac:cxnSpMkLst>
+            <pc:docMk/>
+            <pc:sldMk cId="1151215240" sldId="256"/>
+            <ac:cxnSpMk id="333" creationId="{CDD861C5-4CEE-228E-3090-CEED54AAAB89}"/>
+          </ac:cxnSpMkLst>
+        </pc:cxnChg>
+        <pc:cxnChg chg="add mod ord">
+          <ac:chgData name="Fiechter Sebastian (IT-PTR-EXT-EXT2 - Extern)" userId="f23e6d81-0328-4361-b5a9-44eea62aa731" providerId="ADAL" clId="{9681DBBF-CC28-48CE-8222-BE1E4CADF4A4}" dt="2024-06-26T07:57:34.718" v="4439" actId="1035"/>
+          <ac:cxnSpMkLst>
+            <pc:docMk/>
+            <pc:sldMk cId="1151215240" sldId="256"/>
+            <ac:cxnSpMk id="334" creationId="{BE374973-94F8-8DB7-BDBA-497130F8527D}"/>
+          </ac:cxnSpMkLst>
+        </pc:cxnChg>
+      </pc:sldChg>
+    </pc:docChg>
+  </pc:docChgLst>
+</pc:chgInfo>
 </file>
 
 <file path=ppt/notesMasters/notesMaster1.xml><?xml version="1.0" encoding="utf-8"?>
@@ -205,7 +3066,7 @@
           <a:p>
             <a:fld id="{37C84E4B-B338-4193-A47A-275E09D9F7E4}" type="datetimeFigureOut">
               <a:rPr lang="de-CH" smtClean="0"/>
-              <a:t>12.07.2024</a:t>
+              <a:t>18.07.2024</a:t>
             </a:fld>
             <a:endParaRPr lang="de-CH" dirty="0"/>
           </a:p>
@@ -706,7 +3567,7 @@
           <a:p>
             <a:fld id="{19D283FB-C38C-4A98-BBD1-312954666360}" type="datetimeFigureOut">
               <a:rPr lang="de-CH" smtClean="0"/>
-              <a:t>12.07.2024</a:t>
+              <a:t>18.07.2024</a:t>
             </a:fld>
             <a:endParaRPr lang="de-CH" dirty="0"/>
           </a:p>
@@ -906,7 +3767,7 @@
           <a:p>
             <a:fld id="{19D283FB-C38C-4A98-BBD1-312954666360}" type="datetimeFigureOut">
               <a:rPr lang="de-CH" smtClean="0"/>
-              <a:t>12.07.2024</a:t>
+              <a:t>18.07.2024</a:t>
             </a:fld>
             <a:endParaRPr lang="de-CH" dirty="0"/>
           </a:p>
@@ -1116,7 +3977,7 @@
           <a:p>
             <a:fld id="{19D283FB-C38C-4A98-BBD1-312954666360}" type="datetimeFigureOut">
               <a:rPr lang="de-CH" smtClean="0"/>
-              <a:t>12.07.2024</a:t>
+              <a:t>18.07.2024</a:t>
             </a:fld>
             <a:endParaRPr lang="de-CH" dirty="0"/>
           </a:p>
@@ -1316,7 +4177,7 @@
           <a:p>
             <a:fld id="{19D283FB-C38C-4A98-BBD1-312954666360}" type="datetimeFigureOut">
               <a:rPr lang="de-CH" smtClean="0"/>
-              <a:t>12.07.2024</a:t>
+              <a:t>18.07.2024</a:t>
             </a:fld>
             <a:endParaRPr lang="de-CH" dirty="0"/>
           </a:p>
@@ -1592,7 +4453,7 @@
           <a:p>
             <a:fld id="{19D283FB-C38C-4A98-BBD1-312954666360}" type="datetimeFigureOut">
               <a:rPr lang="de-CH" smtClean="0"/>
-              <a:t>12.07.2024</a:t>
+              <a:t>18.07.2024</a:t>
             </a:fld>
             <a:endParaRPr lang="de-CH" dirty="0"/>
           </a:p>
@@ -1860,7 +4721,7 @@
           <a:p>
             <a:fld id="{19D283FB-C38C-4A98-BBD1-312954666360}" type="datetimeFigureOut">
               <a:rPr lang="de-CH" smtClean="0"/>
-              <a:t>12.07.2024</a:t>
+              <a:t>18.07.2024</a:t>
             </a:fld>
             <a:endParaRPr lang="de-CH" dirty="0"/>
           </a:p>
@@ -2275,7 +5136,7 @@
           <a:p>
             <a:fld id="{19D283FB-C38C-4A98-BBD1-312954666360}" type="datetimeFigureOut">
               <a:rPr lang="de-CH" smtClean="0"/>
-              <a:t>12.07.2024</a:t>
+              <a:t>18.07.2024</a:t>
             </a:fld>
             <a:endParaRPr lang="de-CH" dirty="0"/>
           </a:p>
@@ -2417,7 +5278,7 @@
           <a:p>
             <a:fld id="{19D283FB-C38C-4A98-BBD1-312954666360}" type="datetimeFigureOut">
               <a:rPr lang="de-CH" smtClean="0"/>
-              <a:t>12.07.2024</a:t>
+              <a:t>18.07.2024</a:t>
             </a:fld>
             <a:endParaRPr lang="de-CH" dirty="0"/>
           </a:p>
@@ -2530,7 +5391,7 @@
           <a:p>
             <a:fld id="{19D283FB-C38C-4A98-BBD1-312954666360}" type="datetimeFigureOut">
               <a:rPr lang="de-CH" smtClean="0"/>
-              <a:t>12.07.2024</a:t>
+              <a:t>18.07.2024</a:t>
             </a:fld>
             <a:endParaRPr lang="de-CH" dirty="0"/>
           </a:p>
@@ -2843,7 +5704,7 @@
           <a:p>
             <a:fld id="{19D283FB-C38C-4A98-BBD1-312954666360}" type="datetimeFigureOut">
               <a:rPr lang="de-CH" smtClean="0"/>
-              <a:t>12.07.2024</a:t>
+              <a:t>18.07.2024</a:t>
             </a:fld>
             <a:endParaRPr lang="de-CH" dirty="0"/>
           </a:p>
@@ -3132,7 +5993,7 @@
           <a:p>
             <a:fld id="{19D283FB-C38C-4A98-BBD1-312954666360}" type="datetimeFigureOut">
               <a:rPr lang="de-CH" smtClean="0"/>
-              <a:t>12.07.2024</a:t>
+              <a:t>18.07.2024</a:t>
             </a:fld>
             <a:endParaRPr lang="de-CH" dirty="0"/>
           </a:p>
@@ -3375,7 +6236,7 @@
           <a:p>
             <a:fld id="{19D283FB-C38C-4A98-BBD1-312954666360}" type="datetimeFigureOut">
               <a:rPr lang="de-CH" smtClean="0"/>
-              <a:t>12.07.2024</a:t>
+              <a:t>18.07.2024</a:t>
             </a:fld>
             <a:endParaRPr lang="de-CH" dirty="0"/>
           </a:p>
@@ -3792,6 +6653,50 @@
           <a:chExt cx="0" cy="0"/>
         </a:xfrm>
       </p:grpSpPr>
+      <p:cxnSp>
+        <p:nvCxnSpPr>
+          <p:cNvPr id="328" name="Gerader Verbinder 327">
+            <a:extLst>
+              <a:ext uri="{FF2B5EF4-FFF2-40B4-BE49-F238E27FC236}">
+                <a16:creationId xmlns:a16="http://schemas.microsoft.com/office/drawing/2014/main" id="{BB4C371E-C7CE-4A49-9211-FA03320B856F}"/>
+              </a:ext>
+            </a:extLst>
+          </p:cNvPr>
+          <p:cNvCxnSpPr>
+            <a:cxnSpLocks/>
+          </p:cNvCxnSpPr>
+          <p:nvPr/>
+        </p:nvCxnSpPr>
+        <p:spPr>
+          <a:xfrm flipV="1">
+            <a:off x="5199313" y="6037652"/>
+            <a:ext cx="0" cy="304494"/>
+          </a:xfrm>
+          <a:prstGeom prst="line">
+            <a:avLst/>
+          </a:prstGeom>
+          <a:ln w="9525">
+            <a:solidFill>
+              <a:schemeClr val="tx1"/>
+            </a:solidFill>
+            <a:prstDash val="dash"/>
+          </a:ln>
+        </p:spPr>
+        <p:style>
+          <a:lnRef idx="2">
+            <a:schemeClr val="accent1"/>
+          </a:lnRef>
+          <a:fillRef idx="0">
+            <a:schemeClr val="accent1"/>
+          </a:fillRef>
+          <a:effectRef idx="1">
+            <a:schemeClr val="accent1"/>
+          </a:effectRef>
+          <a:fontRef idx="minor">
+            <a:schemeClr val="tx1"/>
+          </a:fontRef>
+        </p:style>
+      </p:cxnSp>
       <p:sp>
         <p:nvSpPr>
           <p:cNvPr id="88" name="Rechteck 87">
@@ -11248,7 +14153,7 @@
         </p:nvGrpSpPr>
         <p:grpSpPr>
           <a:xfrm>
-            <a:off x="3373634" y="485438"/>
+            <a:off x="3358004" y="485438"/>
             <a:ext cx="914400" cy="1608398"/>
             <a:chOff x="1097280" y="1092558"/>
             <a:chExt cx="914400" cy="1608398"/>
@@ -11356,7 +14261,19 @@
                   </a:solidFill>
                   <a:latin typeface="SBB Light" pitchFamily="2" charset="0"/>
                 </a:rPr>
-                <a:t>Barrierefreiheit</a:t>
+                <a:t>Benutzerforsch.</a:t>
+              </a:r>
+            </a:p>
+            <a:p>
+              <a:pPr algn="ctr"/>
+              <a:r>
+                <a:rPr lang="de-DE" sz="800" dirty="0">
+                  <a:solidFill>
+                    <a:schemeClr val="tx1"/>
+                  </a:solidFill>
+                  <a:latin typeface="SBB Light" pitchFamily="2" charset="0"/>
+                </a:rPr>
+                <a:t>Datenanalyse, </a:t>
               </a:r>
             </a:p>
             <a:p>
@@ -11369,30 +14286,6 @@
                   <a:latin typeface="SBB Light" pitchFamily="2" charset="0"/>
                 </a:rPr>
                 <a:t>Accessibility</a:t>
-              </a:r>
-            </a:p>
-            <a:p>
-              <a:pPr algn="ctr"/>
-              <a:r>
-                <a:rPr lang="de-DE" sz="800" dirty="0">
-                  <a:solidFill>
-                    <a:schemeClr val="tx1"/>
-                  </a:solidFill>
-                  <a:latin typeface="SBB Light" pitchFamily="2" charset="0"/>
-                </a:rPr>
-                <a:t>Benutzerforsch.</a:t>
-              </a:r>
-            </a:p>
-            <a:p>
-              <a:pPr algn="ctr"/>
-              <a:r>
-                <a:rPr lang="de-DE" sz="800" dirty="0">
-                  <a:solidFill>
-                    <a:schemeClr val="tx1"/>
-                  </a:solidFill>
-                  <a:latin typeface="SBB Light" pitchFamily="2" charset="0"/>
-                </a:rPr>
-                <a:t>Datenanalyse</a:t>
               </a:r>
             </a:p>
           </p:txBody>
@@ -15911,50 +18804,6 @@
           </a:p>
         </p:txBody>
       </p:sp>
-      <p:cxnSp>
-        <p:nvCxnSpPr>
-          <p:cNvPr id="328" name="Gerader Verbinder 327">
-            <a:extLst>
-              <a:ext uri="{FF2B5EF4-FFF2-40B4-BE49-F238E27FC236}">
-                <a16:creationId xmlns:a16="http://schemas.microsoft.com/office/drawing/2014/main" id="{BB4C371E-C7CE-4A49-9211-FA03320B856F}"/>
-              </a:ext>
-            </a:extLst>
-          </p:cNvPr>
-          <p:cNvCxnSpPr>
-            <a:cxnSpLocks/>
-          </p:cNvCxnSpPr>
-          <p:nvPr/>
-        </p:nvCxnSpPr>
-        <p:spPr>
-          <a:xfrm flipV="1">
-            <a:off x="5199313" y="6037652"/>
-            <a:ext cx="0" cy="304494"/>
-          </a:xfrm>
-          <a:prstGeom prst="line">
-            <a:avLst/>
-          </a:prstGeom>
-          <a:ln w="9525">
-            <a:solidFill>
-              <a:schemeClr val="tx1"/>
-            </a:solidFill>
-            <a:prstDash val="dash"/>
-          </a:ln>
-        </p:spPr>
-        <p:style>
-          <a:lnRef idx="2">
-            <a:schemeClr val="accent1"/>
-          </a:lnRef>
-          <a:fillRef idx="0">
-            <a:schemeClr val="accent1"/>
-          </a:fillRef>
-          <a:effectRef idx="1">
-            <a:schemeClr val="accent1"/>
-          </a:effectRef>
-          <a:fontRef idx="minor">
-            <a:schemeClr val="tx1"/>
-          </a:fontRef>
-        </p:style>
-      </p:cxnSp>
       <p:sp>
         <p:nvSpPr>
           <p:cNvPr id="329" name="Rechteck 328">
@@ -17054,7 +19903,7 @@
             <a:r>
               <a:rPr lang="de-DE" sz="900" dirty="0">
                 <a:solidFill>
-                  <a:srgbClr val="FF0000"/>
+                  <a:schemeClr val="tx1"/>
                 </a:solidFill>
                 <a:latin typeface="SBB Light" pitchFamily="2" charset="0"/>
               </a:rPr>
@@ -17062,7 +19911,7 @@
             </a:r>
             <a:endParaRPr lang="de-DE" sz="500" dirty="0">
               <a:solidFill>
-                <a:srgbClr val="FF0000"/>
+                <a:schemeClr val="tx1"/>
               </a:solidFill>
               <a:latin typeface="SBB Light" pitchFamily="2" charset="0"/>
             </a:endParaRPr>
@@ -17083,8 +19932,134 @@
         </p:nvSpPr>
         <p:spPr>
           <a:xfrm>
-            <a:off x="3326454" y="2060652"/>
-            <a:ext cx="1399547" cy="338554"/>
+            <a:off x="3318640" y="2068467"/>
+            <a:ext cx="820306" cy="200055"/>
+          </a:xfrm>
+          <a:prstGeom prst="rect">
+            <a:avLst/>
+          </a:prstGeom>
+          <a:noFill/>
+          <a:ln>
+            <a:noFill/>
+          </a:ln>
+        </p:spPr>
+        <p:style>
+          <a:lnRef idx="2">
+            <a:schemeClr val="accent1">
+              <a:shade val="15000"/>
+            </a:schemeClr>
+          </a:lnRef>
+          <a:fillRef idx="1">
+            <a:schemeClr val="accent1"/>
+          </a:fillRef>
+          <a:effectRef idx="0">
+            <a:schemeClr val="accent1"/>
+          </a:effectRef>
+          <a:fontRef idx="minor">
+            <a:schemeClr val="lt1"/>
+          </a:fontRef>
+        </p:style>
+        <p:txBody>
+          <a:bodyPr rtlCol="0" anchor="t"/>
+          <a:lstStyle>
+            <a:defPPr>
+              <a:defRPr lang="de-DE"/>
+            </a:defPPr>
+            <a:lvl1pPr>
+              <a:defRPr sz="700">
+                <a:latin typeface="SBB Light" pitchFamily="2" charset="0"/>
+              </a:defRPr>
+            </a:lvl1pPr>
+            <a:lvl2pPr>
+              <a:defRPr>
+                <a:solidFill>
+                  <a:schemeClr val="lt1"/>
+                </a:solidFill>
+              </a:defRPr>
+            </a:lvl2pPr>
+            <a:lvl3pPr>
+              <a:defRPr>
+                <a:solidFill>
+                  <a:schemeClr val="lt1"/>
+                </a:solidFill>
+              </a:defRPr>
+            </a:lvl3pPr>
+            <a:lvl4pPr>
+              <a:defRPr>
+                <a:solidFill>
+                  <a:schemeClr val="lt1"/>
+                </a:solidFill>
+              </a:defRPr>
+            </a:lvl4pPr>
+            <a:lvl5pPr>
+              <a:defRPr>
+                <a:solidFill>
+                  <a:schemeClr val="lt1"/>
+                </a:solidFill>
+              </a:defRPr>
+            </a:lvl5pPr>
+            <a:lvl6pPr>
+              <a:defRPr>
+                <a:solidFill>
+                  <a:schemeClr val="lt1"/>
+                </a:solidFill>
+              </a:defRPr>
+            </a:lvl6pPr>
+            <a:lvl7pPr>
+              <a:defRPr>
+                <a:solidFill>
+                  <a:schemeClr val="lt1"/>
+                </a:solidFill>
+              </a:defRPr>
+            </a:lvl7pPr>
+            <a:lvl8pPr>
+              <a:defRPr>
+                <a:solidFill>
+                  <a:schemeClr val="lt1"/>
+                </a:solidFill>
+              </a:defRPr>
+            </a:lvl8pPr>
+            <a:lvl9pPr>
+              <a:defRPr>
+                <a:solidFill>
+                  <a:schemeClr val="lt1"/>
+                </a:solidFill>
+              </a:defRPr>
+            </a:lvl9pPr>
+          </a:lstStyle>
+          <a:p>
+            <a:r>
+              <a:rPr lang="de-DE" dirty="0">
+                <a:solidFill>
+                  <a:schemeClr val="tx1"/>
+                </a:solidFill>
+              </a:rPr>
+              <a:t>30.9. – 4.10.</a:t>
+            </a:r>
+            <a:endParaRPr lang="de-CH" dirty="0">
+              <a:solidFill>
+                <a:schemeClr val="tx1"/>
+              </a:solidFill>
+            </a:endParaRPr>
+          </a:p>
+        </p:txBody>
+      </p:sp>
+      <p:sp>
+        <p:nvSpPr>
+          <p:cNvPr id="7" name="Textfeld 6">
+            <a:extLst>
+              <a:ext uri="{FF2B5EF4-FFF2-40B4-BE49-F238E27FC236}">
+                <a16:creationId xmlns:a16="http://schemas.microsoft.com/office/drawing/2014/main" id="{779D5018-02DA-9DE5-B0E0-805389799496}"/>
+              </a:ext>
+            </a:extLst>
+          </p:cNvPr>
+          <p:cNvSpPr txBox="1"/>
+          <p:nvPr/>
+        </p:nvSpPr>
+        <p:spPr>
+          <a:xfrm>
+            <a:off x="3386502" y="5278815"/>
+            <a:ext cx="846003" cy="200055"/>
           </a:xfrm>
           <a:prstGeom prst="rect">
             <a:avLst/>
@@ -17098,66 +20073,13 @@
           <a:lstStyle/>
           <a:p>
             <a:r>
-              <a:rPr lang="de-CH" sz="800" dirty="0">
-                <a:solidFill>
-                  <a:srgbClr val="FF0000"/>
-                </a:solidFill>
+              <a:rPr lang="de-DE" sz="700" dirty="0">
+                <a:latin typeface="SBB Light" pitchFamily="2" charset="0"/>
               </a:rPr>
-              <a:t>- 4.-6. 12.-13. Sept. 24 oder</a:t>
+              <a:t>Februar/März</a:t>
             </a:r>
-          </a:p>
-          <a:p>
-            <a:r>
-              <a:rPr lang="de-CH" sz="800" dirty="0">
-                <a:solidFill>
-                  <a:srgbClr val="FF0000"/>
-                </a:solidFill>
-              </a:rPr>
-              <a:t>- 30./31. Okt 7./8. Nov 24</a:t>
-            </a:r>
-          </a:p>
-        </p:txBody>
-      </p:sp>
-      <p:sp>
-        <p:nvSpPr>
-          <p:cNvPr id="7" name="Textfeld 6">
-            <a:extLst>
-              <a:ext uri="{FF2B5EF4-FFF2-40B4-BE49-F238E27FC236}">
-                <a16:creationId xmlns:a16="http://schemas.microsoft.com/office/drawing/2014/main" id="{779D5018-02DA-9DE5-B0E0-805389799496}"/>
-              </a:ext>
-            </a:extLst>
-          </p:cNvPr>
-          <p:cNvSpPr txBox="1"/>
-          <p:nvPr/>
-        </p:nvSpPr>
-        <p:spPr>
-          <a:xfrm>
-            <a:off x="3439445" y="5278815"/>
-            <a:ext cx="730919" cy="215444"/>
-          </a:xfrm>
-          <a:prstGeom prst="rect">
-            <a:avLst/>
-          </a:prstGeom>
-          <a:noFill/>
-        </p:spPr>
-        <p:txBody>
-          <a:bodyPr wrap="square">
-            <a:spAutoFit/>
-          </a:bodyPr>
-          <a:lstStyle/>
-          <a:p>
-            <a:r>
-              <a:rPr lang="de-DE" sz="800" dirty="0">
-                <a:solidFill>
-                  <a:srgbClr val="FF0000"/>
-                </a:solidFill>
-              </a:rPr>
-              <a:t>Feb/März</a:t>
-            </a:r>
-            <a:endParaRPr lang="de-CH" sz="800" dirty="0">
-              <a:solidFill>
-                <a:srgbClr val="FF0000"/>
-              </a:solidFill>
+            <a:endParaRPr lang="de-CH" sz="700" dirty="0">
+              <a:latin typeface="SBB Light" pitchFamily="2" charset="0"/>
             </a:endParaRPr>
           </a:p>
         </p:txBody>
@@ -17758,6 +20680,196 @@
                 <a:schemeClr val="tx1"/>
               </a:solidFill>
               <a:latin typeface="SBB Light" pitchFamily="2" charset="0"/>
+            </a:endParaRPr>
+          </a:p>
+        </p:txBody>
+      </p:sp>
+      <p:sp>
+        <p:nvSpPr>
+          <p:cNvPr id="271" name="Rechteck: abgerundete Ecken 270">
+            <a:extLst>
+              <a:ext uri="{FF2B5EF4-FFF2-40B4-BE49-F238E27FC236}">
+                <a16:creationId xmlns:a16="http://schemas.microsoft.com/office/drawing/2014/main" id="{6AAE397B-F5BA-828B-34DF-067B2E020C3D}"/>
+              </a:ext>
+            </a:extLst>
+          </p:cNvPr>
+          <p:cNvSpPr/>
+          <p:nvPr/>
+        </p:nvSpPr>
+        <p:spPr>
+          <a:xfrm>
+            <a:off x="608786" y="5557907"/>
+            <a:ext cx="1705516" cy="212066"/>
+          </a:xfrm>
+          <a:prstGeom prst="roundRect">
+            <a:avLst/>
+          </a:prstGeom>
+          <a:solidFill>
+            <a:schemeClr val="accent2">
+              <a:lumMod val="75000"/>
+            </a:schemeClr>
+          </a:solidFill>
+          <a:ln>
+            <a:noFill/>
+          </a:ln>
+        </p:spPr>
+        <p:style>
+          <a:lnRef idx="2">
+            <a:schemeClr val="accent1">
+              <a:shade val="15000"/>
+            </a:schemeClr>
+          </a:lnRef>
+          <a:fillRef idx="1">
+            <a:schemeClr val="accent1"/>
+          </a:fillRef>
+          <a:effectRef idx="0">
+            <a:schemeClr val="accent1"/>
+          </a:effectRef>
+          <a:fontRef idx="minor">
+            <a:schemeClr val="lt1"/>
+          </a:fontRef>
+        </p:style>
+        <p:txBody>
+          <a:bodyPr lIns="36000" tIns="36000" rIns="36000" bIns="36000" rtlCol="0" anchor="ctr"/>
+          <a:lstStyle/>
+          <a:p>
+            <a:pPr algn="ctr"/>
+            <a:r>
+              <a:rPr lang="de-DE" sz="900" dirty="0">
+                <a:solidFill>
+                  <a:schemeClr val="bg1">
+                    <a:lumMod val="95000"/>
+                  </a:schemeClr>
+                </a:solidFill>
+                <a:latin typeface="SBB Light" pitchFamily="2" charset="0"/>
+              </a:rPr>
+              <a:t>Barrierefreiheit/Accessibility</a:t>
+            </a:r>
+          </a:p>
+        </p:txBody>
+      </p:sp>
+      <p:sp>
+        <p:nvSpPr>
+          <p:cNvPr id="70" name="Textfeld 69">
+            <a:extLst>
+              <a:ext uri="{FF2B5EF4-FFF2-40B4-BE49-F238E27FC236}">
+                <a16:creationId xmlns:a16="http://schemas.microsoft.com/office/drawing/2014/main" id="{42697A38-BA43-BB46-0E29-AE20908BE8DA}"/>
+              </a:ext>
+            </a:extLst>
+          </p:cNvPr>
+          <p:cNvSpPr txBox="1"/>
+          <p:nvPr/>
+        </p:nvSpPr>
+        <p:spPr>
+          <a:xfrm>
+            <a:off x="2280947" y="5556027"/>
+            <a:ext cx="554729" cy="200055"/>
+          </a:xfrm>
+          <a:prstGeom prst="rect">
+            <a:avLst/>
+          </a:prstGeom>
+          <a:noFill/>
+          <a:ln>
+            <a:noFill/>
+          </a:ln>
+        </p:spPr>
+        <p:style>
+          <a:lnRef idx="2">
+            <a:schemeClr val="accent1">
+              <a:shade val="15000"/>
+            </a:schemeClr>
+          </a:lnRef>
+          <a:fillRef idx="1">
+            <a:schemeClr val="accent1"/>
+          </a:fillRef>
+          <a:effectRef idx="0">
+            <a:schemeClr val="accent1"/>
+          </a:effectRef>
+          <a:fontRef idx="minor">
+            <a:schemeClr val="lt1"/>
+          </a:fontRef>
+        </p:style>
+        <p:txBody>
+          <a:bodyPr rtlCol="0" anchor="t"/>
+          <a:lstStyle>
+            <a:defPPr>
+              <a:defRPr lang="de-DE"/>
+            </a:defPPr>
+            <a:lvl1pPr>
+              <a:defRPr sz="700">
+                <a:latin typeface="SBB Light" pitchFamily="2" charset="0"/>
+              </a:defRPr>
+            </a:lvl1pPr>
+            <a:lvl2pPr>
+              <a:defRPr>
+                <a:solidFill>
+                  <a:schemeClr val="lt1"/>
+                </a:solidFill>
+              </a:defRPr>
+            </a:lvl2pPr>
+            <a:lvl3pPr>
+              <a:defRPr>
+                <a:solidFill>
+                  <a:schemeClr val="lt1"/>
+                </a:solidFill>
+              </a:defRPr>
+            </a:lvl3pPr>
+            <a:lvl4pPr>
+              <a:defRPr>
+                <a:solidFill>
+                  <a:schemeClr val="lt1"/>
+                </a:solidFill>
+              </a:defRPr>
+            </a:lvl4pPr>
+            <a:lvl5pPr>
+              <a:defRPr>
+                <a:solidFill>
+                  <a:schemeClr val="lt1"/>
+                </a:solidFill>
+              </a:defRPr>
+            </a:lvl5pPr>
+            <a:lvl6pPr>
+              <a:defRPr>
+                <a:solidFill>
+                  <a:schemeClr val="lt1"/>
+                </a:solidFill>
+              </a:defRPr>
+            </a:lvl6pPr>
+            <a:lvl7pPr>
+              <a:defRPr>
+                <a:solidFill>
+                  <a:schemeClr val="lt1"/>
+                </a:solidFill>
+              </a:defRPr>
+            </a:lvl7pPr>
+            <a:lvl8pPr>
+              <a:defRPr>
+                <a:solidFill>
+                  <a:schemeClr val="lt1"/>
+                </a:solidFill>
+              </a:defRPr>
+            </a:lvl8pPr>
+            <a:lvl9pPr>
+              <a:defRPr>
+                <a:solidFill>
+                  <a:schemeClr val="lt1"/>
+                </a:solidFill>
+              </a:defRPr>
+            </a:lvl9pPr>
+          </a:lstStyle>
+          <a:p>
+            <a:r>
+              <a:rPr lang="de-DE" dirty="0">
+                <a:solidFill>
+                  <a:schemeClr val="tx1"/>
+                </a:solidFill>
+              </a:rPr>
+              <a:t>29.1./5.2</a:t>
+            </a:r>
+            <a:endParaRPr lang="de-CH" dirty="0">
+              <a:solidFill>
+                <a:schemeClr val="tx1"/>
+              </a:solidFill>
             </a:endParaRPr>
           </a:p>
         </p:txBody>

</xml_diff>